<commit_message>
Réalisation du diagramme de GANTT
</commit_message>
<xml_diff>
--- a/Page d’acceuil.pptx
+++ b/Page d’acceuil.pptx
@@ -717,7 +717,7 @@
           <a:p>
             <a:fld id="{7E539B21-FF63-4FEA-A1D1-EBE8EF669A6E}" type="datetimeFigureOut">
               <a:rPr lang="fr-FR" smtClean="0"/>
-              <a:t>19/11/2017</a:t>
+              <a:t>22/11/2017</a:t>
             </a:fld>
             <a:endParaRPr lang="fr-FR"/>
           </a:p>
@@ -1131,7 +1131,7 @@
           <a:p>
             <a:fld id="{F353337E-5607-446D-AB74-7A5B8DCFC88F}" type="datetimeFigureOut">
               <a:rPr lang="fr-FR" smtClean="0"/>
-              <a:t>19/11/2017</a:t>
+              <a:t>22/11/2017</a:t>
             </a:fld>
             <a:endParaRPr lang="fr-FR"/>
           </a:p>
@@ -1337,7 +1337,7 @@
           <a:p>
             <a:fld id="{F353337E-5607-446D-AB74-7A5B8DCFC88F}" type="datetimeFigureOut">
               <a:rPr lang="fr-FR" smtClean="0"/>
-              <a:t>19/11/2017</a:t>
+              <a:t>22/11/2017</a:t>
             </a:fld>
             <a:endParaRPr lang="fr-FR"/>
           </a:p>
@@ -1553,7 +1553,7 @@
           <a:p>
             <a:fld id="{F353337E-5607-446D-AB74-7A5B8DCFC88F}" type="datetimeFigureOut">
               <a:rPr lang="fr-FR" smtClean="0"/>
-              <a:t>19/11/2017</a:t>
+              <a:t>22/11/2017</a:t>
             </a:fld>
             <a:endParaRPr lang="fr-FR"/>
           </a:p>
@@ -1835,7 +1835,7 @@
           <a:p>
             <a:fld id="{F353337E-5607-446D-AB74-7A5B8DCFC88F}" type="datetimeFigureOut">
               <a:rPr lang="fr-FR" smtClean="0"/>
-              <a:t>19/11/2017</a:t>
+              <a:t>22/11/2017</a:t>
             </a:fld>
             <a:endParaRPr lang="fr-FR"/>
           </a:p>
@@ -2118,7 +2118,7 @@
           <a:p>
             <a:fld id="{F353337E-5607-446D-AB74-7A5B8DCFC88F}" type="datetimeFigureOut">
               <a:rPr lang="fr-FR" smtClean="0"/>
-              <a:t>19/11/2017</a:t>
+              <a:t>22/11/2017</a:t>
             </a:fld>
             <a:endParaRPr lang="fr-FR"/>
           </a:p>
@@ -2391,7 +2391,7 @@
           <a:p>
             <a:fld id="{F353337E-5607-446D-AB74-7A5B8DCFC88F}" type="datetimeFigureOut">
               <a:rPr lang="fr-FR" smtClean="0"/>
-              <a:t>19/11/2017</a:t>
+              <a:t>22/11/2017</a:t>
             </a:fld>
             <a:endParaRPr lang="fr-FR"/>
           </a:p>
@@ -2811,7 +2811,7 @@
           <a:p>
             <a:fld id="{F353337E-5607-446D-AB74-7A5B8DCFC88F}" type="datetimeFigureOut">
               <a:rPr lang="fr-FR" smtClean="0"/>
-              <a:t>19/11/2017</a:t>
+              <a:t>22/11/2017</a:t>
             </a:fld>
             <a:endParaRPr lang="fr-FR"/>
           </a:p>
@@ -2960,7 +2960,7 @@
           <a:p>
             <a:fld id="{F353337E-5607-446D-AB74-7A5B8DCFC88F}" type="datetimeFigureOut">
               <a:rPr lang="fr-FR" smtClean="0"/>
-              <a:t>19/11/2017</a:t>
+              <a:t>22/11/2017</a:t>
             </a:fld>
             <a:endParaRPr lang="fr-FR"/>
           </a:p>
@@ -3081,7 +3081,7 @@
           <a:p>
             <a:fld id="{F353337E-5607-446D-AB74-7A5B8DCFC88F}" type="datetimeFigureOut">
               <a:rPr lang="fr-FR" smtClean="0"/>
-              <a:t>19/11/2017</a:t>
+              <a:t>22/11/2017</a:t>
             </a:fld>
             <a:endParaRPr lang="fr-FR"/>
           </a:p>
@@ -3400,7 +3400,7 @@
           <a:p>
             <a:fld id="{F353337E-5607-446D-AB74-7A5B8DCFC88F}" type="datetimeFigureOut">
               <a:rPr lang="fr-FR" smtClean="0"/>
-              <a:t>19/11/2017</a:t>
+              <a:t>22/11/2017</a:t>
             </a:fld>
             <a:endParaRPr lang="fr-FR"/>
           </a:p>
@@ -3696,7 +3696,7 @@
           <a:p>
             <a:fld id="{F353337E-5607-446D-AB74-7A5B8DCFC88F}" type="datetimeFigureOut">
               <a:rPr lang="fr-FR" smtClean="0"/>
-              <a:t>19/11/2017</a:t>
+              <a:t>22/11/2017</a:t>
             </a:fld>
             <a:endParaRPr lang="fr-FR"/>
           </a:p>
@@ -3945,7 +3945,7 @@
           <a:p>
             <a:fld id="{F353337E-5607-446D-AB74-7A5B8DCFC88F}" type="datetimeFigureOut">
               <a:rPr lang="fr-FR" smtClean="0"/>
-              <a:t>19/11/2017</a:t>
+              <a:t>22/11/2017</a:t>
             </a:fld>
             <a:endParaRPr lang="fr-FR"/>
           </a:p>
@@ -16778,7 +16778,7 @@
         </p:nvSpPr>
         <p:spPr>
           <a:xfrm>
-            <a:off x="3648618" y="2222513"/>
+            <a:off x="3115396" y="2289530"/>
             <a:ext cx="5961207" cy="323165"/>
           </a:xfrm>
           <a:prstGeom prst="rect">
@@ -17020,7 +17020,7 @@
         </p:nvSpPr>
         <p:spPr>
           <a:xfrm>
-            <a:off x="6606329" y="3802063"/>
+            <a:off x="6388010" y="3802063"/>
             <a:ext cx="1106592" cy="228600"/>
           </a:xfrm>
           <a:prstGeom prst="roundRect">
@@ -17167,7 +17167,7 @@
         </p:nvSpPr>
         <p:spPr>
           <a:xfrm>
-            <a:off x="3648618" y="2222513"/>
+            <a:off x="3115396" y="2259835"/>
             <a:ext cx="5961207" cy="323165"/>
           </a:xfrm>
           <a:prstGeom prst="rect">
@@ -17409,7 +17409,7 @@
         </p:nvSpPr>
         <p:spPr>
           <a:xfrm>
-            <a:off x="6606329" y="3802063"/>
+            <a:off x="6388010" y="3802063"/>
             <a:ext cx="1106592" cy="228600"/>
           </a:xfrm>
           <a:prstGeom prst="roundRect">
@@ -17520,8 +17520,8 @@
         </p:nvSpPr>
         <p:spPr>
           <a:xfrm>
-            <a:off x="3326920" y="2390589"/>
-            <a:ext cx="5538159" cy="323165"/>
+            <a:off x="3161404" y="2381445"/>
+            <a:ext cx="4683224" cy="323165"/>
           </a:xfrm>
           <a:prstGeom prst="rect">
             <a:avLst/>
@@ -17666,7 +17666,7 @@
         </p:nvSpPr>
         <p:spPr>
           <a:xfrm>
-            <a:off x="5503016" y="3775760"/>
+            <a:off x="4949720" y="3780784"/>
             <a:ext cx="1106592" cy="323165"/>
           </a:xfrm>
           <a:prstGeom prst="roundRect">
@@ -25969,7 +25969,7 @@
 
 <file path=customXml/item1.xml><?xml version="1.0" encoding="utf-8"?>
 <Control xmlns="http://schemas.microsoft.com/VisualStudio/2011/storyboarding/control">
-  <Id Name="System.Storyboarding.Common.TextInput" Revision="1" Stencil="System.Storyboarding.Common" StencilVersion="0.1"/>
+  <Id Name="System.Storyboarding.Backgrounds.WebBrowser" Revision="1" Stencil="System.Storyboarding.Backgrounds" StencilVersion="0.1"/>
 </Control>
 </file>
 
@@ -25981,13 +25981,13 @@
 
 <file path=customXml/item100.xml><?xml version="1.0" encoding="utf-8"?>
 <Control xmlns="http://schemas.microsoft.com/VisualStudio/2011/storyboarding/control">
-  <Id Name="System.Storyboarding.Annotation.StickyNote" Revision="1" Stencil="System.Storyboarding.Annotation" StencilVersion="0.1"/>
+  <Id Name="System.Storyboarding.Common.CheckBoxChecked" Revision="1" Stencil="System.Storyboarding.Common" StencilVersion="0.1"/>
 </Control>
 </file>
 
 <file path=customXml/item101.xml><?xml version="1.0" encoding="utf-8"?>
 <Control xmlns="http://schemas.microsoft.com/VisualStudio/2011/storyboarding/control">
-  <Id Name="System.Storyboarding.Common.CheckBoxChecked" Revision="1" Stencil="System.Storyboarding.Common" StencilVersion="0.1"/>
+  <Id Name="System.Storyboarding.Common.Button" Revision="1" Stencil="System.Storyboarding.Common" StencilVersion="0.1"/>
 </Control>
 </file>
 
@@ -26005,13 +26005,13 @@
 
 <file path=customXml/item104.xml><?xml version="1.0" encoding="utf-8"?>
 <Control xmlns="http://schemas.microsoft.com/VisualStudio/2011/storyboarding/control">
-  <Id Name="System.Storyboarding.Common.TextInput" Revision="1" Stencil="System.Storyboarding.Common" StencilVersion="0.1"/>
+  <Id Name="System.Storyboarding.Common.TextArea" Revision="1" Stencil="System.Storyboarding.Common" StencilVersion="0.1"/>
 </Control>
 </file>
 
 <file path=customXml/item105.xml><?xml version="1.0" encoding="utf-8"?>
 <Control xmlns="http://schemas.microsoft.com/VisualStudio/2011/storyboarding/control">
-  <Id Name="System.Storyboarding.Common.CheckBoxChecked" Revision="1" Stencil="System.Storyboarding.Common" StencilVersion="0.1"/>
+  <Id Name="System.Storyboarding.Common.Button" Revision="1" Stencil="System.Storyboarding.Common" StencilVersion="0.1"/>
 </Control>
 </file>
 
@@ -26023,19 +26023,19 @@
 
 <file path=customXml/item107.xml><?xml version="1.0" encoding="utf-8"?>
 <Control xmlns="http://schemas.microsoft.com/VisualStudio/2011/storyboarding/control">
-  <Id Name="System.Storyboarding.Backgrounds.WebBrowser" Revision="1" Stencil="System.Storyboarding.Backgrounds" StencilVersion="0.1"/>
+  <Id Name="System.Storyboarding.Common.SearchBox" Revision="1" Stencil="System.Storyboarding.Common" StencilVersion="0.1"/>
 </Control>
 </file>
 
 <file path=customXml/item108.xml><?xml version="1.0" encoding="utf-8"?>
 <Control xmlns="http://schemas.microsoft.com/VisualStudio/2011/storyboarding/control">
-  <Id Name="System.Storyboarding.Common.ScrollbarVertical" Revision="1" Stencil="System.Storyboarding.Common" StencilVersion="0.1"/>
+  <Id Name="System.Storyboarding.Common.TextInput" Revision="1" Stencil="System.Storyboarding.Common" StencilVersion="0.1"/>
 </Control>
 </file>
 
 <file path=customXml/item109.xml><?xml version="1.0" encoding="utf-8"?>
 <Control xmlns="http://schemas.microsoft.com/VisualStudio/2011/storyboarding/control">
-  <Id Name="System.Storyboarding.Common.TextInput" Revision="1" Stencil="System.Storyboarding.Common" StencilVersion="0.1"/>
+  <Id Name="System.Storyboarding.Common.CheckBoxUnchecked" Revision="1" Stencil="System.Storyboarding.Common" StencilVersion="0.1"/>
 </Control>
 </file>
 
@@ -26047,43 +26047,43 @@
 
 <file path=customXml/item110.xml><?xml version="1.0" encoding="utf-8"?>
 <Control xmlns="http://schemas.microsoft.com/VisualStudio/2011/storyboarding/control">
-  <Id Name="System.Storyboarding.Common.CheckBoxUnchecked" Revision="1" Stencil="System.Storyboarding.Common" StencilVersion="0.1"/>
-</Control>
-</file>
-
-<file path=customXml/item111.xml><?xml version="1.0" encoding="utf-8"?>
-<Control xmlns="http://schemas.microsoft.com/VisualStudio/2011/storyboarding/control">
   <Id Name="System.Storyboarding.Common.ScrollbarVertical" Revision="1" Stencil="System.Storyboarding.Common" StencilVersion="0.1"/>
 </Control>
 </file>
 
-<file path=customXml/item112.xml><?xml version="1.0" encoding="utf-8"?>
+<file path=customXml/item111.xml><?xml version="1.0" encoding="utf-8"?>
 <Control xmlns="http://schemas.microsoft.com/VisualStudio/2011/storyboarding/control">
   <Id Name="System.Storyboarding.Common.TextInput" Revision="1" Stencil="System.Storyboarding.Common" StencilVersion="0.1"/>
 </Control>
 </file>
 
+<file path=customXml/item112.xml><?xml version="1.0" encoding="utf-8"?>
+<Control xmlns="http://schemas.microsoft.com/VisualStudio/2011/storyboarding/control">
+  <Id Name="System.Storyboarding.Annotation.StickyNote" Revision="1" Stencil="System.Storyboarding.Annotation" StencilVersion="0.1"/>
+</Control>
+</file>
+
 <file path=customXml/item113.xml><?xml version="1.0" encoding="utf-8"?>
-<Control xmlns="http://schemas.microsoft.com/VisualStudio/2011/storyboarding/control">
-  <Id Name="System.Storyboarding.Common.TextInput" Revision="1" Stencil="System.Storyboarding.Common" StencilVersion="0.1"/>
-</Control>
-</file>
-
-<file path=customXml/item114.xml><?xml version="1.0" encoding="utf-8"?>
 <Control xmlns="http://schemas.microsoft.com/VisualStudio/2011/storyboarding/control">
   <Id Name="System.Storyboarding.Common.CheckBoxChecked" Revision="1" Stencil="System.Storyboarding.Common" StencilVersion="0.1"/>
 </Control>
 </file>
 
+<file path=customXml/item114.xml><?xml version="1.0" encoding="utf-8"?>
+<Control xmlns="http://schemas.microsoft.com/VisualStudio/2011/storyboarding/control">
+  <Id Name="System.Storyboarding.Annotation.StickyNote" Revision="1" Stencil="System.Storyboarding.Annotation" StencilVersion="0.1"/>
+</Control>
+</file>
+
 <file path=customXml/item115.xml><?xml version="1.0" encoding="utf-8"?>
 <Control xmlns="http://schemas.microsoft.com/VisualStudio/2011/storyboarding/control">
-  <Id Name="System.Storyboarding.Common.TextInput" Revision="1" Stencil="System.Storyboarding.Common" StencilVersion="0.1"/>
+  <Id Name="System.Storyboarding.Common.CheckBoxChecked" Revision="1" Stencil="System.Storyboarding.Common" StencilVersion="0.1"/>
 </Control>
 </file>
 
 <file path=customXml/item116.xml><?xml version="1.0" encoding="utf-8"?>
 <Control xmlns="http://schemas.microsoft.com/VisualStudio/2011/storyboarding/control">
-  <Id Name="System.Storyboarding.Common.Text" Revision="1" Stencil="System.Storyboarding.Common" StencilVersion="0.1"/>
+  <Id Name="System.Storyboarding.Common.TextInput" Revision="1" Stencil="System.Storyboarding.Common" StencilVersion="0.1"/>
 </Control>
 </file>
 
@@ -26095,25 +26095,25 @@
 
 <file path=customXml/item118.xml><?xml version="1.0" encoding="utf-8"?>
 <Control xmlns="http://schemas.microsoft.com/VisualStudio/2011/storyboarding/control">
-  <Id Name="System.Storyboarding.Common.Text" Revision="1" Stencil="System.Storyboarding.Common" StencilVersion="0.1"/>
+  <Id Name="System.Storyboarding.Common.CheckBoxChecked" Revision="1" Stencil="System.Storyboarding.Common" StencilVersion="0.1"/>
 </Control>
 </file>
 
 <file path=customXml/item119.xml><?xml version="1.0" encoding="utf-8"?>
 <Control xmlns="http://schemas.microsoft.com/VisualStudio/2011/storyboarding/control">
-  <Id Name="System.Storyboarding.Common.ScrollbarVertical" Revision="1" Stencil="System.Storyboarding.Common" StencilVersion="0.1"/>
+  <Id Name="System.Storyboarding.Common.TextInput" Revision="1" Stencil="System.Storyboarding.Common" StencilVersion="0.1"/>
 </Control>
 </file>
 
 <file path=customXml/item12.xml><?xml version="1.0" encoding="utf-8"?>
 <Control xmlns="http://schemas.microsoft.com/VisualStudio/2011/storyboarding/control">
-  <Id Name="System.Storyboarding.Common.CheckBoxChecked" Revision="1" Stencil="System.Storyboarding.Common" StencilVersion="0.1"/>
+  <Id Name="System.Storyboarding.Annotation.StickyNote" Revision="1" Stencil="System.Storyboarding.Annotation" StencilVersion="0.1"/>
 </Control>
 </file>
 
 <file path=customXml/item120.xml><?xml version="1.0" encoding="utf-8"?>
 <Control xmlns="http://schemas.microsoft.com/VisualStudio/2011/storyboarding/control">
-  <Id Name="System.Storyboarding.Common.Button" Revision="1" Stencil="System.Storyboarding.Common" StencilVersion="0.1"/>
+  <Id Name="System.Storyboarding.Annotation.StickyNote" Revision="1" Stencil="System.Storyboarding.Annotation" StencilVersion="0.1"/>
 </Control>
 </file>
 
@@ -26125,31 +26125,31 @@
 
 <file path=customXml/item122.xml><?xml version="1.0" encoding="utf-8"?>
 <Control xmlns="http://schemas.microsoft.com/VisualStudio/2011/storyboarding/control">
-  <Id Name="System.Storyboarding.Common.Text" Revision="1" Stencil="System.Storyboarding.Common" StencilVersion="0.1"/>
+  <Id Name="System.Storyboarding.Common.TextInput" Revision="1" Stencil="System.Storyboarding.Common" StencilVersion="0.1"/>
 </Control>
 </file>
 
 <file path=customXml/item123.xml><?xml version="1.0" encoding="utf-8"?>
 <Control xmlns="http://schemas.microsoft.com/VisualStudio/2011/storyboarding/control">
-  <Id Name="System.Storyboarding.Common.TextInput" Revision="1" Stencil="System.Storyboarding.Common" StencilVersion="0.1"/>
+  <Id Name="System.Storyboarding.Common.CheckBoxUnchecked" Revision="1" Stencil="System.Storyboarding.Common" StencilVersion="0.1"/>
 </Control>
 </file>
 
 <file path=customXml/item124.xml><?xml version="1.0" encoding="utf-8"?>
 <Control xmlns="http://schemas.microsoft.com/VisualStudio/2011/storyboarding/control">
-  <Id Name="System.Storyboarding.Common.SearchBox" Revision="1" Stencil="System.Storyboarding.Common" StencilVersion="0.1"/>
+  <Id Name="System.Storyboarding.Common.Hyperlink" Revision="1" Stencil="System.Storyboarding.Common" StencilVersion="0.1"/>
 </Control>
 </file>
 
 <file path=customXml/item125.xml><?xml version="1.0" encoding="utf-8"?>
 <Control xmlns="http://schemas.microsoft.com/VisualStudio/2011/storyboarding/control">
-  <Id Name="System.Storyboarding.Common.TextInput" Revision="1" Stencil="System.Storyboarding.Common" StencilVersion="0.1"/>
+  <Id Name="System.Storyboarding.Common.Button" Revision="1" Stencil="System.Storyboarding.Common" StencilVersion="0.1"/>
 </Control>
 </file>
 
 <file path=customXml/item126.xml><?xml version="1.0" encoding="utf-8"?>
 <Control xmlns="http://schemas.microsoft.com/VisualStudio/2011/storyboarding/control">
-  <Id Name="System.Storyboarding.Annotation.StickyNote" Revision="1" Stencil="System.Storyboarding.Annotation" StencilVersion="0.1"/>
+  <Id Name="System.Storyboarding.Common.Button" Revision="1" Stencil="System.Storyboarding.Common" StencilVersion="0.1"/>
 </Control>
 </file>
 
@@ -26161,37 +26161,37 @@
 
 <file path=customXml/item128.xml><?xml version="1.0" encoding="utf-8"?>
 <Control xmlns="http://schemas.microsoft.com/VisualStudio/2011/storyboarding/control">
-  <Id Name="System.Storyboarding.WindowsAppIcons.Check" Revision="1" Stencil="System.Storyboarding.WindowsAppIcons" StencilVersion="0.1"/>
+  <Id Name="System.Storyboarding.Common.Button" Revision="1" Stencil="System.Storyboarding.Common" StencilVersion="0.1"/>
 </Control>
 </file>
 
 <file path=customXml/item129.xml><?xml version="1.0" encoding="utf-8"?>
+<Control xmlns="http://schemas.microsoft.com/VisualStudio/2011/storyboarding/control">
+  <Id Name="System.Storyboarding.Backgrounds.WebBrowser" Revision="1" Stencil="System.Storyboarding.Backgrounds" StencilVersion="0.1"/>
+</Control>
+</file>
+
+<file path=customXml/item13.xml><?xml version="1.0" encoding="utf-8"?>
+<Control xmlns="http://schemas.microsoft.com/VisualStudio/2011/storyboarding/control">
+  <Id Name="System.Storyboarding.Common.Button" Revision="1" Stencil="System.Storyboarding.Common" StencilVersion="0.1"/>
+</Control>
+</file>
+
+<file path=customXml/item130.xml><?xml version="1.0" encoding="utf-8"?>
+<Control xmlns="http://schemas.microsoft.com/VisualStudio/2011/storyboarding/control">
+  <Id Name="System.Storyboarding.Common.Text" Revision="1" Stencil="System.Storyboarding.Common" StencilVersion="0.1"/>
+</Control>
+</file>
+
+<file path=customXml/item131.xml><?xml version="1.0" encoding="utf-8"?>
 <Control xmlns="http://schemas.microsoft.com/VisualStudio/2011/storyboarding/control">
   <Id Name="System.Storyboarding.Common.TextInput" Revision="1" Stencil="System.Storyboarding.Common" StencilVersion="0.1"/>
 </Control>
 </file>
 
-<file path=customXml/item13.xml><?xml version="1.0" encoding="utf-8"?>
-<Control xmlns="http://schemas.microsoft.com/VisualStudio/2011/storyboarding/control">
-  <Id Name="System.Storyboarding.Common.TextInput" Revision="1" Stencil="System.Storyboarding.Common" StencilVersion="0.1"/>
-</Control>
-</file>
-
-<file path=customXml/item130.xml><?xml version="1.0" encoding="utf-8"?>
-<Control xmlns="http://schemas.microsoft.com/VisualStudio/2011/storyboarding/control">
-  <Id Name="System.Storyboarding.Common.Button" Revision="1" Stencil="System.Storyboarding.Common" StencilVersion="0.1"/>
-</Control>
-</file>
-
-<file path=customXml/item131.xml><?xml version="1.0" encoding="utf-8"?>
-<Control xmlns="http://schemas.microsoft.com/VisualStudio/2011/storyboarding/control">
-  <Id Name="System.Storyboarding.Annotation.StickyNote" Revision="1" Stencil="System.Storyboarding.Annotation" StencilVersion="0.1"/>
-</Control>
-</file>
-
 <file path=customXml/item132.xml><?xml version="1.0" encoding="utf-8"?>
 <Control xmlns="http://schemas.microsoft.com/VisualStudio/2011/storyboarding/control">
-  <Id Name="System.Storyboarding.Common.Text" Revision="1" Stencil="System.Storyboarding.Common" StencilVersion="0.1"/>
+  <Id Name="System.Storyboarding.Common.SearchBox" Revision="1" Stencil="System.Storyboarding.Common" StencilVersion="0.1"/>
 </Control>
 </file>
 
@@ -26203,7 +26203,7 @@
 
 <file path=customXml/item134.xml><?xml version="1.0" encoding="utf-8"?>
 <Control xmlns="http://schemas.microsoft.com/VisualStudio/2011/storyboarding/control">
-  <Id Name="System.Storyboarding.Common.ScrollbarVertical" Revision="1" Stencil="System.Storyboarding.Common" StencilVersion="0.1"/>
+  <Id Name="System.Storyboarding.Common.Button" Revision="1" Stencil="System.Storyboarding.Common" StencilVersion="0.1"/>
 </Control>
 </file>
 
@@ -26215,7 +26215,7 @@
 
 <file path=customXml/item136.xml><?xml version="1.0" encoding="utf-8"?>
 <Control xmlns="http://schemas.microsoft.com/VisualStudio/2011/storyboarding/control">
-  <Id Name="System.Storyboarding.Common.Text" Revision="1" Stencil="System.Storyboarding.Common" StencilVersion="0.1"/>
+  <Id Name="System.Storyboarding.Common.CheckBoxChecked" Revision="1" Stencil="System.Storyboarding.Common" StencilVersion="0.1"/>
 </Control>
 </file>
 
@@ -26227,55 +26227,55 @@
 
 <file path=customXml/item138.xml><?xml version="1.0" encoding="utf-8"?>
 <Control xmlns="http://schemas.microsoft.com/VisualStudio/2011/storyboarding/control">
-  <Id Name="System.Storyboarding.Common.Button" Revision="1" Stencil="System.Storyboarding.Common" StencilVersion="0.1"/>
-</Control>
-</file>
-
-<file path=customXml/item139.xml><?xml version="1.0" encoding="utf-8"?>
-<Control xmlns="http://schemas.microsoft.com/VisualStudio/2011/storyboarding/control">
   <Id Name="System.Storyboarding.Common.ScrollbarVertical" Revision="1" Stencil="System.Storyboarding.Common" StencilVersion="0.1"/>
 </Control>
 </file>
 
-<file path=customXml/item14.xml><?xml version="1.0" encoding="utf-8"?>
-<Control xmlns="http://schemas.microsoft.com/VisualStudio/2011/storyboarding/control">
-  <Id Name="System.Storyboarding.Common.SearchBox" Revision="1" Stencil="System.Storyboarding.Common" StencilVersion="0.1"/>
-</Control>
-</file>
-
-<file path=customXml/item140.xml><?xml version="1.0" encoding="utf-8"?>
+<file path=customXml/item139.xml><?xml version="1.0" encoding="utf-8"?>
 <Control xmlns="http://schemas.microsoft.com/VisualStudio/2011/storyboarding/control">
   <Id Name="System.Storyboarding.Common.Text" Revision="1" Stencil="System.Storyboarding.Common" StencilVersion="0.1"/>
 </Control>
 </file>
 
+<file path=customXml/item14.xml><?xml version="1.0" encoding="utf-8"?>
+<Control xmlns="http://schemas.microsoft.com/VisualStudio/2011/storyboarding/control">
+  <Id Name="System.Storyboarding.Common.Button" Revision="1" Stencil="System.Storyboarding.Common" StencilVersion="0.1"/>
+</Control>
+</file>
+
+<file path=customXml/item140.xml><?xml version="1.0" encoding="utf-8"?>
+<Control xmlns="http://schemas.microsoft.com/VisualStudio/2011/storyboarding/control">
+  <Id Name="System.Storyboarding.Annotation.StickyNote" Revision="1" Stencil="System.Storyboarding.Annotation" StencilVersion="0.1"/>
+</Control>
+</file>
+
 <file path=customXml/item141.xml><?xml version="1.0" encoding="utf-8"?>
+<Control xmlns="http://schemas.microsoft.com/VisualStudio/2011/storyboarding/control">
+  <Id Name="System.Storyboarding.Common.Button" Revision="1" Stencil="System.Storyboarding.Common" StencilVersion="0.1"/>
+</Control>
+</file>
+
+<file path=customXml/item142.xml><?xml version="1.0" encoding="utf-8"?>
+<Control xmlns="http://schemas.microsoft.com/VisualStudio/2011/storyboarding/control">
+  <Id Name="System.Storyboarding.Common.Button" Revision="1" Stencil="System.Storyboarding.Common" StencilVersion="0.1"/>
+</Control>
+</file>
+
+<file path=customXml/item143.xml><?xml version="1.0" encoding="utf-8"?>
+<Control xmlns="http://schemas.microsoft.com/VisualStudio/2011/storyboarding/control">
+  <Id Name="System.Storyboarding.Annotation.StickyNote" Revision="1" Stencil="System.Storyboarding.Annotation" StencilVersion="0.1"/>
+</Control>
+</file>
+
+<file path=customXml/item144.xml><?xml version="1.0" encoding="utf-8"?>
 <Control xmlns="http://schemas.microsoft.com/VisualStudio/2011/storyboarding/control">
   <Id Name="System.Storyboarding.Common.CheckBoxChecked" Revision="1" Stencil="System.Storyboarding.Common" StencilVersion="0.1"/>
 </Control>
 </file>
 
-<file path=customXml/item142.xml><?xml version="1.0" encoding="utf-8"?>
-<Control xmlns="http://schemas.microsoft.com/VisualStudio/2011/storyboarding/control">
-  <Id Name="System.Storyboarding.Common.CheckBoxUnchecked" Revision="1" Stencil="System.Storyboarding.Common" StencilVersion="0.1"/>
-</Control>
-</file>
-
-<file path=customXml/item143.xml><?xml version="1.0" encoding="utf-8"?>
+<file path=customXml/item145.xml><?xml version="1.0" encoding="utf-8"?>
 <Control xmlns="http://schemas.microsoft.com/VisualStudio/2011/storyboarding/control">
   <Id Name="System.Storyboarding.Common.TextInput" Revision="1" Stencil="System.Storyboarding.Common" StencilVersion="0.1"/>
-</Control>
-</file>
-
-<file path=customXml/item144.xml><?xml version="1.0" encoding="utf-8"?>
-<Control xmlns="http://schemas.microsoft.com/VisualStudio/2011/storyboarding/control">
-  <Id Name="System.Storyboarding.Common.TextInput" Revision="1" Stencil="System.Storyboarding.Common" StencilVersion="0.1"/>
-</Control>
-</file>
-
-<file path=customXml/item145.xml><?xml version="1.0" encoding="utf-8"?>
-<Control xmlns="http://schemas.microsoft.com/VisualStudio/2011/storyboarding/control">
-  <Id Name="System.Storyboarding.Common.CheckBoxUnchecked" Revision="1" Stencil="System.Storyboarding.Common" StencilVersion="0.1"/>
 </Control>
 </file>
 
@@ -26287,25 +26287,25 @@
 
 <file path=customXml/item147.xml><?xml version="1.0" encoding="utf-8"?>
 <Control xmlns="http://schemas.microsoft.com/VisualStudio/2011/storyboarding/control">
-  <Id Name="System.Storyboarding.Common.CheckBoxChecked" Revision="1" Stencil="System.Storyboarding.Common" StencilVersion="0.1"/>
+  <Id Name="System.Storyboarding.Common.TextInput" Revision="1" Stencil="System.Storyboarding.Common" StencilVersion="0.1"/>
 </Control>
 </file>
 
 <file path=customXml/item148.xml><?xml version="1.0" encoding="utf-8"?>
 <Control xmlns="http://schemas.microsoft.com/VisualStudio/2011/storyboarding/control">
-  <Id Name="System.Storyboarding.Common.CheckBoxChecked" Revision="1" Stencil="System.Storyboarding.Common" StencilVersion="0.1"/>
+  <Id Name="System.Storyboarding.Common.TextInput" Revision="1" Stencil="System.Storyboarding.Common" StencilVersion="0.1"/>
 </Control>
 </file>
 
 <file path=customXml/item149.xml><?xml version="1.0" encoding="utf-8"?>
 <Control xmlns="http://schemas.microsoft.com/VisualStudio/2011/storyboarding/control">
-  <Id Name="System.Storyboarding.Backgrounds.WebBrowser" Revision="1" Stencil="System.Storyboarding.Backgrounds" StencilVersion="0.1"/>
+  <Id Name="System.Storyboarding.Common.TextInput" Revision="1" Stencil="System.Storyboarding.Common" StencilVersion="0.1"/>
 </Control>
 </file>
 
 <file path=customXml/item15.xml><?xml version="1.0" encoding="utf-8"?>
 <Control xmlns="http://schemas.microsoft.com/VisualStudio/2011/storyboarding/control">
-  <Id Name="System.Storyboarding.Annotation.StickyNote" Revision="1" Stencil="System.Storyboarding.Annotation" StencilVersion="0.1"/>
+  <Id Name="System.Storyboarding.Common.TextInput" Revision="1" Stencil="System.Storyboarding.Common" StencilVersion="0.1"/>
 </Control>
 </file>
 
@@ -26317,31 +26317,31 @@
 
 <file path=customXml/item151.xml><?xml version="1.0" encoding="utf-8"?>
 <Control xmlns="http://schemas.microsoft.com/VisualStudio/2011/storyboarding/control">
-  <Id Name="System.Storyboarding.Common.TextInput" Revision="1" Stencil="System.Storyboarding.Common" StencilVersion="0.1"/>
+  <Id Name="System.Storyboarding.Common.CheckBoxChecked" Revision="1" Stencil="System.Storyboarding.Common" StencilVersion="0.1"/>
 </Control>
 </file>
 
 <file path=customXml/item152.xml><?xml version="1.0" encoding="utf-8"?>
-<Control xmlns="http://schemas.microsoft.com/VisualStudio/2011/storyboarding/control">
-  <Id Name="System.Storyboarding.Common.TextArea" Revision="1" Stencil="System.Storyboarding.Common" StencilVersion="0.1"/>
-</Control>
-</file>
-
-<file path=customXml/item153.xml><?xml version="1.0" encoding="utf-8"?>
-<Control xmlns="http://schemas.microsoft.com/VisualStudio/2011/storyboarding/control">
-  <Id Name="System.Storyboarding.Annotation.StickyNote" Revision="1" Stencil="System.Storyboarding.Annotation" StencilVersion="0.1"/>
-</Control>
-</file>
-
-<file path=customXml/item154.xml><?xml version="1.0" encoding="utf-8"?>
 <Control xmlns="http://schemas.microsoft.com/VisualStudio/2011/storyboarding/control">
   <Id Name="System.Storyboarding.Common.TextInput" Revision="1" Stencil="System.Storyboarding.Common" StencilVersion="0.1"/>
 </Control>
 </file>
 
+<file path=customXml/item153.xml><?xml version="1.0" encoding="utf-8"?>
+<Control xmlns="http://schemas.microsoft.com/VisualStudio/2011/storyboarding/control">
+  <Id Name="System.Storyboarding.Common.TextInput" Revision="1" Stencil="System.Storyboarding.Common" StencilVersion="0.1"/>
+</Control>
+</file>
+
+<file path=customXml/item154.xml><?xml version="1.0" encoding="utf-8"?>
+<Control xmlns="http://schemas.microsoft.com/VisualStudio/2011/storyboarding/control">
+  <Id Name="System.Storyboarding.Common.CheckBoxUnchecked" Revision="1" Stencil="System.Storyboarding.Common" StencilVersion="0.1"/>
+</Control>
+</file>
+
 <file path=customXml/item155.xml><?xml version="1.0" encoding="utf-8"?>
 <Control xmlns="http://schemas.microsoft.com/VisualStudio/2011/storyboarding/control">
-  <Id Name="System.Storyboarding.Common.TextInput" Revision="1" Stencil="System.Storyboarding.Common" StencilVersion="0.1"/>
+  <Id Name="System.Storyboarding.Common.CheckBoxChecked" Revision="1" Stencil="System.Storyboarding.Common" StencilVersion="0.1"/>
 </Control>
 </file>
 
@@ -26353,37 +26353,37 @@
 
 <file path=customXml/item157.xml><?xml version="1.0" encoding="utf-8"?>
 <Control xmlns="http://schemas.microsoft.com/VisualStudio/2011/storyboarding/control">
-  <Id Name="System.Storyboarding.Common.CheckBoxChecked" Revision="1" Stencil="System.Storyboarding.Common" StencilVersion="0.1"/>
+  <Id Name="System.Storyboarding.Common.TextInput" Revision="1" Stencil="System.Storyboarding.Common" StencilVersion="0.1"/>
 </Control>
 </file>
 
 <file path=customXml/item158.xml><?xml version="1.0" encoding="utf-8"?>
-<Control xmlns="http://schemas.microsoft.com/VisualStudio/2011/storyboarding/control">
-  <Id Name="System.Storyboarding.Common.SearchBox" Revision="1" Stencil="System.Storyboarding.Common" StencilVersion="0.1"/>
-</Control>
-</file>
-
-<file path=customXml/item159.xml><?xml version="1.0" encoding="utf-8"?>
-<Control xmlns="http://schemas.microsoft.com/VisualStudio/2011/storyboarding/control">
-  <Id Name="System.Storyboarding.Common.SearchBox" Revision="1" Stencil="System.Storyboarding.Common" StencilVersion="0.1"/>
-</Control>
-</file>
-
-<file path=customXml/item16.xml><?xml version="1.0" encoding="utf-8"?>
 <Control xmlns="http://schemas.microsoft.com/VisualStudio/2011/storyboarding/control">
   <Id Name="System.Storyboarding.Common.CheckBoxChecked" Revision="1" Stencil="System.Storyboarding.Common" StencilVersion="0.1"/>
 </Control>
 </file>
 
-<file path=customXml/item160.xml><?xml version="1.0" encoding="utf-8"?>
+<file path=customXml/item159.xml><?xml version="1.0" encoding="utf-8"?>
 <Control xmlns="http://schemas.microsoft.com/VisualStudio/2011/storyboarding/control">
   <Id Name="System.Storyboarding.Common.TextInput" Revision="1" Stencil="System.Storyboarding.Common" StencilVersion="0.1"/>
 </Control>
 </file>
 
+<file path=customXml/item16.xml><?xml version="1.0" encoding="utf-8"?>
+<Control xmlns="http://schemas.microsoft.com/VisualStudio/2011/storyboarding/control">
+  <Id Name="System.Storyboarding.Common.CheckBoxUnchecked" Revision="1" Stencil="System.Storyboarding.Common" StencilVersion="0.1"/>
+</Control>
+</file>
+
+<file path=customXml/item160.xml><?xml version="1.0" encoding="utf-8"?>
+<Control xmlns="http://schemas.microsoft.com/VisualStudio/2011/storyboarding/control">
+  <Id Name="System.Storyboarding.Common.Button" Revision="1" Stencil="System.Storyboarding.Common" StencilVersion="0.1"/>
+</Control>
+</file>
+
 <file path=customXml/item161.xml><?xml version="1.0" encoding="utf-8"?>
 <Control xmlns="http://schemas.microsoft.com/VisualStudio/2011/storyboarding/control">
-  <Id Name="System.Storyboarding.Common.TextInput" Revision="1" Stencil="System.Storyboarding.Common" StencilVersion="0.1"/>
+  <Id Name="System.Storyboarding.Common.Text" Revision="1" Stencil="System.Storyboarding.Common" StencilVersion="0.1"/>
 </Control>
 </file>
 
@@ -26395,19 +26395,19 @@
 
 <file path=customXml/item163.xml><?xml version="1.0" encoding="utf-8"?>
 <Control xmlns="http://schemas.microsoft.com/VisualStudio/2011/storyboarding/control">
-  <Id Name="System.Storyboarding.Common.Hyperlink" Revision="1" Stencil="System.Storyboarding.Common" StencilVersion="0.1"/>
+  <Id Name="System.Storyboarding.Common.TextInput" Revision="1" Stencil="System.Storyboarding.Common" StencilVersion="0.1"/>
 </Control>
 </file>
 
 <file path=customXml/item164.xml><?xml version="1.0" encoding="utf-8"?>
 <Control xmlns="http://schemas.microsoft.com/VisualStudio/2011/storyboarding/control">
-  <Id Name="System.Storyboarding.Common.TextInput" Revision="1" Stencil="System.Storyboarding.Common" StencilVersion="0.1"/>
+  <Id Name="System.Storyboarding.Common.Text" Revision="1" Stencil="System.Storyboarding.Common" StencilVersion="0.1"/>
 </Control>
 </file>
 
 <file path=customXml/item165.xml><?xml version="1.0" encoding="utf-8"?>
 <Control xmlns="http://schemas.microsoft.com/VisualStudio/2011/storyboarding/control">
-  <Id Name="System.Storyboarding.Annotation.StickyNote" Revision="1" Stencil="System.Storyboarding.Annotation" StencilVersion="0.1"/>
+  <Id Name="System.Storyboarding.Common.Text" Revision="1" Stencil="System.Storyboarding.Common" StencilVersion="0.1"/>
 </Control>
 </file>
 
@@ -26431,7 +26431,7 @@
 
 <file path=customXml/item169.xml><?xml version="1.0" encoding="utf-8"?>
 <Control xmlns="http://schemas.microsoft.com/VisualStudio/2011/storyboarding/control">
-  <Id Name="System.Storyboarding.Common.Button" Revision="1" Stencil="System.Storyboarding.Common" StencilVersion="0.1"/>
+  <Id Name="System.Storyboarding.Common.TextInput" Revision="1" Stencil="System.Storyboarding.Common" StencilVersion="0.1"/>
 </Control>
 </file>
 
@@ -26443,13 +26443,13 @@
 
 <file path=customXml/item170.xml><?xml version="1.0" encoding="utf-8"?>
 <Control xmlns="http://schemas.microsoft.com/VisualStudio/2011/storyboarding/control">
-  <Id Name="System.Storyboarding.Common.Button" Revision="1" Stencil="System.Storyboarding.Common" StencilVersion="0.1"/>
+  <Id Name="System.Storyboarding.Common.TextInput" Revision="1" Stencil="System.Storyboarding.Common" StencilVersion="0.1"/>
 </Control>
 </file>
 
 <file path=customXml/item171.xml><?xml version="1.0" encoding="utf-8"?>
 <Control xmlns="http://schemas.microsoft.com/VisualStudio/2011/storyboarding/control">
-  <Id Name="System.Storyboarding.Common.Button" Revision="1" Stencil="System.Storyboarding.Common" StencilVersion="0.1"/>
+  <Id Name="System.Storyboarding.Common.TextInput" Revision="1" Stencil="System.Storyboarding.Common" StencilVersion="0.1"/>
 </Control>
 </file>
 
@@ -26461,43 +26461,43 @@
 
 <file path=customXml/item173.xml><?xml version="1.0" encoding="utf-8"?>
 <Control xmlns="http://schemas.microsoft.com/VisualStudio/2011/storyboarding/control">
-  <Id Name="System.Storyboarding.Common.Button" Revision="1" Stencil="System.Storyboarding.Common" StencilVersion="0.1"/>
+  <Id Name="System.Storyboarding.Common.CheckBoxChecked" Revision="1" Stencil="System.Storyboarding.Common" StencilVersion="0.1"/>
 </Control>
 </file>
 
 <file path=customXml/item174.xml><?xml version="1.0" encoding="utf-8"?>
 <Control xmlns="http://schemas.microsoft.com/VisualStudio/2011/storyboarding/control">
-  <Id Name="System.Storyboarding.Common.Button" Revision="1" Stencil="System.Storyboarding.Common" StencilVersion="0.1"/>
+  <Id Name="System.Storyboarding.Common.CheckBoxChecked" Revision="1" Stencil="System.Storyboarding.Common" StencilVersion="0.1"/>
 </Control>
 </file>
 
 <file path=customXml/item175.xml><?xml version="1.0" encoding="utf-8"?>
 <Control xmlns="http://schemas.microsoft.com/VisualStudio/2011/storyboarding/control">
-  <Id Name="System.Storyboarding.Common.Button" Revision="1" Stencil="System.Storyboarding.Common" StencilVersion="0.1"/>
+  <Id Name="System.Storyboarding.Common.TextInput" Revision="1" Stencil="System.Storyboarding.Common" StencilVersion="0.1"/>
 </Control>
 </file>
 
 <file path=customXml/item176.xml><?xml version="1.0" encoding="utf-8"?>
 <Control xmlns="http://schemas.microsoft.com/VisualStudio/2011/storyboarding/control">
-  <Id Name="System.Storyboarding.Common.Button" Revision="1" Stencil="System.Storyboarding.Common" StencilVersion="0.1"/>
+  <Id Name="System.Storyboarding.Common.CheckBoxChecked" Revision="1" Stencil="System.Storyboarding.Common" StencilVersion="0.1"/>
 </Control>
 </file>
 
 <file path=customXml/item177.xml><?xml version="1.0" encoding="utf-8"?>
 <Control xmlns="http://schemas.microsoft.com/VisualStudio/2011/storyboarding/control">
-  <Id Name="System.Storyboarding.Common.Button" Revision="1" Stencil="System.Storyboarding.Common" StencilVersion="0.1"/>
+  <Id Name="System.Storyboarding.Common.TextInput" Revision="1" Stencil="System.Storyboarding.Common" StencilVersion="0.1"/>
 </Control>
 </file>
 
 <file path=customXml/item178.xml><?xml version="1.0" encoding="utf-8"?>
 <Control xmlns="http://schemas.microsoft.com/VisualStudio/2011/storyboarding/control">
-  <Id Name="System.Storyboarding.Common.Button" Revision="1" Stencil="System.Storyboarding.Common" StencilVersion="0.1"/>
+  <Id Name="System.Storyboarding.Common.TextInput" Revision="1" Stencil="System.Storyboarding.Common" StencilVersion="0.1"/>
 </Control>
 </file>
 
 <file path=customXml/item179.xml><?xml version="1.0" encoding="utf-8"?>
 <Control xmlns="http://schemas.microsoft.com/VisualStudio/2011/storyboarding/control">
-  <Id Name="System.Storyboarding.Common.Button" Revision="1" Stencil="System.Storyboarding.Common" StencilVersion="0.1"/>
+  <Id Name="System.Storyboarding.Common.TextInput" Revision="1" Stencil="System.Storyboarding.Common" StencilVersion="0.1"/>
 </Control>
 </file>
 
@@ -26509,43 +26509,43 @@
 
 <file path=customXml/item180.xml><?xml version="1.0" encoding="utf-8"?>
 <Control xmlns="http://schemas.microsoft.com/VisualStudio/2011/storyboarding/control">
-  <Id Name="System.Storyboarding.Common.Text" Revision="1" Stencil="System.Storyboarding.Common" StencilVersion="0.1"/>
+  <Id Name="System.Storyboarding.Common.TextInput" Revision="1" Stencil="System.Storyboarding.Common" StencilVersion="0.1"/>
 </Control>
 </file>
 
 <file path=customXml/item181.xml><?xml version="1.0" encoding="utf-8"?>
+<Control xmlns="http://schemas.microsoft.com/VisualStudio/2011/storyboarding/control">
+  <Id Name="System.Storyboarding.Common.TextInput" Revision="1" Stencil="System.Storyboarding.Common" StencilVersion="0.1"/>
+</Control>
+</file>
+
+<file path=customXml/item182.xml><?xml version="1.0" encoding="utf-8"?>
+<Control xmlns="http://schemas.microsoft.com/VisualStudio/2011/storyboarding/control">
+  <Id Name="System.Storyboarding.Common.TextInput" Revision="1" Stencil="System.Storyboarding.Common" StencilVersion="0.1"/>
+</Control>
+</file>
+
+<file path=customXml/item183.xml><?xml version="1.0" encoding="utf-8"?>
+<Control xmlns="http://schemas.microsoft.com/VisualStudio/2011/storyboarding/control">
+  <Id Name="System.Storyboarding.Common.SearchBox" Revision="1" Stencil="System.Storyboarding.Common" StencilVersion="0.1"/>
+</Control>
+</file>
+
+<file path=customXml/item184.xml><?xml version="1.0" encoding="utf-8"?>
+<Control xmlns="http://schemas.microsoft.com/VisualStudio/2011/storyboarding/control">
+  <Id Name="System.Storyboarding.Common.TextInput" Revision="1" Stencil="System.Storyboarding.Common" StencilVersion="0.1"/>
+</Control>
+</file>
+
+<file path=customXml/item185.xml><?xml version="1.0" encoding="utf-8"?>
 <Control xmlns="http://schemas.microsoft.com/VisualStudio/2011/storyboarding/control">
   <Id Name="System.Storyboarding.Common.Button" Revision="1" Stencil="System.Storyboarding.Common" StencilVersion="0.1"/>
 </Control>
 </file>
 
-<file path=customXml/item182.xml><?xml version="1.0" encoding="utf-8"?>
-<Control xmlns="http://schemas.microsoft.com/VisualStudio/2011/storyboarding/control">
-  <Id Name="System.Storyboarding.Common.Button" Revision="1" Stencil="System.Storyboarding.Common" StencilVersion="0.1"/>
-</Control>
-</file>
-
-<file path=customXml/item183.xml><?xml version="1.0" encoding="utf-8"?>
-<Control xmlns="http://schemas.microsoft.com/VisualStudio/2011/storyboarding/control">
-  <Id Name="System.Storyboarding.Common.Text" Revision="1" Stencil="System.Storyboarding.Common" StencilVersion="0.1"/>
-</Control>
-</file>
-
-<file path=customXml/item184.xml><?xml version="1.0" encoding="utf-8"?>
-<Control xmlns="http://schemas.microsoft.com/VisualStudio/2011/storyboarding/control">
-  <Id Name="System.Storyboarding.Common.Button" Revision="1" Stencil="System.Storyboarding.Common" StencilVersion="0.1"/>
-</Control>
-</file>
-
-<file path=customXml/item185.xml><?xml version="1.0" encoding="utf-8"?>
-<Control xmlns="http://schemas.microsoft.com/VisualStudio/2011/storyboarding/control">
-  <Id Name="System.Storyboarding.Common.Text" Revision="1" Stencil="System.Storyboarding.Common" StencilVersion="0.1"/>
-</Control>
-</file>
-
 <file path=customXml/item186.xml><?xml version="1.0" encoding="utf-8"?>
 <Control xmlns="http://schemas.microsoft.com/VisualStudio/2011/storyboarding/control">
-  <Id Name="System.Storyboarding.Common.Button" Revision="1" Stencil="System.Storyboarding.Common" StencilVersion="0.1"/>
+  <Id Name="System.Storyboarding.Common.SearchBox" Revision="1" Stencil="System.Storyboarding.Common" StencilVersion="0.1"/>
 </Control>
 </file>
 
@@ -26557,13 +26557,13 @@
 
 <file path=customXml/item19.xml><?xml version="1.0" encoding="utf-8"?>
 <Control xmlns="http://schemas.microsoft.com/VisualStudio/2011/storyboarding/control">
-  <Id Name="System.Storyboarding.Common.TextInput" Revision="1" Stencil="System.Storyboarding.Common" StencilVersion="0.1"/>
+  <Id Name="System.Storyboarding.Common.CheckBoxChecked" Revision="1" Stencil="System.Storyboarding.Common" StencilVersion="0.1"/>
 </Control>
 </file>
 
 <file path=customXml/item2.xml><?xml version="1.0" encoding="utf-8"?>
 <Control xmlns="http://schemas.microsoft.com/VisualStudio/2011/storyboarding/control">
-  <Id Name="System.Storyboarding.Common.ScrollbarVertical" Revision="1" Stencil="System.Storyboarding.Common" StencilVersion="0.1"/>
+  <Id Name="System.Storyboarding.Common.TextInput" Revision="1" Stencil="System.Storyboarding.Common" StencilVersion="0.1"/>
 </Control>
 </file>
 
@@ -26581,37 +26581,37 @@
 
 <file path=customXml/item22.xml><?xml version="1.0" encoding="utf-8"?>
 <Control xmlns="http://schemas.microsoft.com/VisualStudio/2011/storyboarding/control">
-  <Id Name="System.Storyboarding.Common.TextInput" Revision="1" Stencil="System.Storyboarding.Common" StencilVersion="0.1"/>
+  <Id Name="System.Storyboarding.Common.Text" Revision="1" Stencil="System.Storyboarding.Common" StencilVersion="0.1"/>
 </Control>
 </file>
 
 <file path=customXml/item23.xml><?xml version="1.0" encoding="utf-8"?>
 <Control xmlns="http://schemas.microsoft.com/VisualStudio/2011/storyboarding/control">
-  <Id Name="System.Storyboarding.Common.Text" Revision="1" Stencil="System.Storyboarding.Common" StencilVersion="0.1"/>
+  <Id Name="System.Storyboarding.Common.ScrollbarVertical" Revision="1" Stencil="System.Storyboarding.Common" StencilVersion="0.1"/>
 </Control>
 </file>
 
 <file path=customXml/item24.xml><?xml version="1.0" encoding="utf-8"?>
 <Control xmlns="http://schemas.microsoft.com/VisualStudio/2011/storyboarding/control">
-  <Id Name="System.Storyboarding.Common.Text" Revision="1" Stencil="System.Storyboarding.Common" StencilVersion="0.1"/>
+  <Id Name="System.Storyboarding.Common.ScrollbarVertical" Revision="1" Stencil="System.Storyboarding.Common" StencilVersion="0.1"/>
 </Control>
 </file>
 
 <file path=customXml/item25.xml><?xml version="1.0" encoding="utf-8"?>
+<Control xmlns="http://schemas.microsoft.com/VisualStudio/2011/storyboarding/control">
+  <Id Name="System.Storyboarding.Common.CheckBoxChecked" Revision="1" Stencil="System.Storyboarding.Common" StencilVersion="0.1"/>
+</Control>
+</file>
+
+<file path=customXml/item26.xml><?xml version="1.0" encoding="utf-8"?>
 <Control xmlns="http://schemas.microsoft.com/VisualStudio/2011/storyboarding/control">
   <Id Name="System.Storyboarding.Common.TextInput" Revision="1" Stencil="System.Storyboarding.Common" StencilVersion="0.1"/>
 </Control>
 </file>
 
-<file path=customXml/item26.xml><?xml version="1.0" encoding="utf-8"?>
-<Control xmlns="http://schemas.microsoft.com/VisualStudio/2011/storyboarding/control">
-  <Id Name="System.Storyboarding.Common.Text" Revision="1" Stencil="System.Storyboarding.Common" StencilVersion="0.1"/>
-</Control>
-</file>
-
 <file path=customXml/item27.xml><?xml version="1.0" encoding="utf-8"?>
 <Control xmlns="http://schemas.microsoft.com/VisualStudio/2011/storyboarding/control">
-  <Id Name="System.Storyboarding.Common.CheckBoxUnchecked" Revision="1" Stencil="System.Storyboarding.Common" StencilVersion="0.1"/>
+  <Id Name="System.Storyboarding.Common.TextInput" Revision="1" Stencil="System.Storyboarding.Common" StencilVersion="0.1"/>
 </Control>
 </file>
 
@@ -26623,25 +26623,25 @@
 
 <file path=customXml/item29.xml><?xml version="1.0" encoding="utf-8"?>
 <Control xmlns="http://schemas.microsoft.com/VisualStudio/2011/storyboarding/control">
+  <Id Name="System.Storyboarding.Common.Button" Revision="1" Stencil="System.Storyboarding.Common" StencilVersion="0.1"/>
+</Control>
+</file>
+
+<file path=customXml/item3.xml><?xml version="1.0" encoding="utf-8"?>
+<Control xmlns="http://schemas.microsoft.com/VisualStudio/2011/storyboarding/control">
   <Id Name="System.Storyboarding.Common.TextInput" Revision="1" Stencil="System.Storyboarding.Common" StencilVersion="0.1"/>
 </Control>
 </file>
 
-<file path=customXml/item3.xml><?xml version="1.0" encoding="utf-8"?>
+<file path=customXml/item30.xml><?xml version="1.0" encoding="utf-8"?>
 <Control xmlns="http://schemas.microsoft.com/VisualStudio/2011/storyboarding/control">
   <Id Name="System.Storyboarding.Common.Button" Revision="1" Stencil="System.Storyboarding.Common" StencilVersion="0.1"/>
 </Control>
 </file>
 
-<file path=customXml/item30.xml><?xml version="1.0" encoding="utf-8"?>
-<Control xmlns="http://schemas.microsoft.com/VisualStudio/2011/storyboarding/control">
-  <Id Name="System.Storyboarding.Common.TextInput" Revision="1" Stencil="System.Storyboarding.Common" StencilVersion="0.1"/>
-</Control>
-</file>
-
 <file path=customXml/item31.xml><?xml version="1.0" encoding="utf-8"?>
 <Control xmlns="http://schemas.microsoft.com/VisualStudio/2011/storyboarding/control">
-  <Id Name="System.Storyboarding.Common.TextInput" Revision="1" Stencil="System.Storyboarding.Common" StencilVersion="0.1"/>
+  <Id Name="System.Storyboarding.Common.CheckBoxChecked" Revision="1" Stencil="System.Storyboarding.Common" StencilVersion="0.1"/>
 </Control>
 </file>
 
@@ -26665,25 +26665,25 @@
 
 <file path=customXml/item35.xml><?xml version="1.0" encoding="utf-8"?>
 <Control xmlns="http://schemas.microsoft.com/VisualStudio/2011/storyboarding/control">
-  <Id Name="System.Storyboarding.Common.CheckBoxUnchecked" Revision="1" Stencil="System.Storyboarding.Common" StencilVersion="0.1"/>
+  <Id Name="System.Storyboarding.Common.CheckBoxChecked" Revision="1" Stencil="System.Storyboarding.Common" StencilVersion="0.1"/>
 </Control>
 </file>
 
 <file path=customXml/item36.xml><?xml version="1.0" encoding="utf-8"?>
 <Control xmlns="http://schemas.microsoft.com/VisualStudio/2011/storyboarding/control">
-  <Id Name="System.Storyboarding.Common.CheckBoxChecked" Revision="1" Stencil="System.Storyboarding.Common" StencilVersion="0.1"/>
+  <Id Name="System.Storyboarding.Common.TextInput" Revision="1" Stencil="System.Storyboarding.Common" StencilVersion="0.1"/>
 </Control>
 </file>
 
 <file path=customXml/item37.xml><?xml version="1.0" encoding="utf-8"?>
 <Control xmlns="http://schemas.microsoft.com/VisualStudio/2011/storyboarding/control">
-  <Id Name="System.Storyboarding.Common.CheckBoxChecked" Revision="1" Stencil="System.Storyboarding.Common" StencilVersion="0.1"/>
+  <Id Name="System.Storyboarding.Common.ScrollbarVertical" Revision="1" Stencil="System.Storyboarding.Common" StencilVersion="0.1"/>
 </Control>
 </file>
 
 <file path=customXml/item38.xml><?xml version="1.0" encoding="utf-8"?>
 <Control xmlns="http://schemas.microsoft.com/VisualStudio/2011/storyboarding/control">
-  <Id Name="System.Storyboarding.Common.CheckBoxChecked" Revision="1" Stencil="System.Storyboarding.Common" StencilVersion="0.1"/>
+  <Id Name="System.Storyboarding.Common.SearchBox" Revision="1" Stencil="System.Storyboarding.Common" StencilVersion="0.1"/>
 </Control>
 </file>
 
@@ -26695,19 +26695,19 @@
 
 <file path=customXml/item4.xml><?xml version="1.0" encoding="utf-8"?>
 <Control xmlns="http://schemas.microsoft.com/VisualStudio/2011/storyboarding/control">
-  <Id Name="System.Storyboarding.Common.SearchBox" Revision="1" Stencil="System.Storyboarding.Common" StencilVersion="0.1"/>
+  <Id Name="System.Storyboarding.Common.CheckBoxUnchecked" Revision="1" Stencil="System.Storyboarding.Common" StencilVersion="0.1"/>
 </Control>
 </file>
 
 <file path=customXml/item40.xml><?xml version="1.0" encoding="utf-8"?>
 <Control xmlns="http://schemas.microsoft.com/VisualStudio/2011/storyboarding/control">
-  <Id Name="System.Storyboarding.Common.TextInput" Revision="1" Stencil="System.Storyboarding.Common" StencilVersion="0.1"/>
+  <Id Name="System.Storyboarding.Common.CheckBoxChecked" Revision="1" Stencil="System.Storyboarding.Common" StencilVersion="0.1"/>
 </Control>
 </file>
 
 <file path=customXml/item41.xml><?xml version="1.0" encoding="utf-8"?>
 <Control xmlns="http://schemas.microsoft.com/VisualStudio/2011/storyboarding/control">
-  <Id Name="System.Storyboarding.Common.Button" Revision="1" Stencil="System.Storyboarding.Common" StencilVersion="0.1"/>
+  <Id Name="System.Storyboarding.Common.TextInput" Revision="1" Stencil="System.Storyboarding.Common" StencilVersion="0.1"/>
 </Control>
 </file>
 
@@ -26725,19 +26725,19 @@
 
 <file path=customXml/item44.xml><?xml version="1.0" encoding="utf-8"?>
 <Control xmlns="http://schemas.microsoft.com/VisualStudio/2011/storyboarding/control">
-  <Id Name="System.Storyboarding.Common.CheckBoxChecked" Revision="1" Stencil="System.Storyboarding.Common" StencilVersion="0.1"/>
+  <Id Name="System.Storyboarding.Common.TextInput" Revision="1" Stencil="System.Storyboarding.Common" StencilVersion="0.1"/>
 </Control>
 </file>
 
 <file path=customXml/item45.xml><?xml version="1.0" encoding="utf-8"?>
 <Control xmlns="http://schemas.microsoft.com/VisualStudio/2011/storyboarding/control">
-  <Id Name="System.Storyboarding.Common.TextInput" Revision="1" Stencil="System.Storyboarding.Common" StencilVersion="0.1"/>
+  <Id Name="System.Storyboarding.Common.Text" Revision="1" Stencil="System.Storyboarding.Common" StencilVersion="0.1"/>
 </Control>
 </file>
 
 <file path=customXml/item46.xml><?xml version="1.0" encoding="utf-8"?>
 <Control xmlns="http://schemas.microsoft.com/VisualStudio/2011/storyboarding/control">
-  <Id Name="System.Storyboarding.Common.Button" Revision="1" Stencil="System.Storyboarding.Common" StencilVersion="0.1"/>
+  <Id Name="System.Storyboarding.Common.CheckBoxUnchecked" Revision="1" Stencil="System.Storyboarding.Common" StencilVersion="0.1"/>
 </Control>
 </file>
 
@@ -26755,7 +26755,7 @@
 
 <file path=customXml/item49.xml><?xml version="1.0" encoding="utf-8"?>
 <Control xmlns="http://schemas.microsoft.com/VisualStudio/2011/storyboarding/control">
-  <Id Name="System.Storyboarding.Common.ScrollbarVertical" Revision="1" Stencil="System.Storyboarding.Common" StencilVersion="0.1"/>
+  <Id Name="System.Storyboarding.Common.Button" Revision="1" Stencil="System.Storyboarding.Common" StencilVersion="0.1"/>
 </Control>
 </file>
 
@@ -26767,13 +26767,13 @@
 
 <file path=customXml/item50.xml><?xml version="1.0" encoding="utf-8"?>
 <Control xmlns="http://schemas.microsoft.com/VisualStudio/2011/storyboarding/control">
-  <Id Name="System.Storyboarding.Icons.Warning" Revision="1" Stencil="System.Storyboarding.Icons" StencilVersion="0.1"/>
+  <Id Name="System.Storyboarding.Common.Button" Revision="1" Stencil="System.Storyboarding.Common" StencilVersion="0.1"/>
 </Control>
 </file>
 
 <file path=customXml/item51.xml><?xml version="1.0" encoding="utf-8"?>
 <Control xmlns="http://schemas.microsoft.com/VisualStudio/2011/storyboarding/control">
-  <Id Name="System.Storyboarding.Common.CheckBoxChecked" Revision="1" Stencil="System.Storyboarding.Common" StencilVersion="0.1"/>
+  <Id Name="System.Storyboarding.Common.TextInput" Revision="1" Stencil="System.Storyboarding.Common" StencilVersion="0.1"/>
 </Control>
 </file>
 
@@ -26785,49 +26785,49 @@
 
 <file path=customXml/item53.xml><?xml version="1.0" encoding="utf-8"?>
 <Control xmlns="http://schemas.microsoft.com/VisualStudio/2011/storyboarding/control">
-  <Id Name="System.Storyboarding.Common.CheckBoxUnchecked" Revision="1" Stencil="System.Storyboarding.Common" StencilVersion="0.1"/>
+  <Id Name="System.Storyboarding.Common.Text" Revision="1" Stencil="System.Storyboarding.Common" StencilVersion="0.1"/>
 </Control>
 </file>
 
 <file path=customXml/item54.xml><?xml version="1.0" encoding="utf-8"?>
+<Control xmlns="http://schemas.microsoft.com/VisualStudio/2011/storyboarding/control">
+  <Id Name="System.Storyboarding.Common.TextInput" Revision="1" Stencil="System.Storyboarding.Common" StencilVersion="0.1"/>
+</Control>
+</file>
+
+<file path=customXml/item55.xml><?xml version="1.0" encoding="utf-8"?>
+<Control xmlns="http://schemas.microsoft.com/VisualStudio/2011/storyboarding/control">
+  <Id Name="System.Storyboarding.Common.ScrollbarVertical" Revision="1" Stencil="System.Storyboarding.Common" StencilVersion="0.1"/>
+</Control>
+</file>
+
+<file path=customXml/item56.xml><?xml version="1.0" encoding="utf-8"?>
 <Control xmlns="http://schemas.microsoft.com/VisualStudio/2011/storyboarding/control">
   <Id Name="System.Storyboarding.Common.CheckBoxChecked" Revision="1" Stencil="System.Storyboarding.Common" StencilVersion="0.1"/>
 </Control>
 </file>
 
-<file path=customXml/item55.xml><?xml version="1.0" encoding="utf-8"?>
-<Control xmlns="http://schemas.microsoft.com/VisualStudio/2011/storyboarding/control">
-  <Id Name="System.Storyboarding.Media.PieChart" Revision="1" Stencil="System.Storyboarding.Media" StencilVersion="0.1"/>
-</Control>
-</file>
-
-<file path=customXml/item56.xml><?xml version="1.0" encoding="utf-8"?>
+<file path=customXml/item57.xml><?xml version="1.0" encoding="utf-8"?>
 <Control xmlns="http://schemas.microsoft.com/VisualStudio/2011/storyboarding/control">
   <Id Name="System.Storyboarding.Common.ScrollbarVertical" Revision="1" Stencil="System.Storyboarding.Common" StencilVersion="0.1"/>
 </Control>
 </file>
 
-<file path=customXml/item57.xml><?xml version="1.0" encoding="utf-8"?>
+<file path=customXml/item58.xml><?xml version="1.0" encoding="utf-8"?>
+<Control xmlns="http://schemas.microsoft.com/VisualStudio/2011/storyboarding/control">
+  <Id Name="System.Storyboarding.Common.CheckBoxChecked" Revision="1" Stencil="System.Storyboarding.Common" StencilVersion="0.1"/>
+</Control>
+</file>
+
+<file path=customXml/item59.xml><?xml version="1.0" encoding="utf-8"?>
 <Control xmlns="http://schemas.microsoft.com/VisualStudio/2011/storyboarding/control">
   <Id Name="System.Storyboarding.Common.TextInput" Revision="1" Stencil="System.Storyboarding.Common" StencilVersion="0.1"/>
 </Control>
 </file>
 
-<file path=customXml/item58.xml><?xml version="1.0" encoding="utf-8"?>
-<Control xmlns="http://schemas.microsoft.com/VisualStudio/2011/storyboarding/control">
-  <Id Name="System.Storyboarding.Common.TextInput" Revision="1" Stencil="System.Storyboarding.Common" StencilVersion="0.1"/>
-</Control>
-</file>
-
-<file path=customXml/item59.xml><?xml version="1.0" encoding="utf-8"?>
-<Control xmlns="http://schemas.microsoft.com/VisualStudio/2011/storyboarding/control">
-  <Id Name="System.Storyboarding.Common.CheckBoxChecked" Revision="1" Stencil="System.Storyboarding.Common" StencilVersion="0.1"/>
-</Control>
-</file>
-
 <file path=customXml/item6.xml><?xml version="1.0" encoding="utf-8"?>
 <Control xmlns="http://schemas.microsoft.com/VisualStudio/2011/storyboarding/control">
-  <Id Name="System.Storyboarding.Common.TextInput" Revision="1" Stencil="System.Storyboarding.Common" StencilVersion="0.1"/>
+  <Id Name="System.Storyboarding.WindowsAppIcons.Check" Revision="1" Stencil="System.Storyboarding.WindowsAppIcons" StencilVersion="0.1"/>
 </Control>
 </file>
 
@@ -26839,25 +26839,25 @@
 
 <file path=customXml/item61.xml><?xml version="1.0" encoding="utf-8"?>
 <Control xmlns="http://schemas.microsoft.com/VisualStudio/2011/storyboarding/control">
-  <Id Name="System.Storyboarding.Common.TextInput" Revision="1" Stencil="System.Storyboarding.Common" StencilVersion="0.1"/>
+  <Id Name="System.Storyboarding.Common.Text" Revision="1" Stencil="System.Storyboarding.Common" StencilVersion="0.1"/>
 </Control>
 </file>
 
 <file path=customXml/item62.xml><?xml version="1.0" encoding="utf-8"?>
 <Control xmlns="http://schemas.microsoft.com/VisualStudio/2011/storyboarding/control">
-  <Id Name="System.Storyboarding.Common.TextInput" Revision="1" Stencil="System.Storyboarding.Common" StencilVersion="0.1"/>
+  <Id Name="System.Storyboarding.Media.VerticalBarChart" Revision="1" Stencil="System.Storyboarding.Media" StencilVersion="0.1"/>
 </Control>
 </file>
 
 <file path=customXml/item63.xml><?xml version="1.0" encoding="utf-8"?>
 <Control xmlns="http://schemas.microsoft.com/VisualStudio/2011/storyboarding/control">
-  <Id Name="System.Storyboarding.Common.SearchBox" Revision="1" Stencil="System.Storyboarding.Common" StencilVersion="0.1"/>
+  <Id Name="System.Storyboarding.Common.Button" Revision="1" Stencil="System.Storyboarding.Common" StencilVersion="0.1"/>
 </Control>
 </file>
 
 <file path=customXml/item64.xml><?xml version="1.0" encoding="utf-8"?>
 <Control xmlns="http://schemas.microsoft.com/VisualStudio/2011/storyboarding/control">
-  <Id Name="System.Storyboarding.Common.CheckBoxChecked" Revision="1" Stencil="System.Storyboarding.Common" StencilVersion="0.1"/>
+  <Id Name="System.Storyboarding.Common.TextInput" Revision="1" Stencil="System.Storyboarding.Common" StencilVersion="0.1"/>
 </Control>
 </file>
 
@@ -26869,19 +26869,19 @@
 
 <file path=customXml/item66.xml><?xml version="1.0" encoding="utf-8"?>
 <Control xmlns="http://schemas.microsoft.com/VisualStudio/2011/storyboarding/control">
-  <Id Name="System.Storyboarding.Common.TextInput" Revision="1" Stencil="System.Storyboarding.Common" StencilVersion="0.1"/>
+  <Id Name="System.Storyboarding.Common.Text" Revision="1" Stencil="System.Storyboarding.Common" StencilVersion="0.1"/>
 </Control>
 </file>
 
 <file path=customXml/item67.xml><?xml version="1.0" encoding="utf-8"?>
 <Control xmlns="http://schemas.microsoft.com/VisualStudio/2011/storyboarding/control">
-  <Id Name="System.Storyboarding.Backgrounds.WebBrowser" Revision="1" Stencil="System.Storyboarding.Backgrounds" StencilVersion="0.1"/>
+  <Id Name="System.Storyboarding.Common.Button" Revision="1" Stencil="System.Storyboarding.Common" StencilVersion="0.1"/>
 </Control>
 </file>
 
 <file path=customXml/item68.xml><?xml version="1.0" encoding="utf-8"?>
 <Control xmlns="http://schemas.microsoft.com/VisualStudio/2011/storyboarding/control">
-  <Id Name="System.Storyboarding.Common.TextInput" Revision="1" Stencil="System.Storyboarding.Common" StencilVersion="0.1"/>
+  <Id Name="System.Storyboarding.Common.Button" Revision="1" Stencil="System.Storyboarding.Common" StencilVersion="0.1"/>
 </Control>
 </file>
 
@@ -26893,7 +26893,7 @@
 
 <file path=customXml/item7.xml><?xml version="1.0" encoding="utf-8"?>
 <Control xmlns="http://schemas.microsoft.com/VisualStudio/2011/storyboarding/control">
-  <Id Name="System.Storyboarding.Common.Button" Revision="1" Stencil="System.Storyboarding.Common" StencilVersion="0.1"/>
+  <Id Name="System.Storyboarding.Backgrounds.WebBrowser" Revision="1" Stencil="System.Storyboarding.Backgrounds" StencilVersion="0.1"/>
 </Control>
 </file>
 
@@ -26905,7 +26905,7 @@
 
 <file path=customXml/item71.xml><?xml version="1.0" encoding="utf-8"?>
 <Control xmlns="http://schemas.microsoft.com/VisualStudio/2011/storyboarding/control">
-  <Id Name="System.Storyboarding.Annotation.StickyNote" Revision="1" Stencil="System.Storyboarding.Annotation" StencilVersion="0.1"/>
+  <Id Name="System.Storyboarding.Common.TextInput" Revision="1" Stencil="System.Storyboarding.Common" StencilVersion="0.1"/>
 </Control>
 </file>
 
@@ -26923,13 +26923,13 @@
 
 <file path=customXml/item74.xml><?xml version="1.0" encoding="utf-8"?>
 <Control xmlns="http://schemas.microsoft.com/VisualStudio/2011/storyboarding/control">
-  <Id Name="System.Storyboarding.Common.TextInput" Revision="1" Stencil="System.Storyboarding.Common" StencilVersion="0.1"/>
+  <Id Name="System.Storyboarding.Icons.Warning" Revision="1" Stencil="System.Storyboarding.Icons" StencilVersion="0.1"/>
 </Control>
 </file>
 
 <file path=customXml/item75.xml><?xml version="1.0" encoding="utf-8"?>
 <Control xmlns="http://schemas.microsoft.com/VisualStudio/2011/storyboarding/control">
-  <Id Name="System.Storyboarding.Common.TextInput" Revision="1" Stencil="System.Storyboarding.Common" StencilVersion="0.1"/>
+  <Id Name="System.Storyboarding.Media.PieChart" Revision="1" Stencil="System.Storyboarding.Media" StencilVersion="0.1"/>
 </Control>
 </file>
 
@@ -26953,7 +26953,7 @@
 
 <file path=customXml/item79.xml><?xml version="1.0" encoding="utf-8"?>
 <Control xmlns="http://schemas.microsoft.com/VisualStudio/2011/storyboarding/control">
-  <Id Name="System.Storyboarding.Common.CheckBoxChecked" Revision="1" Stencil="System.Storyboarding.Common" StencilVersion="0.1"/>
+  <Id Name="System.Storyboarding.Common.Button" Revision="1" Stencil="System.Storyboarding.Common" StencilVersion="0.1"/>
 </Control>
 </file>
 
@@ -26965,13 +26965,13 @@
 
 <file path=customXml/item80.xml><?xml version="1.0" encoding="utf-8"?>
 <Control xmlns="http://schemas.microsoft.com/VisualStudio/2011/storyboarding/control">
-  <Id Name="System.Storyboarding.Common.CheckBoxChecked" Revision="1" Stencil="System.Storyboarding.Common" StencilVersion="0.1"/>
+  <Id Name="System.Storyboarding.Common.TextInput" Revision="1" Stencil="System.Storyboarding.Common" StencilVersion="0.1"/>
 </Control>
 </file>
 
 <file path=customXml/item81.xml><?xml version="1.0" encoding="utf-8"?>
 <Control xmlns="http://schemas.microsoft.com/VisualStudio/2011/storyboarding/control">
-  <Id Name="System.Storyboarding.Common.Text" Revision="1" Stencil="System.Storyboarding.Common" StencilVersion="0.1"/>
+  <Id Name="System.Storyboarding.Common.CheckBoxChecked" Revision="1" Stencil="System.Storyboarding.Common" StencilVersion="0.1"/>
 </Control>
 </file>
 
@@ -26983,73 +26983,73 @@
 
 <file path=customXml/item83.xml><?xml version="1.0" encoding="utf-8"?>
 <Control xmlns="http://schemas.microsoft.com/VisualStudio/2011/storyboarding/control">
-  <Id Name="System.Storyboarding.Common.CheckBoxChecked" Revision="1" Stencil="System.Storyboarding.Common" StencilVersion="0.1"/>
+  <Id Name="System.Storyboarding.Common.TextInput" Revision="1" Stencil="System.Storyboarding.Common" StencilVersion="0.1"/>
 </Control>
 </file>
 
 <file path=customXml/item84.xml><?xml version="1.0" encoding="utf-8"?>
+<Control xmlns="http://schemas.microsoft.com/VisualStudio/2011/storyboarding/control">
+  <Id Name="System.Storyboarding.Common.Button" Revision="1" Stencil="System.Storyboarding.Common" StencilVersion="0.1"/>
+</Control>
+</file>
+
+<file path=customXml/item85.xml><?xml version="1.0" encoding="utf-8"?>
+<Control xmlns="http://schemas.microsoft.com/VisualStudio/2011/storyboarding/control">
+  <Id Name="System.Storyboarding.Annotation.StickyNote" Revision="1" Stencil="System.Storyboarding.Annotation" StencilVersion="0.1"/>
+</Control>
+</file>
+
+<file path=customXml/item86.xml><?xml version="1.0" encoding="utf-8"?>
+<Control xmlns="http://schemas.microsoft.com/VisualStudio/2011/storyboarding/control">
+  <Id Name="System.Storyboarding.Common.ScrollbarVertical" Revision="1" Stencil="System.Storyboarding.Common" StencilVersion="0.1"/>
+</Control>
+</file>
+
+<file path=customXml/item87.xml><?xml version="1.0" encoding="utf-8"?>
+<Control xmlns="http://schemas.microsoft.com/VisualStudio/2011/storyboarding/control">
+  <Id Name="System.Storyboarding.Common.SearchBox" Revision="1" Stencil="System.Storyboarding.Common" StencilVersion="0.1"/>
+</Control>
+</file>
+
+<file path=customXml/item88.xml><?xml version="1.0" encoding="utf-8"?>
+<Control xmlns="http://schemas.microsoft.com/VisualStudio/2011/storyboarding/control">
+  <Id Name="System.Storyboarding.Common.Text" Revision="1" Stencil="System.Storyboarding.Common" StencilVersion="0.1"/>
+</Control>
+</file>
+
+<file path=customXml/item89.xml><?xml version="1.0" encoding="utf-8"?>
+<Control xmlns="http://schemas.microsoft.com/VisualStudio/2011/storyboarding/control">
+  <Id Name="System.Storyboarding.Common.ScrollbarVertical" Revision="1" Stencil="System.Storyboarding.Common" StencilVersion="0.1"/>
+</Control>
+</file>
+
+<file path=customXml/item9.xml><?xml version="1.0" encoding="utf-8"?>
+<Control xmlns="http://schemas.microsoft.com/VisualStudio/2011/storyboarding/control">
+  <Id Name="System.Storyboarding.Icons.Warning" Revision="1" Stencil="System.Storyboarding.Icons" StencilVersion="0.1"/>
+</Control>
+</file>
+
+<file path=customXml/item90.xml><?xml version="1.0" encoding="utf-8"?>
 <Control xmlns="http://schemas.microsoft.com/VisualStudio/2011/storyboarding/control">
   <Id Name="System.Storyboarding.Common.TextInput" Revision="1" Stencil="System.Storyboarding.Common" StencilVersion="0.1"/>
 </Control>
 </file>
 
-<file path=customXml/item85.xml><?xml version="1.0" encoding="utf-8"?>
+<file path=customXml/item91.xml><?xml version="1.0" encoding="utf-8"?>
+<Control xmlns="http://schemas.microsoft.com/VisualStudio/2011/storyboarding/control">
+  <Id Name="System.Storyboarding.Common.Text" Revision="1" Stencil="System.Storyboarding.Common" StencilVersion="0.1"/>
+</Control>
+</file>
+
+<file path=customXml/item92.xml><?xml version="1.0" encoding="utf-8"?>
 <Control xmlns="http://schemas.microsoft.com/VisualStudio/2011/storyboarding/control">
   <Id Name="System.Storyboarding.Common.TextInput" Revision="1" Stencil="System.Storyboarding.Common" StencilVersion="0.1"/>
 </Control>
 </file>
 
-<file path=customXml/item86.xml><?xml version="1.0" encoding="utf-8"?>
-<Control xmlns="http://schemas.microsoft.com/VisualStudio/2011/storyboarding/control">
-  <Id Name="System.Storyboarding.Media.VerticalBarChart" Revision="1" Stencil="System.Storyboarding.Media" StencilVersion="0.1"/>
-</Control>
-</file>
-
-<file path=customXml/item87.xml><?xml version="1.0" encoding="utf-8"?>
-<Control xmlns="http://schemas.microsoft.com/VisualStudio/2011/storyboarding/control">
-  <Id Name="System.Storyboarding.Common.Button" Revision="1" Stencil="System.Storyboarding.Common" StencilVersion="0.1"/>
-</Control>
-</file>
-
-<file path=customXml/item88.xml><?xml version="1.0" encoding="utf-8"?>
+<file path=customXml/item93.xml><?xml version="1.0" encoding="utf-8"?>
 <Control xmlns="http://schemas.microsoft.com/VisualStudio/2011/storyboarding/control">
   <Id Name="System.Storyboarding.Common.TextInput" Revision="1" Stencil="System.Storyboarding.Common" StencilVersion="0.1"/>
-</Control>
-</file>
-
-<file path=customXml/item89.xml><?xml version="1.0" encoding="utf-8"?>
-<Control xmlns="http://schemas.microsoft.com/VisualStudio/2011/storyboarding/control">
-  <Id Name="System.Storyboarding.Common.TextInput" Revision="1" Stencil="System.Storyboarding.Common" StencilVersion="0.1"/>
-</Control>
-</file>
-
-<file path=customXml/item9.xml><?xml version="1.0" encoding="utf-8"?>
-<Control xmlns="http://schemas.microsoft.com/VisualStudio/2011/storyboarding/control">
-  <Id Name="System.Storyboarding.Common.TextInput" Revision="1" Stencil="System.Storyboarding.Common" StencilVersion="0.1"/>
-</Control>
-</file>
-
-<file path=customXml/item90.xml><?xml version="1.0" encoding="utf-8"?>
-<Control xmlns="http://schemas.microsoft.com/VisualStudio/2011/storyboarding/control">
-  <Id Name="System.Storyboarding.Icons.Warning" Revision="1" Stencil="System.Storyboarding.Icons" StencilVersion="0.1"/>
-</Control>
-</file>
-
-<file path=customXml/item91.xml><?xml version="1.0" encoding="utf-8"?>
-<Control xmlns="http://schemas.microsoft.com/VisualStudio/2011/storyboarding/control">
-  <Id Name="System.Storyboarding.Common.TextInput" Revision="1" Stencil="System.Storyboarding.Common" StencilVersion="0.1"/>
-</Control>
-</file>
-
-<file path=customXml/item92.xml><?xml version="1.0" encoding="utf-8"?>
-<Control xmlns="http://schemas.microsoft.com/VisualStudio/2011/storyboarding/control">
-  <Id Name="System.Storyboarding.Common.ScrollbarVertical" Revision="1" Stencil="System.Storyboarding.Common" StencilVersion="0.1"/>
-</Control>
-</file>
-
-<file path=customXml/item93.xml><?xml version="1.0" encoding="utf-8"?>
-<Control xmlns="http://schemas.microsoft.com/VisualStudio/2011/storyboarding/control">
-  <Id Name="System.Storyboarding.Annotation.StickyNote" Revision="1" Stencil="System.Storyboarding.Annotation" StencilVersion="0.1"/>
 </Control>
 </file>
 
@@ -27061,13 +27061,13 @@
 
 <file path=customXml/item95.xml><?xml version="1.0" encoding="utf-8"?>
 <Control xmlns="http://schemas.microsoft.com/VisualStudio/2011/storyboarding/control">
-  <Id Name="System.Storyboarding.Common.TextInput" Revision="1" Stencil="System.Storyboarding.Common" StencilVersion="0.1"/>
+  <Id Name="System.Storyboarding.Common.Button" Revision="1" Stencil="System.Storyboarding.Common" StencilVersion="0.1"/>
 </Control>
 </file>
 
 <file path=customXml/item96.xml><?xml version="1.0" encoding="utf-8"?>
 <Control xmlns="http://schemas.microsoft.com/VisualStudio/2011/storyboarding/control">
-  <Id Name="System.Storyboarding.Common.TextInput" Revision="1" Stencil="System.Storyboarding.Common" StencilVersion="0.1"/>
+  <Id Name="System.Storyboarding.Common.CheckBoxUnchecked" Revision="1" Stencil="System.Storyboarding.Common" StencilVersion="0.1"/>
 </Control>
 </file>
 
@@ -27079,18 +27079,18 @@
 
 <file path=customXml/item98.xml><?xml version="1.0" encoding="utf-8"?>
 <Control xmlns="http://schemas.microsoft.com/VisualStudio/2011/storyboarding/control">
-  <Id Name="System.Storyboarding.Common.TextInput" Revision="1" Stencil="System.Storyboarding.Common" StencilVersion="0.1"/>
+  <Id Name="System.Storyboarding.Annotation.StickyNote" Revision="1" Stencil="System.Storyboarding.Annotation" StencilVersion="0.1"/>
 </Control>
 </file>
 
 <file path=customXml/item99.xml><?xml version="1.0" encoding="utf-8"?>
 <Control xmlns="http://schemas.microsoft.com/VisualStudio/2011/storyboarding/control">
-  <Id Name="System.Storyboarding.Common.CheckBoxUnchecked" Revision="1" Stencil="System.Storyboarding.Common" StencilVersion="0.1"/>
+  <Id Name="System.Storyboarding.Common.Text" Revision="1" Stencil="System.Storyboarding.Common" StencilVersion="0.1"/>
 </Control>
 </file>
 
 <file path=customXml/itemProps1.xml><?xml version="1.0" encoding="utf-8"?>
-<ds:datastoreItem xmlns:ds="http://schemas.openxmlformats.org/officeDocument/2006/customXml" ds:itemID="{A1C8479A-2384-424B-B607-91A9FC70F6A4}">
+<ds:datastoreItem xmlns:ds="http://schemas.openxmlformats.org/officeDocument/2006/customXml" ds:itemID="{7EA327E3-FCFB-4008-8DED-CE47F66639FD}">
   <ds:schemaRefs>
     <ds:schemaRef ds:uri="http://schemas.microsoft.com/VisualStudio/2011/storyboarding/control"/>
   </ds:schemaRefs>
@@ -27098,6 +27098,430 @@
 </file>
 
 <file path=customXml/itemProps10.xml><?xml version="1.0" encoding="utf-8"?>
+<ds:datastoreItem xmlns:ds="http://schemas.openxmlformats.org/officeDocument/2006/customXml" ds:itemID="{451A7426-E19E-4AAF-BFD2-F92A9C112E84}">
+  <ds:schemaRefs>
+    <ds:schemaRef ds:uri="http://schemas.microsoft.com/VisualStudio/2011/storyboarding/control"/>
+  </ds:schemaRefs>
+</ds:datastoreItem>
+</file>
+
+<file path=customXml/itemProps100.xml><?xml version="1.0" encoding="utf-8"?>
+<ds:datastoreItem xmlns:ds="http://schemas.openxmlformats.org/officeDocument/2006/customXml" ds:itemID="{C05A56CC-DCFE-4A97-B103-5E1633E28254}">
+  <ds:schemaRefs>
+    <ds:schemaRef ds:uri="http://schemas.microsoft.com/VisualStudio/2011/storyboarding/control"/>
+  </ds:schemaRefs>
+</ds:datastoreItem>
+</file>
+
+<file path=customXml/itemProps101.xml><?xml version="1.0" encoding="utf-8"?>
+<ds:datastoreItem xmlns:ds="http://schemas.openxmlformats.org/officeDocument/2006/customXml" ds:itemID="{39B4EC38-E361-46E0-8D00-ECAF682C5ACD}">
+  <ds:schemaRefs>
+    <ds:schemaRef ds:uri="http://schemas.microsoft.com/VisualStudio/2011/storyboarding/control"/>
+  </ds:schemaRefs>
+</ds:datastoreItem>
+</file>
+
+<file path=customXml/itemProps102.xml><?xml version="1.0" encoding="utf-8"?>
+<ds:datastoreItem xmlns:ds="http://schemas.openxmlformats.org/officeDocument/2006/customXml" ds:itemID="{654CBC2D-27EC-43DB-ABA4-3FBDF37D3735}">
+  <ds:schemaRefs>
+    <ds:schemaRef ds:uri="http://schemas.microsoft.com/VisualStudio/2011/storyboarding/control"/>
+  </ds:schemaRefs>
+</ds:datastoreItem>
+</file>
+
+<file path=customXml/itemProps103.xml><?xml version="1.0" encoding="utf-8"?>
+<ds:datastoreItem xmlns:ds="http://schemas.openxmlformats.org/officeDocument/2006/customXml" ds:itemID="{8E111B87-A381-46AA-BB11-318F8ACB4BCA}">
+  <ds:schemaRefs>
+    <ds:schemaRef ds:uri="http://schemas.microsoft.com/VisualStudio/2011/storyboarding/control"/>
+  </ds:schemaRefs>
+</ds:datastoreItem>
+</file>
+
+<file path=customXml/itemProps104.xml><?xml version="1.0" encoding="utf-8"?>
+<ds:datastoreItem xmlns:ds="http://schemas.openxmlformats.org/officeDocument/2006/customXml" ds:itemID="{161C1280-5A04-4E6E-8FE3-21E316A51B59}">
+  <ds:schemaRefs>
+    <ds:schemaRef ds:uri="http://schemas.microsoft.com/VisualStudio/2011/storyboarding/control"/>
+  </ds:schemaRefs>
+</ds:datastoreItem>
+</file>
+
+<file path=customXml/itemProps105.xml><?xml version="1.0" encoding="utf-8"?>
+<ds:datastoreItem xmlns:ds="http://schemas.openxmlformats.org/officeDocument/2006/customXml" ds:itemID="{478663F0-6D22-40DF-A721-0D85AF0A841E}">
+  <ds:schemaRefs>
+    <ds:schemaRef ds:uri="http://schemas.microsoft.com/VisualStudio/2011/storyboarding/control"/>
+  </ds:schemaRefs>
+</ds:datastoreItem>
+</file>
+
+<file path=customXml/itemProps106.xml><?xml version="1.0" encoding="utf-8"?>
+<ds:datastoreItem xmlns:ds="http://schemas.openxmlformats.org/officeDocument/2006/customXml" ds:itemID="{BDF653D0-0803-4E4F-AB2B-0C004B440C9C}">
+  <ds:schemaRefs>
+    <ds:schemaRef ds:uri="http://schemas.microsoft.com/VisualStudio/2011/storyboarding/control"/>
+  </ds:schemaRefs>
+</ds:datastoreItem>
+</file>
+
+<file path=customXml/itemProps107.xml><?xml version="1.0" encoding="utf-8"?>
+<ds:datastoreItem xmlns:ds="http://schemas.openxmlformats.org/officeDocument/2006/customXml" ds:itemID="{AF61DBC6-381C-43BF-8974-1BD37D61B73F}">
+  <ds:schemaRefs>
+    <ds:schemaRef ds:uri="http://schemas.microsoft.com/VisualStudio/2011/storyboarding/control"/>
+  </ds:schemaRefs>
+</ds:datastoreItem>
+</file>
+
+<file path=customXml/itemProps108.xml><?xml version="1.0" encoding="utf-8"?>
+<ds:datastoreItem xmlns:ds="http://schemas.openxmlformats.org/officeDocument/2006/customXml" ds:itemID="{318A67F4-7454-49D3-B5F7-EDF3AEE6B3CC}">
+  <ds:schemaRefs>
+    <ds:schemaRef ds:uri="http://schemas.microsoft.com/VisualStudio/2011/storyboarding/control"/>
+  </ds:schemaRefs>
+</ds:datastoreItem>
+</file>
+
+<file path=customXml/itemProps109.xml><?xml version="1.0" encoding="utf-8"?>
+<ds:datastoreItem xmlns:ds="http://schemas.openxmlformats.org/officeDocument/2006/customXml" ds:itemID="{48F85951-6571-4AA7-9B26-EEF9CD4B541F}">
+  <ds:schemaRefs>
+    <ds:schemaRef ds:uri="http://schemas.microsoft.com/VisualStudio/2011/storyboarding/control"/>
+  </ds:schemaRefs>
+</ds:datastoreItem>
+</file>
+
+<file path=customXml/itemProps11.xml><?xml version="1.0" encoding="utf-8"?>
+<ds:datastoreItem xmlns:ds="http://schemas.openxmlformats.org/officeDocument/2006/customXml" ds:itemID="{DAF42908-C10A-4B0A-BD53-0A9168593350}">
+  <ds:schemaRefs>
+    <ds:schemaRef ds:uri="http://schemas.microsoft.com/VisualStudio/2011/storyboarding/control"/>
+  </ds:schemaRefs>
+</ds:datastoreItem>
+</file>
+
+<file path=customXml/itemProps110.xml><?xml version="1.0" encoding="utf-8"?>
+<ds:datastoreItem xmlns:ds="http://schemas.openxmlformats.org/officeDocument/2006/customXml" ds:itemID="{D2FE2441-F4F4-4DD2-A086-4A7D71862FD9}">
+  <ds:schemaRefs>
+    <ds:schemaRef ds:uri="http://schemas.microsoft.com/VisualStudio/2011/storyboarding/control"/>
+  </ds:schemaRefs>
+</ds:datastoreItem>
+</file>
+
+<file path=customXml/itemProps111.xml><?xml version="1.0" encoding="utf-8"?>
+<ds:datastoreItem xmlns:ds="http://schemas.openxmlformats.org/officeDocument/2006/customXml" ds:itemID="{D12E1D60-E53D-431F-ABC8-B98207B7D1E6}">
+  <ds:schemaRefs>
+    <ds:schemaRef ds:uri="http://schemas.microsoft.com/VisualStudio/2011/storyboarding/control"/>
+  </ds:schemaRefs>
+</ds:datastoreItem>
+</file>
+
+<file path=customXml/itemProps112.xml><?xml version="1.0" encoding="utf-8"?>
+<ds:datastoreItem xmlns:ds="http://schemas.openxmlformats.org/officeDocument/2006/customXml" ds:itemID="{508FF8A2-065C-4CBB-812E-6E03CA0DD0BA}">
+  <ds:schemaRefs>
+    <ds:schemaRef ds:uri="http://schemas.microsoft.com/VisualStudio/2011/storyboarding/control"/>
+  </ds:schemaRefs>
+</ds:datastoreItem>
+</file>
+
+<file path=customXml/itemProps113.xml><?xml version="1.0" encoding="utf-8"?>
+<ds:datastoreItem xmlns:ds="http://schemas.openxmlformats.org/officeDocument/2006/customXml" ds:itemID="{A41DC63A-40F8-492D-A1AF-3E8E88975D17}">
+  <ds:schemaRefs>
+    <ds:schemaRef ds:uri="http://schemas.microsoft.com/VisualStudio/2011/storyboarding/control"/>
+  </ds:schemaRefs>
+</ds:datastoreItem>
+</file>
+
+<file path=customXml/itemProps114.xml><?xml version="1.0" encoding="utf-8"?>
+<ds:datastoreItem xmlns:ds="http://schemas.openxmlformats.org/officeDocument/2006/customXml" ds:itemID="{CABD2B3A-1161-43E2-BA83-58E6B897C9BF}">
+  <ds:schemaRefs>
+    <ds:schemaRef ds:uri="http://schemas.microsoft.com/VisualStudio/2011/storyboarding/control"/>
+  </ds:schemaRefs>
+</ds:datastoreItem>
+</file>
+
+<file path=customXml/itemProps115.xml><?xml version="1.0" encoding="utf-8"?>
+<ds:datastoreItem xmlns:ds="http://schemas.openxmlformats.org/officeDocument/2006/customXml" ds:itemID="{A5548825-A252-43B9-8E93-D05CC009ABBE}">
+  <ds:schemaRefs>
+    <ds:schemaRef ds:uri="http://schemas.microsoft.com/VisualStudio/2011/storyboarding/control"/>
+  </ds:schemaRefs>
+</ds:datastoreItem>
+</file>
+
+<file path=customXml/itemProps116.xml><?xml version="1.0" encoding="utf-8"?>
+<ds:datastoreItem xmlns:ds="http://schemas.openxmlformats.org/officeDocument/2006/customXml" ds:itemID="{500E728B-7A9B-4D12-B59B-8083B681FF18}">
+  <ds:schemaRefs>
+    <ds:schemaRef ds:uri="http://schemas.microsoft.com/VisualStudio/2011/storyboarding/control"/>
+  </ds:schemaRefs>
+</ds:datastoreItem>
+</file>
+
+<file path=customXml/itemProps117.xml><?xml version="1.0" encoding="utf-8"?>
+<ds:datastoreItem xmlns:ds="http://schemas.openxmlformats.org/officeDocument/2006/customXml" ds:itemID="{69E02AD5-3C7C-4F1D-9766-B18ECF2212C6}">
+  <ds:schemaRefs>
+    <ds:schemaRef ds:uri="http://schemas.microsoft.com/VisualStudio/2011/storyboarding/control"/>
+  </ds:schemaRefs>
+</ds:datastoreItem>
+</file>
+
+<file path=customXml/itemProps118.xml><?xml version="1.0" encoding="utf-8"?>
+<ds:datastoreItem xmlns:ds="http://schemas.openxmlformats.org/officeDocument/2006/customXml" ds:itemID="{FC6544C5-9902-4F92-B15E-0F0FB91FC344}">
+  <ds:schemaRefs>
+    <ds:schemaRef ds:uri="http://schemas.microsoft.com/VisualStudio/2011/storyboarding/control"/>
+  </ds:schemaRefs>
+</ds:datastoreItem>
+</file>
+
+<file path=customXml/itemProps119.xml><?xml version="1.0" encoding="utf-8"?>
+<ds:datastoreItem xmlns:ds="http://schemas.openxmlformats.org/officeDocument/2006/customXml" ds:itemID="{7CABBE05-1DB8-413F-B922-E51F51DB6CB5}">
+  <ds:schemaRefs>
+    <ds:schemaRef ds:uri="http://schemas.microsoft.com/VisualStudio/2011/storyboarding/control"/>
+  </ds:schemaRefs>
+</ds:datastoreItem>
+</file>
+
+<file path=customXml/itemProps12.xml><?xml version="1.0" encoding="utf-8"?>
+<ds:datastoreItem xmlns:ds="http://schemas.openxmlformats.org/officeDocument/2006/customXml" ds:itemID="{24900BF5-C4DC-42A1-8816-A384E671E92A}">
+  <ds:schemaRefs>
+    <ds:schemaRef ds:uri="http://schemas.microsoft.com/VisualStudio/2011/storyboarding/control"/>
+  </ds:schemaRefs>
+</ds:datastoreItem>
+</file>
+
+<file path=customXml/itemProps120.xml><?xml version="1.0" encoding="utf-8"?>
+<ds:datastoreItem xmlns:ds="http://schemas.openxmlformats.org/officeDocument/2006/customXml" ds:itemID="{CF91C9AF-FB44-4B2D-B964-EA853D542988}">
+  <ds:schemaRefs>
+    <ds:schemaRef ds:uri="http://schemas.microsoft.com/VisualStudio/2011/storyboarding/control"/>
+  </ds:schemaRefs>
+</ds:datastoreItem>
+</file>
+
+<file path=customXml/itemProps121.xml><?xml version="1.0" encoding="utf-8"?>
+<ds:datastoreItem xmlns:ds="http://schemas.openxmlformats.org/officeDocument/2006/customXml" ds:itemID="{9A59738E-0CC4-436E-B451-F09AF7853BEC}">
+  <ds:schemaRefs>
+    <ds:schemaRef ds:uri="http://schemas.microsoft.com/VisualStudio/2011/storyboarding/control"/>
+  </ds:schemaRefs>
+</ds:datastoreItem>
+</file>
+
+<file path=customXml/itemProps122.xml><?xml version="1.0" encoding="utf-8"?>
+<ds:datastoreItem xmlns:ds="http://schemas.openxmlformats.org/officeDocument/2006/customXml" ds:itemID="{B0402FE7-8C5A-480B-84D5-E3BA5D7DDA9A}">
+  <ds:schemaRefs>
+    <ds:schemaRef ds:uri="http://schemas.microsoft.com/VisualStudio/2011/storyboarding/control"/>
+  </ds:schemaRefs>
+</ds:datastoreItem>
+</file>
+
+<file path=customXml/itemProps123.xml><?xml version="1.0" encoding="utf-8"?>
+<ds:datastoreItem xmlns:ds="http://schemas.openxmlformats.org/officeDocument/2006/customXml" ds:itemID="{F840D909-519B-49C3-9DCA-97C64A5B9C79}">
+  <ds:schemaRefs>
+    <ds:schemaRef ds:uri="http://schemas.microsoft.com/VisualStudio/2011/storyboarding/control"/>
+  </ds:schemaRefs>
+</ds:datastoreItem>
+</file>
+
+<file path=customXml/itemProps124.xml><?xml version="1.0" encoding="utf-8"?>
+<ds:datastoreItem xmlns:ds="http://schemas.openxmlformats.org/officeDocument/2006/customXml" ds:itemID="{26EBF4A3-F17A-4E3E-A734-46BBA9DFA0C8}">
+  <ds:schemaRefs>
+    <ds:schemaRef ds:uri="http://schemas.microsoft.com/VisualStudio/2011/storyboarding/control"/>
+  </ds:schemaRefs>
+</ds:datastoreItem>
+</file>
+
+<file path=customXml/itemProps125.xml><?xml version="1.0" encoding="utf-8"?>
+<ds:datastoreItem xmlns:ds="http://schemas.openxmlformats.org/officeDocument/2006/customXml" ds:itemID="{417DBAC8-3D39-4B42-B14B-DAEC2E68913B}">
+  <ds:schemaRefs>
+    <ds:schemaRef ds:uri="http://schemas.microsoft.com/VisualStudio/2011/storyboarding/control"/>
+  </ds:schemaRefs>
+</ds:datastoreItem>
+</file>
+
+<file path=customXml/itemProps126.xml><?xml version="1.0" encoding="utf-8"?>
+<ds:datastoreItem xmlns:ds="http://schemas.openxmlformats.org/officeDocument/2006/customXml" ds:itemID="{3154CB70-BAFF-4B34-BC33-BD1C66EB86D7}">
+  <ds:schemaRefs>
+    <ds:schemaRef ds:uri="http://schemas.microsoft.com/VisualStudio/2011/storyboarding/control"/>
+  </ds:schemaRefs>
+</ds:datastoreItem>
+</file>
+
+<file path=customXml/itemProps127.xml><?xml version="1.0" encoding="utf-8"?>
+<ds:datastoreItem xmlns:ds="http://schemas.openxmlformats.org/officeDocument/2006/customXml" ds:itemID="{E194B3CD-86C3-4F6B-A743-1D8043783C25}">
+  <ds:schemaRefs>
+    <ds:schemaRef ds:uri="http://schemas.microsoft.com/VisualStudio/2011/storyboarding/control"/>
+  </ds:schemaRefs>
+</ds:datastoreItem>
+</file>
+
+<file path=customXml/itemProps128.xml><?xml version="1.0" encoding="utf-8"?>
+<ds:datastoreItem xmlns:ds="http://schemas.openxmlformats.org/officeDocument/2006/customXml" ds:itemID="{32DCF836-3940-427C-8F81-BA183FB52BAC}">
+  <ds:schemaRefs>
+    <ds:schemaRef ds:uri="http://schemas.microsoft.com/VisualStudio/2011/storyboarding/control"/>
+  </ds:schemaRefs>
+</ds:datastoreItem>
+</file>
+
+<file path=customXml/itemProps129.xml><?xml version="1.0" encoding="utf-8"?>
+<ds:datastoreItem xmlns:ds="http://schemas.openxmlformats.org/officeDocument/2006/customXml" ds:itemID="{228AF168-33A9-492E-910D-EAE94E644B4A}">
+  <ds:schemaRefs>
+    <ds:schemaRef ds:uri="http://schemas.microsoft.com/VisualStudio/2011/storyboarding/control"/>
+  </ds:schemaRefs>
+</ds:datastoreItem>
+</file>
+
+<file path=customXml/itemProps13.xml><?xml version="1.0" encoding="utf-8"?>
+<ds:datastoreItem xmlns:ds="http://schemas.openxmlformats.org/officeDocument/2006/customXml" ds:itemID="{905F7CBB-FF77-4853-ADB2-0B0D37590AA0}">
+  <ds:schemaRefs>
+    <ds:schemaRef ds:uri="http://schemas.microsoft.com/VisualStudio/2011/storyboarding/control"/>
+  </ds:schemaRefs>
+</ds:datastoreItem>
+</file>
+
+<file path=customXml/itemProps130.xml><?xml version="1.0" encoding="utf-8"?>
+<ds:datastoreItem xmlns:ds="http://schemas.openxmlformats.org/officeDocument/2006/customXml" ds:itemID="{7D7DCE13-136F-43F5-85AB-F325A838BD5C}">
+  <ds:schemaRefs>
+    <ds:schemaRef ds:uri="http://schemas.microsoft.com/VisualStudio/2011/storyboarding/control"/>
+  </ds:schemaRefs>
+</ds:datastoreItem>
+</file>
+
+<file path=customXml/itemProps131.xml><?xml version="1.0" encoding="utf-8"?>
+<ds:datastoreItem xmlns:ds="http://schemas.openxmlformats.org/officeDocument/2006/customXml" ds:itemID="{7D9FEB58-73F6-462F-A88A-C490995E4318}">
+  <ds:schemaRefs>
+    <ds:schemaRef ds:uri="http://schemas.microsoft.com/VisualStudio/2011/storyboarding/control"/>
+  </ds:schemaRefs>
+</ds:datastoreItem>
+</file>
+
+<file path=customXml/itemProps132.xml><?xml version="1.0" encoding="utf-8"?>
+<ds:datastoreItem xmlns:ds="http://schemas.openxmlformats.org/officeDocument/2006/customXml" ds:itemID="{8AE17CAA-BEF2-44CD-9DEE-2F8C17585A32}">
+  <ds:schemaRefs>
+    <ds:schemaRef ds:uri="http://schemas.microsoft.com/VisualStudio/2011/storyboarding/control"/>
+  </ds:schemaRefs>
+</ds:datastoreItem>
+</file>
+
+<file path=customXml/itemProps133.xml><?xml version="1.0" encoding="utf-8"?>
+<ds:datastoreItem xmlns:ds="http://schemas.openxmlformats.org/officeDocument/2006/customXml" ds:itemID="{CC5F127A-2521-4BB3-9D64-238B9FDD6AF8}">
+  <ds:schemaRefs>
+    <ds:schemaRef ds:uri="http://schemas.microsoft.com/VisualStudio/2011/storyboarding/control"/>
+  </ds:schemaRefs>
+</ds:datastoreItem>
+</file>
+
+<file path=customXml/itemProps134.xml><?xml version="1.0" encoding="utf-8"?>
+<ds:datastoreItem xmlns:ds="http://schemas.openxmlformats.org/officeDocument/2006/customXml" ds:itemID="{FD7A3CF8-3A66-47F9-8AD7-22127504A57F}">
+  <ds:schemaRefs>
+    <ds:schemaRef ds:uri="http://schemas.microsoft.com/VisualStudio/2011/storyboarding/control"/>
+  </ds:schemaRefs>
+</ds:datastoreItem>
+</file>
+
+<file path=customXml/itemProps135.xml><?xml version="1.0" encoding="utf-8"?>
+<ds:datastoreItem xmlns:ds="http://schemas.openxmlformats.org/officeDocument/2006/customXml" ds:itemID="{063AF5E8-36AD-451D-9B6A-4390E8F3CF38}">
+  <ds:schemaRefs>
+    <ds:schemaRef ds:uri="http://schemas.microsoft.com/VisualStudio/2011/storyboarding/control"/>
+  </ds:schemaRefs>
+</ds:datastoreItem>
+</file>
+
+<file path=customXml/itemProps136.xml><?xml version="1.0" encoding="utf-8"?>
+<ds:datastoreItem xmlns:ds="http://schemas.openxmlformats.org/officeDocument/2006/customXml" ds:itemID="{68A0CDC1-3F80-4DE3-8AB3-B532E32DC2D3}">
+  <ds:schemaRefs>
+    <ds:schemaRef ds:uri="http://schemas.microsoft.com/VisualStudio/2011/storyboarding/control"/>
+  </ds:schemaRefs>
+</ds:datastoreItem>
+</file>
+
+<file path=customXml/itemProps137.xml><?xml version="1.0" encoding="utf-8"?>
+<ds:datastoreItem xmlns:ds="http://schemas.openxmlformats.org/officeDocument/2006/customXml" ds:itemID="{A099D91D-2540-412F-88B4-6DD3EB1D58E7}">
+  <ds:schemaRefs>
+    <ds:schemaRef ds:uri="http://schemas.microsoft.com/VisualStudio/2011/storyboarding/control"/>
+  </ds:schemaRefs>
+</ds:datastoreItem>
+</file>
+
+<file path=customXml/itemProps138.xml><?xml version="1.0" encoding="utf-8"?>
+<ds:datastoreItem xmlns:ds="http://schemas.openxmlformats.org/officeDocument/2006/customXml" ds:itemID="{CE225F83-8706-4484-B4DE-2B7E506A1F45}">
+  <ds:schemaRefs>
+    <ds:schemaRef ds:uri="http://schemas.microsoft.com/VisualStudio/2011/storyboarding/control"/>
+  </ds:schemaRefs>
+</ds:datastoreItem>
+</file>
+
+<file path=customXml/itemProps139.xml><?xml version="1.0" encoding="utf-8"?>
+<ds:datastoreItem xmlns:ds="http://schemas.openxmlformats.org/officeDocument/2006/customXml" ds:itemID="{408DBD6E-BA86-4206-898C-8866D621C758}">
+  <ds:schemaRefs>
+    <ds:schemaRef ds:uri="http://schemas.microsoft.com/VisualStudio/2011/storyboarding/control"/>
+  </ds:schemaRefs>
+</ds:datastoreItem>
+</file>
+
+<file path=customXml/itemProps14.xml><?xml version="1.0" encoding="utf-8"?>
+<ds:datastoreItem xmlns:ds="http://schemas.openxmlformats.org/officeDocument/2006/customXml" ds:itemID="{E4B490A2-F594-479F-8C41-55AF5E408214}">
+  <ds:schemaRefs>
+    <ds:schemaRef ds:uri="http://schemas.microsoft.com/VisualStudio/2011/storyboarding/control"/>
+  </ds:schemaRefs>
+</ds:datastoreItem>
+</file>
+
+<file path=customXml/itemProps140.xml><?xml version="1.0" encoding="utf-8"?>
+<ds:datastoreItem xmlns:ds="http://schemas.openxmlformats.org/officeDocument/2006/customXml" ds:itemID="{A5B63E18-4237-42D4-B804-B83021F9E8A1}">
+  <ds:schemaRefs>
+    <ds:schemaRef ds:uri="http://schemas.microsoft.com/VisualStudio/2011/storyboarding/control"/>
+  </ds:schemaRefs>
+</ds:datastoreItem>
+</file>
+
+<file path=customXml/itemProps141.xml><?xml version="1.0" encoding="utf-8"?>
+<ds:datastoreItem xmlns:ds="http://schemas.openxmlformats.org/officeDocument/2006/customXml" ds:itemID="{4E626C7F-4024-4418-87D9-7BEE58688CEB}">
+  <ds:schemaRefs>
+    <ds:schemaRef ds:uri="http://schemas.microsoft.com/VisualStudio/2011/storyboarding/control"/>
+  </ds:schemaRefs>
+</ds:datastoreItem>
+</file>
+
+<file path=customXml/itemProps142.xml><?xml version="1.0" encoding="utf-8"?>
+<ds:datastoreItem xmlns:ds="http://schemas.openxmlformats.org/officeDocument/2006/customXml" ds:itemID="{A0B644F4-E7AB-4C5F-99FA-46E0F4A05135}">
+  <ds:schemaRefs>
+    <ds:schemaRef ds:uri="http://schemas.microsoft.com/VisualStudio/2011/storyboarding/control"/>
+  </ds:schemaRefs>
+</ds:datastoreItem>
+</file>
+
+<file path=customXml/itemProps143.xml><?xml version="1.0" encoding="utf-8"?>
+<ds:datastoreItem xmlns:ds="http://schemas.openxmlformats.org/officeDocument/2006/customXml" ds:itemID="{39E72E8E-79BB-456F-8049-0020919B4763}">
+  <ds:schemaRefs>
+    <ds:schemaRef ds:uri="http://schemas.microsoft.com/VisualStudio/2011/storyboarding/control"/>
+  </ds:schemaRefs>
+</ds:datastoreItem>
+</file>
+
+<file path=customXml/itemProps144.xml><?xml version="1.0" encoding="utf-8"?>
+<ds:datastoreItem xmlns:ds="http://schemas.openxmlformats.org/officeDocument/2006/customXml" ds:itemID="{43446240-B211-4F80-A50E-E1B38445E2A1}">
+  <ds:schemaRefs>
+    <ds:schemaRef ds:uri="http://schemas.microsoft.com/VisualStudio/2011/storyboarding/control"/>
+  </ds:schemaRefs>
+</ds:datastoreItem>
+</file>
+
+<file path=customXml/itemProps145.xml><?xml version="1.0" encoding="utf-8"?>
+<ds:datastoreItem xmlns:ds="http://schemas.openxmlformats.org/officeDocument/2006/customXml" ds:itemID="{0CCA9F88-8784-4D3A-B544-5E75264A0988}">
+  <ds:schemaRefs>
+    <ds:schemaRef ds:uri="http://schemas.microsoft.com/VisualStudio/2011/storyboarding/control"/>
+  </ds:schemaRefs>
+</ds:datastoreItem>
+</file>
+
+<file path=customXml/itemProps146.xml><?xml version="1.0" encoding="utf-8"?>
+<ds:datastoreItem xmlns:ds="http://schemas.openxmlformats.org/officeDocument/2006/customXml" ds:itemID="{650ADCBF-4D86-43BF-9817-E7EF6E55BBE7}">
+  <ds:schemaRefs>
+    <ds:schemaRef ds:uri="http://schemas.microsoft.com/VisualStudio/2011/storyboarding/control"/>
+  </ds:schemaRefs>
+</ds:datastoreItem>
+</file>
+
+<file path=customXml/itemProps147.xml><?xml version="1.0" encoding="utf-8"?>
+<ds:datastoreItem xmlns:ds="http://schemas.openxmlformats.org/officeDocument/2006/customXml" ds:itemID="{1F111213-9B54-4464-8973-266EF211797B}">
+  <ds:schemaRefs>
+    <ds:schemaRef ds:uri="http://schemas.microsoft.com/VisualStudio/2011/storyboarding/control"/>
+  </ds:schemaRefs>
+</ds:datastoreItem>
+</file>
+
+<file path=customXml/itemProps148.xml><?xml version="1.0" encoding="utf-8"?>
 <ds:datastoreItem xmlns:ds="http://schemas.openxmlformats.org/officeDocument/2006/customXml" ds:itemID="{12FD62BF-A11E-4BD8-9FB1-B9028E90A22E}">
   <ds:schemaRefs>
     <ds:schemaRef ds:uri="http://schemas.microsoft.com/VisualStudio/2011/storyboarding/control"/>
@@ -27105,15 +27529,63 @@
 </ds:datastoreItem>
 </file>
 
-<file path=customXml/itemProps100.xml><?xml version="1.0" encoding="utf-8"?>
-<ds:datastoreItem xmlns:ds="http://schemas.openxmlformats.org/officeDocument/2006/customXml" ds:itemID="{508FF8A2-065C-4CBB-812E-6E03CA0DD0BA}">
+<file path=customXml/itemProps149.xml><?xml version="1.0" encoding="utf-8"?>
+<ds:datastoreItem xmlns:ds="http://schemas.openxmlformats.org/officeDocument/2006/customXml" ds:itemID="{766F77BC-3956-438F-94BE-CF6CF9C915C0}">
   <ds:schemaRefs>
     <ds:schemaRef ds:uri="http://schemas.microsoft.com/VisualStudio/2011/storyboarding/control"/>
   </ds:schemaRefs>
 </ds:datastoreItem>
 </file>
 
-<file path=customXml/itemProps101.xml><?xml version="1.0" encoding="utf-8"?>
+<file path=customXml/itemProps15.xml><?xml version="1.0" encoding="utf-8"?>
+<ds:datastoreItem xmlns:ds="http://schemas.openxmlformats.org/officeDocument/2006/customXml" ds:itemID="{CF03DD0F-EDED-4182-BF0D-C60EA8AC9FC5}">
+  <ds:schemaRefs>
+    <ds:schemaRef ds:uri="http://schemas.microsoft.com/VisualStudio/2011/storyboarding/control"/>
+  </ds:schemaRefs>
+</ds:datastoreItem>
+</file>
+
+<file path=customXml/itemProps150.xml><?xml version="1.0" encoding="utf-8"?>
+<ds:datastoreItem xmlns:ds="http://schemas.openxmlformats.org/officeDocument/2006/customXml" ds:itemID="{DB2000C8-B277-4324-8B80-CDB83E8CE835}">
+  <ds:schemaRefs>
+    <ds:schemaRef ds:uri="http://schemas.microsoft.com/VisualStudio/2011/storyboarding/control"/>
+  </ds:schemaRefs>
+</ds:datastoreItem>
+</file>
+
+<file path=customXml/itemProps151.xml><?xml version="1.0" encoding="utf-8"?>
+<ds:datastoreItem xmlns:ds="http://schemas.openxmlformats.org/officeDocument/2006/customXml" ds:itemID="{5F6247E0-2660-41E0-8816-07BF7F4C712D}">
+  <ds:schemaRefs>
+    <ds:schemaRef ds:uri="http://schemas.microsoft.com/VisualStudio/2011/storyboarding/control"/>
+  </ds:schemaRefs>
+</ds:datastoreItem>
+</file>
+
+<file path=customXml/itemProps152.xml><?xml version="1.0" encoding="utf-8"?>
+<ds:datastoreItem xmlns:ds="http://schemas.openxmlformats.org/officeDocument/2006/customXml" ds:itemID="{E5957A30-7F08-42CE-A7C9-9121B3EEDB89}">
+  <ds:schemaRefs>
+    <ds:schemaRef ds:uri="http://schemas.microsoft.com/VisualStudio/2011/storyboarding/control"/>
+  </ds:schemaRefs>
+</ds:datastoreItem>
+</file>
+
+<file path=customXml/itemProps153.xml><?xml version="1.0" encoding="utf-8"?>
+<ds:datastoreItem xmlns:ds="http://schemas.openxmlformats.org/officeDocument/2006/customXml" ds:itemID="{186177FB-D9AA-47FB-AA70-F2EB801F860E}">
+  <ds:schemaRefs>
+    <ds:schemaRef ds:uri="http://schemas.microsoft.com/VisualStudio/2011/storyboarding/control"/>
+  </ds:schemaRefs>
+</ds:datastoreItem>
+</file>
+
+<file path=customXml/itemProps154.xml><?xml version="1.0" encoding="utf-8"?>
+<ds:datastoreItem xmlns:ds="http://schemas.openxmlformats.org/officeDocument/2006/customXml" ds:itemID="{8B573C24-C1CA-4AD9-8793-CFC1E42E3841}">
+  <ds:schemaRefs>
+    <ds:schemaRef ds:uri="http://schemas.microsoft.com/VisualStudio/2011/storyboarding/control"/>
+  </ds:schemaRefs>
+</ds:datastoreItem>
+</file>
+
+<file path=customXml/itemProps155.xml><?xml version="1.0" encoding="utf-8"?>
 <ds:datastoreItem xmlns:ds="http://schemas.openxmlformats.org/officeDocument/2006/customXml" ds:itemID="{4B7335D3-7249-47CB-993B-C371E630393B}">
   <ds:schemaRefs>
     <ds:schemaRef ds:uri="http://schemas.microsoft.com/VisualStudio/2011/storyboarding/control"/>
@@ -27121,7 +27593,191 @@
 </ds:datastoreItem>
 </file>
 
-<file path=customXml/itemProps102.xml><?xml version="1.0" encoding="utf-8"?>
+<file path=customXml/itemProps156.xml><?xml version="1.0" encoding="utf-8"?>
+<ds:datastoreItem xmlns:ds="http://schemas.openxmlformats.org/officeDocument/2006/customXml" ds:itemID="{6555F547-BDDA-4C26-9CE1-4C61E93A284F}">
+  <ds:schemaRefs>
+    <ds:schemaRef ds:uri="http://schemas.microsoft.com/VisualStudio/2011/storyboarding/control"/>
+  </ds:schemaRefs>
+</ds:datastoreItem>
+</file>
+
+<file path=customXml/itemProps157.xml><?xml version="1.0" encoding="utf-8"?>
+<ds:datastoreItem xmlns:ds="http://schemas.openxmlformats.org/officeDocument/2006/customXml" ds:itemID="{48A06D39-512F-41A5-AE3C-7B4CDB4AC086}">
+  <ds:schemaRefs>
+    <ds:schemaRef ds:uri="http://schemas.microsoft.com/VisualStudio/2011/storyboarding/control"/>
+  </ds:schemaRefs>
+</ds:datastoreItem>
+</file>
+
+<file path=customXml/itemProps158.xml><?xml version="1.0" encoding="utf-8"?>
+<ds:datastoreItem xmlns:ds="http://schemas.openxmlformats.org/officeDocument/2006/customXml" ds:itemID="{FA597DE2-CFB0-4358-AA98-055ACAFB4418}">
+  <ds:schemaRefs>
+    <ds:schemaRef ds:uri="http://schemas.microsoft.com/VisualStudio/2011/storyboarding/control"/>
+  </ds:schemaRefs>
+</ds:datastoreItem>
+</file>
+
+<file path=customXml/itemProps159.xml><?xml version="1.0" encoding="utf-8"?>
+<ds:datastoreItem xmlns:ds="http://schemas.openxmlformats.org/officeDocument/2006/customXml" ds:itemID="{B8E12DBA-650B-4369-8B51-0ED5654ECE37}">
+  <ds:schemaRefs>
+    <ds:schemaRef ds:uri="http://schemas.microsoft.com/VisualStudio/2011/storyboarding/control"/>
+  </ds:schemaRefs>
+</ds:datastoreItem>
+</file>
+
+<file path=customXml/itemProps16.xml><?xml version="1.0" encoding="utf-8"?>
+<ds:datastoreItem xmlns:ds="http://schemas.openxmlformats.org/officeDocument/2006/customXml" ds:itemID="{7FDD124D-E3E9-4D15-9954-8BE945E00BA2}">
+  <ds:schemaRefs>
+    <ds:schemaRef ds:uri="http://schemas.microsoft.com/VisualStudio/2011/storyboarding/control"/>
+  </ds:schemaRefs>
+</ds:datastoreItem>
+</file>
+
+<file path=customXml/itemProps160.xml><?xml version="1.0" encoding="utf-8"?>
+<ds:datastoreItem xmlns:ds="http://schemas.openxmlformats.org/officeDocument/2006/customXml" ds:itemID="{6BD97E69-24BE-47DA-8FEB-131A11003B19}">
+  <ds:schemaRefs>
+    <ds:schemaRef ds:uri="http://schemas.microsoft.com/VisualStudio/2011/storyboarding/control"/>
+  </ds:schemaRefs>
+</ds:datastoreItem>
+</file>
+
+<file path=customXml/itemProps161.xml><?xml version="1.0" encoding="utf-8"?>
+<ds:datastoreItem xmlns:ds="http://schemas.openxmlformats.org/officeDocument/2006/customXml" ds:itemID="{10A6C904-68E1-4411-B457-0419F97C209A}">
+  <ds:schemaRefs>
+    <ds:schemaRef ds:uri="http://schemas.microsoft.com/VisualStudio/2011/storyboarding/control"/>
+  </ds:schemaRefs>
+</ds:datastoreItem>
+</file>
+
+<file path=customXml/itemProps162.xml><?xml version="1.0" encoding="utf-8"?>
+<ds:datastoreItem xmlns:ds="http://schemas.openxmlformats.org/officeDocument/2006/customXml" ds:itemID="{7EC308D9-C28D-40CD-AB00-4A98E0A77CCC}">
+  <ds:schemaRefs>
+    <ds:schemaRef ds:uri="http://schemas.microsoft.com/VisualStudio/2011/storyboarding/control"/>
+  </ds:schemaRefs>
+</ds:datastoreItem>
+</file>
+
+<file path=customXml/itemProps163.xml><?xml version="1.0" encoding="utf-8"?>
+<ds:datastoreItem xmlns:ds="http://schemas.openxmlformats.org/officeDocument/2006/customXml" ds:itemID="{0D8F2650-9E27-4603-BD35-5A059BB60334}">
+  <ds:schemaRefs>
+    <ds:schemaRef ds:uri="http://schemas.microsoft.com/VisualStudio/2011/storyboarding/control"/>
+  </ds:schemaRefs>
+</ds:datastoreItem>
+</file>
+
+<file path=customXml/itemProps164.xml><?xml version="1.0" encoding="utf-8"?>
+<ds:datastoreItem xmlns:ds="http://schemas.openxmlformats.org/officeDocument/2006/customXml" ds:itemID="{0D174F31-1395-420D-AE3A-5DBEFF0F4455}">
+  <ds:schemaRefs>
+    <ds:schemaRef ds:uri="http://schemas.microsoft.com/VisualStudio/2011/storyboarding/control"/>
+  </ds:schemaRefs>
+</ds:datastoreItem>
+</file>
+
+<file path=customXml/itemProps165.xml><?xml version="1.0" encoding="utf-8"?>
+<ds:datastoreItem xmlns:ds="http://schemas.openxmlformats.org/officeDocument/2006/customXml" ds:itemID="{C65B337F-737A-48CA-8F75-978A60D7016D}">
+  <ds:schemaRefs>
+    <ds:schemaRef ds:uri="http://schemas.microsoft.com/VisualStudio/2011/storyboarding/control"/>
+  </ds:schemaRefs>
+</ds:datastoreItem>
+</file>
+
+<file path=customXml/itemProps166.xml><?xml version="1.0" encoding="utf-8"?>
+<ds:datastoreItem xmlns:ds="http://schemas.openxmlformats.org/officeDocument/2006/customXml" ds:itemID="{B01456BF-31CD-4F81-B283-64D56CC0D084}">
+  <ds:schemaRefs>
+    <ds:schemaRef ds:uri="http://schemas.microsoft.com/VisualStudio/2011/storyboarding/control"/>
+  </ds:schemaRefs>
+</ds:datastoreItem>
+</file>
+
+<file path=customXml/itemProps167.xml><?xml version="1.0" encoding="utf-8"?>
+<ds:datastoreItem xmlns:ds="http://schemas.openxmlformats.org/officeDocument/2006/customXml" ds:itemID="{876AF238-A0AE-4CE4-9709-BB19E770A0FF}">
+  <ds:schemaRefs>
+    <ds:schemaRef ds:uri="http://schemas.microsoft.com/VisualStudio/2011/storyboarding/control"/>
+  </ds:schemaRefs>
+</ds:datastoreItem>
+</file>
+
+<file path=customXml/itemProps168.xml><?xml version="1.0" encoding="utf-8"?>
+<ds:datastoreItem xmlns:ds="http://schemas.openxmlformats.org/officeDocument/2006/customXml" ds:itemID="{9DAE1F11-5474-4CAD-8EC7-A688E310A5AB}">
+  <ds:schemaRefs>
+    <ds:schemaRef ds:uri="http://schemas.microsoft.com/VisualStudio/2011/storyboarding/control"/>
+  </ds:schemaRefs>
+</ds:datastoreItem>
+</file>
+
+<file path=customXml/itemProps169.xml><?xml version="1.0" encoding="utf-8"?>
+<ds:datastoreItem xmlns:ds="http://schemas.openxmlformats.org/officeDocument/2006/customXml" ds:itemID="{42FDEB12-2513-4D55-BA2A-18EF5D159E91}">
+  <ds:schemaRefs>
+    <ds:schemaRef ds:uri="http://schemas.microsoft.com/VisualStudio/2011/storyboarding/control"/>
+  </ds:schemaRefs>
+</ds:datastoreItem>
+</file>
+
+<file path=customXml/itemProps17.xml><?xml version="1.0" encoding="utf-8"?>
+<ds:datastoreItem xmlns:ds="http://schemas.openxmlformats.org/officeDocument/2006/customXml" ds:itemID="{46C73D8E-C66E-4332-8B81-F1B9658FF49D}">
+  <ds:schemaRefs>
+    <ds:schemaRef ds:uri="http://schemas.microsoft.com/VisualStudio/2011/storyboarding/control"/>
+  </ds:schemaRefs>
+</ds:datastoreItem>
+</file>
+
+<file path=customXml/itemProps170.xml><?xml version="1.0" encoding="utf-8"?>
+<ds:datastoreItem xmlns:ds="http://schemas.openxmlformats.org/officeDocument/2006/customXml" ds:itemID="{3339E7B3-364E-4EE1-ABAB-0EFEF3F7CE1F}">
+  <ds:schemaRefs>
+    <ds:schemaRef ds:uri="http://schemas.microsoft.com/VisualStudio/2011/storyboarding/control"/>
+  </ds:schemaRefs>
+</ds:datastoreItem>
+</file>
+
+<file path=customXml/itemProps171.xml><?xml version="1.0" encoding="utf-8"?>
+<ds:datastoreItem xmlns:ds="http://schemas.openxmlformats.org/officeDocument/2006/customXml" ds:itemID="{7989F8B3-8E20-4455-9310-361DF73D03B3}">
+  <ds:schemaRefs>
+    <ds:schemaRef ds:uri="http://schemas.microsoft.com/VisualStudio/2011/storyboarding/control"/>
+  </ds:schemaRefs>
+</ds:datastoreItem>
+</file>
+
+<file path=customXml/itemProps172.xml><?xml version="1.0" encoding="utf-8"?>
+<ds:datastoreItem xmlns:ds="http://schemas.openxmlformats.org/officeDocument/2006/customXml" ds:itemID="{C8AF95B6-D0D3-4619-AB57-6FEEA90FA132}">
+  <ds:schemaRefs>
+    <ds:schemaRef ds:uri="http://schemas.microsoft.com/VisualStudio/2011/storyboarding/control"/>
+  </ds:schemaRefs>
+</ds:datastoreItem>
+</file>
+
+<file path=customXml/itemProps173.xml><?xml version="1.0" encoding="utf-8"?>
+<ds:datastoreItem xmlns:ds="http://schemas.openxmlformats.org/officeDocument/2006/customXml" ds:itemID="{9C6114CB-F4BA-4F35-827A-2DA5F8B255B0}">
+  <ds:schemaRefs>
+    <ds:schemaRef ds:uri="http://schemas.microsoft.com/VisualStudio/2011/storyboarding/control"/>
+  </ds:schemaRefs>
+</ds:datastoreItem>
+</file>
+
+<file path=customXml/itemProps174.xml><?xml version="1.0" encoding="utf-8"?>
+<ds:datastoreItem xmlns:ds="http://schemas.openxmlformats.org/officeDocument/2006/customXml" ds:itemID="{2E8BF867-BA02-4DD2-B1A2-C9A27CC92F1F}">
+  <ds:schemaRefs>
+    <ds:schemaRef ds:uri="http://schemas.microsoft.com/VisualStudio/2011/storyboarding/control"/>
+  </ds:schemaRefs>
+</ds:datastoreItem>
+</file>
+
+<file path=customXml/itemProps175.xml><?xml version="1.0" encoding="utf-8"?>
+<ds:datastoreItem xmlns:ds="http://schemas.openxmlformats.org/officeDocument/2006/customXml" ds:itemID="{99FFFAFB-7A40-49A1-B04F-4A1F6ECF0BAF}">
+  <ds:schemaRefs>
+    <ds:schemaRef ds:uri="http://schemas.microsoft.com/VisualStudio/2011/storyboarding/control"/>
+  </ds:schemaRefs>
+</ds:datastoreItem>
+</file>
+
+<file path=customXml/itemProps176.xml><?xml version="1.0" encoding="utf-8"?>
+<ds:datastoreItem xmlns:ds="http://schemas.openxmlformats.org/officeDocument/2006/customXml" ds:itemID="{C14734D5-9FB1-4C35-A180-105B4BA15CD3}">
+  <ds:schemaRefs>
+    <ds:schemaRef ds:uri="http://schemas.microsoft.com/VisualStudio/2011/storyboarding/control"/>
+  </ds:schemaRefs>
+</ds:datastoreItem>
+</file>
+
+<file path=customXml/itemProps177.xml><?xml version="1.0" encoding="utf-8"?>
 <ds:datastoreItem xmlns:ds="http://schemas.openxmlformats.org/officeDocument/2006/customXml" ds:itemID="{4ABC8992-C4EA-45C3-A598-324942FE08FB}">
   <ds:schemaRefs>
     <ds:schemaRef ds:uri="http://schemas.microsoft.com/VisualStudio/2011/storyboarding/control"/>
@@ -27129,63 +27785,103 @@
 </ds:datastoreItem>
 </file>
 
-<file path=customXml/itemProps103.xml><?xml version="1.0" encoding="utf-8"?>
-<ds:datastoreItem xmlns:ds="http://schemas.openxmlformats.org/officeDocument/2006/customXml" ds:itemID="{3CA43762-3F39-470A-9564-3739655F8186}">
+<file path=customXml/itemProps178.xml><?xml version="1.0" encoding="utf-8"?>
+<ds:datastoreItem xmlns:ds="http://schemas.openxmlformats.org/officeDocument/2006/customXml" ds:itemID="{1159427B-15B9-477B-8DAD-D7C81D705523}">
   <ds:schemaRefs>
     <ds:schemaRef ds:uri="http://schemas.microsoft.com/VisualStudio/2011/storyboarding/control"/>
   </ds:schemaRefs>
 </ds:datastoreItem>
 </file>
 
-<file path=customXml/itemProps104.xml><?xml version="1.0" encoding="utf-8"?>
-<ds:datastoreItem xmlns:ds="http://schemas.openxmlformats.org/officeDocument/2006/customXml" ds:itemID="{6E9F6603-6B7C-453B-A486-459839EF1163}">
+<file path=customXml/itemProps179.xml><?xml version="1.0" encoding="utf-8"?>
+<ds:datastoreItem xmlns:ds="http://schemas.openxmlformats.org/officeDocument/2006/customXml" ds:itemID="{FD6778B7-8FE2-4C81-885D-09500CE283B1}">
   <ds:schemaRefs>
     <ds:schemaRef ds:uri="http://schemas.microsoft.com/VisualStudio/2011/storyboarding/control"/>
   </ds:schemaRefs>
 </ds:datastoreItem>
 </file>
 
-<file path=customXml/itemProps105.xml><?xml version="1.0" encoding="utf-8"?>
-<ds:datastoreItem xmlns:ds="http://schemas.openxmlformats.org/officeDocument/2006/customXml" ds:itemID="{A41DC63A-40F8-492D-A1AF-3E8E88975D17}">
+<file path=customXml/itemProps18.xml><?xml version="1.0" encoding="utf-8"?>
+<ds:datastoreItem xmlns:ds="http://schemas.openxmlformats.org/officeDocument/2006/customXml" ds:itemID="{8481EF94-D4A7-4149-8E7B-C8738D2597CA}">
   <ds:schemaRefs>
     <ds:schemaRef ds:uri="http://schemas.microsoft.com/VisualStudio/2011/storyboarding/control"/>
   </ds:schemaRefs>
 </ds:datastoreItem>
 </file>
 
-<file path=customXml/itemProps106.xml><?xml version="1.0" encoding="utf-8"?>
-<ds:datastoreItem xmlns:ds="http://schemas.openxmlformats.org/officeDocument/2006/customXml" ds:itemID="{650ADCBF-4D86-43BF-9817-E7EF6E55BBE7}">
+<file path=customXml/itemProps180.xml><?xml version="1.0" encoding="utf-8"?>
+<ds:datastoreItem xmlns:ds="http://schemas.openxmlformats.org/officeDocument/2006/customXml" ds:itemID="{990EA9D7-70A1-4B9E-958D-6A0136D68D06}">
   <ds:schemaRefs>
     <ds:schemaRef ds:uri="http://schemas.microsoft.com/VisualStudio/2011/storyboarding/control"/>
   </ds:schemaRefs>
 </ds:datastoreItem>
 </file>
 
-<file path=customXml/itemProps107.xml><?xml version="1.0" encoding="utf-8"?>
-<ds:datastoreItem xmlns:ds="http://schemas.openxmlformats.org/officeDocument/2006/customXml" ds:itemID="{7EA327E3-FCFB-4008-8DED-CE47F66639FD}">
+<file path=customXml/itemProps181.xml><?xml version="1.0" encoding="utf-8"?>
+<ds:datastoreItem xmlns:ds="http://schemas.openxmlformats.org/officeDocument/2006/customXml" ds:itemID="{70E3F600-4C8D-4A3A-BE16-3540F66AD848}">
   <ds:schemaRefs>
     <ds:schemaRef ds:uri="http://schemas.microsoft.com/VisualStudio/2011/storyboarding/control"/>
   </ds:schemaRefs>
 </ds:datastoreItem>
 </file>
 
-<file path=customXml/itemProps108.xml><?xml version="1.0" encoding="utf-8"?>
-<ds:datastoreItem xmlns:ds="http://schemas.openxmlformats.org/officeDocument/2006/customXml" ds:itemID="{D9B490FA-A64C-40B6-8247-CD5808900A10}">
+<file path=customXml/itemProps182.xml><?xml version="1.0" encoding="utf-8"?>
+<ds:datastoreItem xmlns:ds="http://schemas.openxmlformats.org/officeDocument/2006/customXml" ds:itemID="{83526E43-CC5B-4399-8E1C-823585530259}">
   <ds:schemaRefs>
     <ds:schemaRef ds:uri="http://schemas.microsoft.com/VisualStudio/2011/storyboarding/control"/>
   </ds:schemaRefs>
 </ds:datastoreItem>
 </file>
 
-<file path=customXml/itemProps109.xml><?xml version="1.0" encoding="utf-8"?>
-<ds:datastoreItem xmlns:ds="http://schemas.openxmlformats.org/officeDocument/2006/customXml" ds:itemID="{6226C0E4-0364-460C-AAB7-9D347567DCC8}">
+<file path=customXml/itemProps183.xml><?xml version="1.0" encoding="utf-8"?>
+<ds:datastoreItem xmlns:ds="http://schemas.openxmlformats.org/officeDocument/2006/customXml" ds:itemID="{ACB3927E-D579-4694-AD01-62FF7AA261C4}">
   <ds:schemaRefs>
     <ds:schemaRef ds:uri="http://schemas.microsoft.com/VisualStudio/2011/storyboarding/control"/>
   </ds:schemaRefs>
 </ds:datastoreItem>
 </file>
 
-<file path=customXml/itemProps11.xml><?xml version="1.0" encoding="utf-8"?>
+<file path=customXml/itemProps184.xml><?xml version="1.0" encoding="utf-8"?>
+<ds:datastoreItem xmlns:ds="http://schemas.openxmlformats.org/officeDocument/2006/customXml" ds:itemID="{425D7E26-BB5E-460D-97B3-E693C38FDA69}">
+  <ds:schemaRefs>
+    <ds:schemaRef ds:uri="http://schemas.microsoft.com/VisualStudio/2011/storyboarding/control"/>
+  </ds:schemaRefs>
+</ds:datastoreItem>
+</file>
+
+<file path=customXml/itemProps185.xml><?xml version="1.0" encoding="utf-8"?>
+<ds:datastoreItem xmlns:ds="http://schemas.openxmlformats.org/officeDocument/2006/customXml" ds:itemID="{B7D85223-23F1-4ACF-89DD-EE38AA7E4772}">
+  <ds:schemaRefs>
+    <ds:schemaRef ds:uri="http://schemas.microsoft.com/VisualStudio/2011/storyboarding/control"/>
+  </ds:schemaRefs>
+</ds:datastoreItem>
+</file>
+
+<file path=customXml/itemProps186.xml><?xml version="1.0" encoding="utf-8"?>
+<ds:datastoreItem xmlns:ds="http://schemas.openxmlformats.org/officeDocument/2006/customXml" ds:itemID="{A1F43F78-8591-47F2-9A56-991B5C2DCCFC}">
+  <ds:schemaRefs>
+    <ds:schemaRef ds:uri="http://schemas.microsoft.com/VisualStudio/2011/storyboarding/control"/>
+  </ds:schemaRefs>
+</ds:datastoreItem>
+</file>
+
+<file path=customXml/itemProps187.xml><?xml version="1.0" encoding="utf-8"?>
+<ds:datastoreItem xmlns:ds="http://schemas.openxmlformats.org/officeDocument/2006/customXml" ds:itemID="{E0FB4629-EC57-49BA-A2DF-156D734D924B}">
+  <ds:schemaRefs>
+    <ds:schemaRef ds:uri="http://schemas.microsoft.com/VisualStudio/2011/storyboarding/control"/>
+  </ds:schemaRefs>
+</ds:datastoreItem>
+</file>
+
+<file path=customXml/itemProps19.xml><?xml version="1.0" encoding="utf-8"?>
+<ds:datastoreItem xmlns:ds="http://schemas.openxmlformats.org/officeDocument/2006/customXml" ds:itemID="{0B5327E3-0261-4B48-BF6B-FF0257762827}">
+  <ds:schemaRefs>
+    <ds:schemaRef ds:uri="http://schemas.microsoft.com/VisualStudio/2011/storyboarding/control"/>
+  </ds:schemaRefs>
+</ds:datastoreItem>
+</file>
+
+<file path=customXml/itemProps2.xml><?xml version="1.0" encoding="utf-8"?>
 <ds:datastoreItem xmlns:ds="http://schemas.openxmlformats.org/officeDocument/2006/customXml" ds:itemID="{A05C083F-66B9-4E32-B2F5-E377C3A489DF}">
   <ds:schemaRefs>
     <ds:schemaRef ds:uri="http://schemas.microsoft.com/VisualStudio/2011/storyboarding/control"/>
@@ -27193,31 +27889,15 @@
 </ds:datastoreItem>
 </file>
 
-<file path=customXml/itemProps110.xml><?xml version="1.0" encoding="utf-8"?>
-<ds:datastoreItem xmlns:ds="http://schemas.openxmlformats.org/officeDocument/2006/customXml" ds:itemID="{4933C5B9-7038-46C8-B65F-9FC1C846A3E0}">
+<file path=customXml/itemProps20.xml><?xml version="1.0" encoding="utf-8"?>
+<ds:datastoreItem xmlns:ds="http://schemas.openxmlformats.org/officeDocument/2006/customXml" ds:itemID="{B0C9E300-5CAC-4E8C-B9CB-B4EDDB0EC3C8}">
   <ds:schemaRefs>
     <ds:schemaRef ds:uri="http://schemas.microsoft.com/VisualStudio/2011/storyboarding/control"/>
   </ds:schemaRefs>
 </ds:datastoreItem>
 </file>
 
-<file path=customXml/itemProps111.xml><?xml version="1.0" encoding="utf-8"?>
-<ds:datastoreItem xmlns:ds="http://schemas.openxmlformats.org/officeDocument/2006/customXml" ds:itemID="{CE225F83-8706-4484-B4DE-2B7E506A1F45}">
-  <ds:schemaRefs>
-    <ds:schemaRef ds:uri="http://schemas.microsoft.com/VisualStudio/2011/storyboarding/control"/>
-  </ds:schemaRefs>
-</ds:datastoreItem>
-</file>
-
-<file path=customXml/itemProps112.xml><?xml version="1.0" encoding="utf-8"?>
-<ds:datastoreItem xmlns:ds="http://schemas.openxmlformats.org/officeDocument/2006/customXml" ds:itemID="{42FDEB12-2513-4D55-BA2A-18EF5D159E91}">
-  <ds:schemaRefs>
-    <ds:schemaRef ds:uri="http://schemas.microsoft.com/VisualStudio/2011/storyboarding/control"/>
-  </ds:schemaRefs>
-</ds:datastoreItem>
-</file>
-
-<file path=customXml/itemProps113.xml><?xml version="1.0" encoding="utf-8"?>
+<file path=customXml/itemProps21.xml><?xml version="1.0" encoding="utf-8"?>
 <ds:datastoreItem xmlns:ds="http://schemas.openxmlformats.org/officeDocument/2006/customXml" ds:itemID="{C170435E-AA56-4732-BD81-63AD243D433D}">
   <ds:schemaRefs>
     <ds:schemaRef ds:uri="http://schemas.microsoft.com/VisualStudio/2011/storyboarding/control"/>
@@ -27225,39 +27905,7 @@
 </ds:datastoreItem>
 </file>
 
-<file path=customXml/itemProps114.xml><?xml version="1.0" encoding="utf-8"?>
-<ds:datastoreItem xmlns:ds="http://schemas.openxmlformats.org/officeDocument/2006/customXml" ds:itemID="{F2B3FB12-0841-4AD8-9A0B-0A04CC6A8CFC}">
-  <ds:schemaRefs>
-    <ds:schemaRef ds:uri="http://schemas.microsoft.com/VisualStudio/2011/storyboarding/control"/>
-  </ds:schemaRefs>
-</ds:datastoreItem>
-</file>
-
-<file path=customXml/itemProps115.xml><?xml version="1.0" encoding="utf-8"?>
-<ds:datastoreItem xmlns:ds="http://schemas.openxmlformats.org/officeDocument/2006/customXml" ds:itemID="{7A7C8F38-0BA1-42E1-8BF5-DEED4B0E03B5}">
-  <ds:schemaRefs>
-    <ds:schemaRef ds:uri="http://schemas.microsoft.com/VisualStudio/2011/storyboarding/control"/>
-  </ds:schemaRefs>
-</ds:datastoreItem>
-</file>
-
-<file path=customXml/itemProps116.xml><?xml version="1.0" encoding="utf-8"?>
-<ds:datastoreItem xmlns:ds="http://schemas.openxmlformats.org/officeDocument/2006/customXml" ds:itemID="{7D7DCE13-136F-43F5-85AB-F325A838BD5C}">
-  <ds:schemaRefs>
-    <ds:schemaRef ds:uri="http://schemas.microsoft.com/VisualStudio/2011/storyboarding/control"/>
-  </ds:schemaRefs>
-</ds:datastoreItem>
-</file>
-
-<file path=customXml/itemProps117.xml><?xml version="1.0" encoding="utf-8"?>
-<ds:datastoreItem xmlns:ds="http://schemas.openxmlformats.org/officeDocument/2006/customXml" ds:itemID="{990EA9D7-70A1-4B9E-958D-6A0136D68D06}">
-  <ds:schemaRefs>
-    <ds:schemaRef ds:uri="http://schemas.microsoft.com/VisualStudio/2011/storyboarding/control"/>
-  </ds:schemaRefs>
-</ds:datastoreItem>
-</file>
-
-<file path=customXml/itemProps118.xml><?xml version="1.0" encoding="utf-8"?>
+<file path=customXml/itemProps22.xml><?xml version="1.0" encoding="utf-8"?>
 <ds:datastoreItem xmlns:ds="http://schemas.openxmlformats.org/officeDocument/2006/customXml" ds:itemID="{F9C34A43-6DD3-45D9-8C33-A2A94686CFF4}">
   <ds:schemaRefs>
     <ds:schemaRef ds:uri="http://schemas.microsoft.com/VisualStudio/2011/storyboarding/control"/>
@@ -27265,15 +27913,79 @@
 </ds:datastoreItem>
 </file>
 
-<file path=customXml/itemProps119.xml><?xml version="1.0" encoding="utf-8"?>
-<ds:datastoreItem xmlns:ds="http://schemas.openxmlformats.org/officeDocument/2006/customXml" ds:itemID="{9DAF7C4A-2E75-435E-8C11-B1DC53AC52EB}">
+<file path=customXml/itemProps23.xml><?xml version="1.0" encoding="utf-8"?>
+<ds:datastoreItem xmlns:ds="http://schemas.openxmlformats.org/officeDocument/2006/customXml" ds:itemID="{3E700196-0E07-41FC-8F78-80FE3D9018FD}">
   <ds:schemaRefs>
     <ds:schemaRef ds:uri="http://schemas.microsoft.com/VisualStudio/2011/storyboarding/control"/>
   </ds:schemaRefs>
 </ds:datastoreItem>
 </file>
 
-<file path=customXml/itemProps12.xml><?xml version="1.0" encoding="utf-8"?>
+<file path=customXml/itemProps24.xml><?xml version="1.0" encoding="utf-8"?>
+<ds:datastoreItem xmlns:ds="http://schemas.openxmlformats.org/officeDocument/2006/customXml" ds:itemID="{8A260A91-3FD6-475C-8E6F-434835560933}">
+  <ds:schemaRefs>
+    <ds:schemaRef ds:uri="http://schemas.microsoft.com/VisualStudio/2011/storyboarding/control"/>
+  </ds:schemaRefs>
+</ds:datastoreItem>
+</file>
+
+<file path=customXml/itemProps25.xml><?xml version="1.0" encoding="utf-8"?>
+<ds:datastoreItem xmlns:ds="http://schemas.openxmlformats.org/officeDocument/2006/customXml" ds:itemID="{559BF73F-CE64-4B91-BD49-510468F35CB9}">
+  <ds:schemaRefs>
+    <ds:schemaRef ds:uri="http://schemas.microsoft.com/VisualStudio/2011/storyboarding/control"/>
+  </ds:schemaRefs>
+</ds:datastoreItem>
+</file>
+
+<file path=customXml/itemProps26.xml><?xml version="1.0" encoding="utf-8"?>
+<ds:datastoreItem xmlns:ds="http://schemas.openxmlformats.org/officeDocument/2006/customXml" ds:itemID="{3DDBA3E6-6C5A-4905-87BF-300A95711014}">
+  <ds:schemaRefs>
+    <ds:schemaRef ds:uri="http://schemas.microsoft.com/VisualStudio/2011/storyboarding/control"/>
+  </ds:schemaRefs>
+</ds:datastoreItem>
+</file>
+
+<file path=customXml/itemProps27.xml><?xml version="1.0" encoding="utf-8"?>
+<ds:datastoreItem xmlns:ds="http://schemas.openxmlformats.org/officeDocument/2006/customXml" ds:itemID="{D54CCA4C-C7B0-4AED-9D56-0F76C035783B}">
+  <ds:schemaRefs>
+    <ds:schemaRef ds:uri="http://schemas.microsoft.com/VisualStudio/2011/storyboarding/control"/>
+  </ds:schemaRefs>
+</ds:datastoreItem>
+</file>
+
+<file path=customXml/itemProps28.xml><?xml version="1.0" encoding="utf-8"?>
+<ds:datastoreItem xmlns:ds="http://schemas.openxmlformats.org/officeDocument/2006/customXml" ds:itemID="{2AEF63D2-D198-4CCC-904A-422119B9CA6F}">
+  <ds:schemaRefs>
+    <ds:schemaRef ds:uri="http://schemas.microsoft.com/VisualStudio/2011/storyboarding/control"/>
+  </ds:schemaRefs>
+</ds:datastoreItem>
+</file>
+
+<file path=customXml/itemProps29.xml><?xml version="1.0" encoding="utf-8"?>
+<ds:datastoreItem xmlns:ds="http://schemas.openxmlformats.org/officeDocument/2006/customXml" ds:itemID="{215132C6-5D8F-4E41-9882-494A7FC0C124}">
+  <ds:schemaRefs>
+    <ds:schemaRef ds:uri="http://schemas.microsoft.com/VisualStudio/2011/storyboarding/control"/>
+  </ds:schemaRefs>
+</ds:datastoreItem>
+</file>
+
+<file path=customXml/itemProps3.xml><?xml version="1.0" encoding="utf-8"?>
+<ds:datastoreItem xmlns:ds="http://schemas.openxmlformats.org/officeDocument/2006/customXml" ds:itemID="{E0CC2506-29F9-46DF-9492-65B12C0522D5}">
+  <ds:schemaRefs>
+    <ds:schemaRef ds:uri="http://schemas.microsoft.com/VisualStudio/2011/storyboarding/control"/>
+  </ds:schemaRefs>
+</ds:datastoreItem>
+</file>
+
+<file path=customXml/itemProps30.xml><?xml version="1.0" encoding="utf-8"?>
+<ds:datastoreItem xmlns:ds="http://schemas.openxmlformats.org/officeDocument/2006/customXml" ds:itemID="{6E62CDAE-686E-4F52-AABB-86BDB1154A1E}">
+  <ds:schemaRefs>
+    <ds:schemaRef ds:uri="http://schemas.microsoft.com/VisualStudio/2011/storyboarding/control"/>
+  </ds:schemaRefs>
+</ds:datastoreItem>
+</file>
+
+<file path=customXml/itemProps31.xml><?xml version="1.0" encoding="utf-8"?>
 <ds:datastoreItem xmlns:ds="http://schemas.openxmlformats.org/officeDocument/2006/customXml" ds:itemID="{E9B3074F-7568-498E-AB18-CABC99245B58}">
   <ds:schemaRefs>
     <ds:schemaRef ds:uri="http://schemas.microsoft.com/VisualStudio/2011/storyboarding/control"/>
@@ -27281,720 +27993,8 @@
 </ds:datastoreItem>
 </file>
 
-<file path=customXml/itemProps120.xml><?xml version="1.0" encoding="utf-8"?>
-<ds:datastoreItem xmlns:ds="http://schemas.openxmlformats.org/officeDocument/2006/customXml" ds:itemID="{DC24DB23-C3E0-4806-934A-5531299BFC48}">
-  <ds:schemaRefs>
-    <ds:schemaRef ds:uri="http://schemas.microsoft.com/VisualStudio/2011/storyboarding/control"/>
-  </ds:schemaRefs>
-</ds:datastoreItem>
-</file>
-
-<file path=customXml/itemProps121.xml><?xml version="1.0" encoding="utf-8"?>
-<ds:datastoreItem xmlns:ds="http://schemas.openxmlformats.org/officeDocument/2006/customXml" ds:itemID="{B0402FE7-8C5A-480B-84D5-E3BA5D7DDA9A}">
-  <ds:schemaRefs>
-    <ds:schemaRef ds:uri="http://schemas.microsoft.com/VisualStudio/2011/storyboarding/control"/>
-  </ds:schemaRefs>
-</ds:datastoreItem>
-</file>
-
-<file path=customXml/itemProps122.xml><?xml version="1.0" encoding="utf-8"?>
-<ds:datastoreItem xmlns:ds="http://schemas.openxmlformats.org/officeDocument/2006/customXml" ds:itemID="{6555F547-BDDA-4C26-9CE1-4C61E93A284F}">
-  <ds:schemaRefs>
-    <ds:schemaRef ds:uri="http://schemas.microsoft.com/VisualStudio/2011/storyboarding/control"/>
-  </ds:schemaRefs>
-</ds:datastoreItem>
-</file>
-
-<file path=customXml/itemProps123.xml><?xml version="1.0" encoding="utf-8"?>
-<ds:datastoreItem xmlns:ds="http://schemas.openxmlformats.org/officeDocument/2006/customXml" ds:itemID="{1159427B-15B9-477B-8DAD-D7C81D705523}">
-  <ds:schemaRefs>
-    <ds:schemaRef ds:uri="http://schemas.microsoft.com/VisualStudio/2011/storyboarding/control"/>
-  </ds:schemaRefs>
-</ds:datastoreItem>
-</file>
-
-<file path=customXml/itemProps124.xml><?xml version="1.0" encoding="utf-8"?>
-<ds:datastoreItem xmlns:ds="http://schemas.openxmlformats.org/officeDocument/2006/customXml" ds:itemID="{46365B3F-8663-4379-AD5B-D0EABBC1EDD3}">
-  <ds:schemaRefs>
-    <ds:schemaRef ds:uri="http://schemas.microsoft.com/VisualStudio/2011/storyboarding/control"/>
-  </ds:schemaRefs>
-</ds:datastoreItem>
-</file>
-
-<file path=customXml/itemProps125.xml><?xml version="1.0" encoding="utf-8"?>
-<ds:datastoreItem xmlns:ds="http://schemas.openxmlformats.org/officeDocument/2006/customXml" ds:itemID="{BC9894E6-7AC8-4518-A802-8C98F8565837}">
-  <ds:schemaRefs>
-    <ds:schemaRef ds:uri="http://schemas.microsoft.com/VisualStudio/2011/storyboarding/control"/>
-  </ds:schemaRefs>
-</ds:datastoreItem>
-</file>
-
-<file path=customXml/itemProps126.xml><?xml version="1.0" encoding="utf-8"?>
-<ds:datastoreItem xmlns:ds="http://schemas.openxmlformats.org/officeDocument/2006/customXml" ds:itemID="{CABD2B3A-1161-43E2-BA83-58E6B897C9BF}">
-  <ds:schemaRefs>
-    <ds:schemaRef ds:uri="http://schemas.microsoft.com/VisualStudio/2011/storyboarding/control"/>
-  </ds:schemaRefs>
-</ds:datastoreItem>
-</file>
-
-<file path=customXml/itemProps127.xml><?xml version="1.0" encoding="utf-8"?>
-<ds:datastoreItem xmlns:ds="http://schemas.openxmlformats.org/officeDocument/2006/customXml" ds:itemID="{1F111213-9B54-4464-8973-266EF211797B}">
-  <ds:schemaRefs>
-    <ds:schemaRef ds:uri="http://schemas.microsoft.com/VisualStudio/2011/storyboarding/control"/>
-  </ds:schemaRefs>
-</ds:datastoreItem>
-</file>
-
-<file path=customXml/itemProps128.xml><?xml version="1.0" encoding="utf-8"?>
-<ds:datastoreItem xmlns:ds="http://schemas.openxmlformats.org/officeDocument/2006/customXml" ds:itemID="{17A9B085-8E1A-4A33-B871-8166221A211A}">
-  <ds:schemaRefs>
-    <ds:schemaRef ds:uri="http://schemas.microsoft.com/VisualStudio/2011/storyboarding/control"/>
-  </ds:schemaRefs>
-</ds:datastoreItem>
-</file>
-
-<file path=customXml/itemProps129.xml><?xml version="1.0" encoding="utf-8"?>
-<ds:datastoreItem xmlns:ds="http://schemas.openxmlformats.org/officeDocument/2006/customXml" ds:itemID="{914EB071-267D-4D23-8EAD-39A664DF70DC}">
-  <ds:schemaRefs>
-    <ds:schemaRef ds:uri="http://schemas.microsoft.com/VisualStudio/2011/storyboarding/control"/>
-  </ds:schemaRefs>
-</ds:datastoreItem>
-</file>
-
-<file path=customXml/itemProps13.xml><?xml version="1.0" encoding="utf-8"?>
-<ds:datastoreItem xmlns:ds="http://schemas.openxmlformats.org/officeDocument/2006/customXml" ds:itemID="{8F7399B1-A9DB-4D84-95B4-5DD6BBAA5187}">
-  <ds:schemaRefs>
-    <ds:schemaRef ds:uri="http://schemas.microsoft.com/VisualStudio/2011/storyboarding/control"/>
-  </ds:schemaRefs>
-</ds:datastoreItem>
-</file>
-
-<file path=customXml/itemProps130.xml><?xml version="1.0" encoding="utf-8"?>
-<ds:datastoreItem xmlns:ds="http://schemas.openxmlformats.org/officeDocument/2006/customXml" ds:itemID="{B8677481-C0C6-468D-8B15-ECE0CB48746C}">
-  <ds:schemaRefs>
-    <ds:schemaRef ds:uri="http://schemas.microsoft.com/VisualStudio/2011/storyboarding/control"/>
-  </ds:schemaRefs>
-</ds:datastoreItem>
-</file>
-
-<file path=customXml/itemProps131.xml><?xml version="1.0" encoding="utf-8"?>
-<ds:datastoreItem xmlns:ds="http://schemas.openxmlformats.org/officeDocument/2006/customXml" ds:itemID="{C30452E4-8A6C-404A-B689-8E04350A6B59}">
-  <ds:schemaRefs>
-    <ds:schemaRef ds:uri="http://schemas.microsoft.com/VisualStudio/2011/storyboarding/control"/>
-  </ds:schemaRefs>
-</ds:datastoreItem>
-</file>
-
-<file path=customXml/itemProps132.xml><?xml version="1.0" encoding="utf-8"?>
-<ds:datastoreItem xmlns:ds="http://schemas.openxmlformats.org/officeDocument/2006/customXml" ds:itemID="{408DBD6E-BA86-4206-898C-8866D621C758}">
-  <ds:schemaRefs>
-    <ds:schemaRef ds:uri="http://schemas.microsoft.com/VisualStudio/2011/storyboarding/control"/>
-  </ds:schemaRefs>
-</ds:datastoreItem>
-</file>
-
-<file path=customXml/itemProps133.xml><?xml version="1.0" encoding="utf-8"?>
-<ds:datastoreItem xmlns:ds="http://schemas.openxmlformats.org/officeDocument/2006/customXml" ds:itemID="{3339E7B3-364E-4EE1-ABAB-0EFEF3F7CE1F}">
-  <ds:schemaRefs>
-    <ds:schemaRef ds:uri="http://schemas.microsoft.com/VisualStudio/2011/storyboarding/control"/>
-  </ds:schemaRefs>
-</ds:datastoreItem>
-</file>
-
-<file path=customXml/itemProps134.xml><?xml version="1.0" encoding="utf-8"?>
-<ds:datastoreItem xmlns:ds="http://schemas.openxmlformats.org/officeDocument/2006/customXml" ds:itemID="{3E700196-0E07-41FC-8F78-80FE3D9018FD}">
-  <ds:schemaRefs>
-    <ds:schemaRef ds:uri="http://schemas.microsoft.com/VisualStudio/2011/storyboarding/control"/>
-  </ds:schemaRefs>
-</ds:datastoreItem>
-</file>
-
-<file path=customXml/itemProps135.xml><?xml version="1.0" encoding="utf-8"?>
-<ds:datastoreItem xmlns:ds="http://schemas.openxmlformats.org/officeDocument/2006/customXml" ds:itemID="{EF5EA3E2-3902-4CA0-93F4-4F361DF72ABD}">
-  <ds:schemaRefs>
-    <ds:schemaRef ds:uri="http://schemas.microsoft.com/VisualStudio/2011/storyboarding/control"/>
-  </ds:schemaRefs>
-</ds:datastoreItem>
-</file>
-
-<file path=customXml/itemProps136.xml><?xml version="1.0" encoding="utf-8"?>
-<ds:datastoreItem xmlns:ds="http://schemas.openxmlformats.org/officeDocument/2006/customXml" ds:itemID="{D1100CDA-4C0B-4B20-A344-A7360173EF0F}">
-  <ds:schemaRefs>
-    <ds:schemaRef ds:uri="http://schemas.microsoft.com/VisualStudio/2011/storyboarding/control"/>
-  </ds:schemaRefs>
-</ds:datastoreItem>
-</file>
-
-<file path=customXml/itemProps137.xml><?xml version="1.0" encoding="utf-8"?>
-<ds:datastoreItem xmlns:ds="http://schemas.openxmlformats.org/officeDocument/2006/customXml" ds:itemID="{7D9FEB58-73F6-462F-A88A-C490995E4318}">
-  <ds:schemaRefs>
-    <ds:schemaRef ds:uri="http://schemas.microsoft.com/VisualStudio/2011/storyboarding/control"/>
-  </ds:schemaRefs>
-</ds:datastoreItem>
-</file>
-
-<file path=customXml/itemProps138.xml><?xml version="1.0" encoding="utf-8"?>
-<ds:datastoreItem xmlns:ds="http://schemas.openxmlformats.org/officeDocument/2006/customXml" ds:itemID="{B7D85223-23F1-4ACF-89DD-EE38AA7E4772}">
-  <ds:schemaRefs>
-    <ds:schemaRef ds:uri="http://schemas.microsoft.com/VisualStudio/2011/storyboarding/control"/>
-  </ds:schemaRefs>
-</ds:datastoreItem>
-</file>
-
-<file path=customXml/itemProps139.xml><?xml version="1.0" encoding="utf-8"?>
-<ds:datastoreItem xmlns:ds="http://schemas.openxmlformats.org/officeDocument/2006/customXml" ds:itemID="{8A260A91-3FD6-475C-8E6F-434835560933}">
-  <ds:schemaRefs>
-    <ds:schemaRef ds:uri="http://schemas.microsoft.com/VisualStudio/2011/storyboarding/control"/>
-  </ds:schemaRefs>
-</ds:datastoreItem>
-</file>
-
-<file path=customXml/itemProps14.xml><?xml version="1.0" encoding="utf-8"?>
-<ds:datastoreItem xmlns:ds="http://schemas.openxmlformats.org/officeDocument/2006/customXml" ds:itemID="{AF61DBC6-381C-43BF-8974-1BD37D61B73F}">
-  <ds:schemaRefs>
-    <ds:schemaRef ds:uri="http://schemas.microsoft.com/VisualStudio/2011/storyboarding/control"/>
-  </ds:schemaRefs>
-</ds:datastoreItem>
-</file>
-
-<file path=customXml/itemProps140.xml><?xml version="1.0" encoding="utf-8"?>
-<ds:datastoreItem xmlns:ds="http://schemas.openxmlformats.org/officeDocument/2006/customXml" ds:itemID="{E2D66C36-7379-4DD2-AA37-128CF4B262CF}">
-  <ds:schemaRefs>
-    <ds:schemaRef ds:uri="http://schemas.microsoft.com/VisualStudio/2011/storyboarding/control"/>
-  </ds:schemaRefs>
-</ds:datastoreItem>
-</file>
-
-<file path=customXml/itemProps141.xml><?xml version="1.0" encoding="utf-8"?>
-<ds:datastoreItem xmlns:ds="http://schemas.openxmlformats.org/officeDocument/2006/customXml" ds:itemID="{8EE50836-C4DB-4AC6-8DFD-677FDEAB9EAD}">
-  <ds:schemaRefs>
-    <ds:schemaRef ds:uri="http://schemas.microsoft.com/VisualStudio/2011/storyboarding/control"/>
-  </ds:schemaRefs>
-</ds:datastoreItem>
-</file>
-
-<file path=customXml/itemProps142.xml><?xml version="1.0" encoding="utf-8"?>
-<ds:datastoreItem xmlns:ds="http://schemas.openxmlformats.org/officeDocument/2006/customXml" ds:itemID="{F840D909-519B-49C3-9DCA-97C64A5B9C79}">
-  <ds:schemaRefs>
-    <ds:schemaRef ds:uri="http://schemas.microsoft.com/VisualStudio/2011/storyboarding/control"/>
-  </ds:schemaRefs>
-</ds:datastoreItem>
-</file>
-
-<file path=customXml/itemProps143.xml><?xml version="1.0" encoding="utf-8"?>
-<ds:datastoreItem xmlns:ds="http://schemas.openxmlformats.org/officeDocument/2006/customXml" ds:itemID="{48A06D39-512F-41A5-AE3C-7B4CDB4AC086}">
-  <ds:schemaRefs>
-    <ds:schemaRef ds:uri="http://schemas.microsoft.com/VisualStudio/2011/storyboarding/control"/>
-  </ds:schemaRefs>
-</ds:datastoreItem>
-</file>
-
-<file path=customXml/itemProps144.xml><?xml version="1.0" encoding="utf-8"?>
-<ds:datastoreItem xmlns:ds="http://schemas.openxmlformats.org/officeDocument/2006/customXml" ds:itemID="{FD6778B7-8FE2-4C81-885D-09500CE283B1}">
-  <ds:schemaRefs>
-    <ds:schemaRef ds:uri="http://schemas.microsoft.com/VisualStudio/2011/storyboarding/control"/>
-  </ds:schemaRefs>
-</ds:datastoreItem>
-</file>
-
-<file path=customXml/itemProps145.xml><?xml version="1.0" encoding="utf-8"?>
-<ds:datastoreItem xmlns:ds="http://schemas.openxmlformats.org/officeDocument/2006/customXml" ds:itemID="{C2FBE948-B9F1-4F1A-AC4F-03962924DC85}">
-  <ds:schemaRefs>
-    <ds:schemaRef ds:uri="http://schemas.microsoft.com/VisualStudio/2011/storyboarding/control"/>
-  </ds:schemaRefs>
-</ds:datastoreItem>
-</file>
-
-<file path=customXml/itemProps146.xml><?xml version="1.0" encoding="utf-8"?>
-<ds:datastoreItem xmlns:ds="http://schemas.openxmlformats.org/officeDocument/2006/customXml" ds:itemID="{6806E131-54C6-48B3-984A-5A1F4C5785D2}">
-  <ds:schemaRefs>
-    <ds:schemaRef ds:uri="http://schemas.microsoft.com/VisualStudio/2011/storyboarding/control"/>
-  </ds:schemaRefs>
-</ds:datastoreItem>
-</file>
-
-<file path=customXml/itemProps147.xml><?xml version="1.0" encoding="utf-8"?>
-<ds:datastoreItem xmlns:ds="http://schemas.openxmlformats.org/officeDocument/2006/customXml" ds:itemID="{A5548825-A252-43B9-8E93-D05CC009ABBE}">
-  <ds:schemaRefs>
-    <ds:schemaRef ds:uri="http://schemas.microsoft.com/VisualStudio/2011/storyboarding/control"/>
-  </ds:schemaRefs>
-</ds:datastoreItem>
-</file>
-
-<file path=customXml/itemProps148.xml><?xml version="1.0" encoding="utf-8"?>
-<ds:datastoreItem xmlns:ds="http://schemas.openxmlformats.org/officeDocument/2006/customXml" ds:itemID="{FA597DE2-CFB0-4358-AA98-055ACAFB4418}">
-  <ds:schemaRefs>
-    <ds:schemaRef ds:uri="http://schemas.microsoft.com/VisualStudio/2011/storyboarding/control"/>
-  </ds:schemaRefs>
-</ds:datastoreItem>
-</file>
-
-<file path=customXml/itemProps149.xml><?xml version="1.0" encoding="utf-8"?>
-<ds:datastoreItem xmlns:ds="http://schemas.openxmlformats.org/officeDocument/2006/customXml" ds:itemID="{701AFE5A-ADCF-4311-A5B5-18B338C7E907}">
-  <ds:schemaRefs>
-    <ds:schemaRef ds:uri="http://schemas.microsoft.com/VisualStudio/2011/storyboarding/control"/>
-  </ds:schemaRefs>
-</ds:datastoreItem>
-</file>
-
-<file path=customXml/itemProps15.xml><?xml version="1.0" encoding="utf-8"?>
-<ds:datastoreItem xmlns:ds="http://schemas.openxmlformats.org/officeDocument/2006/customXml" ds:itemID="{39E72E8E-79BB-456F-8049-0020919B4763}">
-  <ds:schemaRefs>
-    <ds:schemaRef ds:uri="http://schemas.microsoft.com/VisualStudio/2011/storyboarding/control"/>
-  </ds:schemaRefs>
-</ds:datastoreItem>
-</file>
-
-<file path=customXml/itemProps150.xml><?xml version="1.0" encoding="utf-8"?>
-<ds:datastoreItem xmlns:ds="http://schemas.openxmlformats.org/officeDocument/2006/customXml" ds:itemID="{D54CCA4C-C7B0-4AED-9D56-0F76C035783B}">
-  <ds:schemaRefs>
-    <ds:schemaRef ds:uri="http://schemas.microsoft.com/VisualStudio/2011/storyboarding/control"/>
-  </ds:schemaRefs>
-</ds:datastoreItem>
-</file>
-
-<file path=customXml/itemProps151.xml><?xml version="1.0" encoding="utf-8"?>
-<ds:datastoreItem xmlns:ds="http://schemas.openxmlformats.org/officeDocument/2006/customXml" ds:itemID="{F2C546CF-9CDC-44DE-AAD6-9FBD6A29F8B2}">
-  <ds:schemaRefs>
-    <ds:schemaRef ds:uri="http://schemas.microsoft.com/VisualStudio/2011/storyboarding/control"/>
-  </ds:schemaRefs>
-</ds:datastoreItem>
-</file>
-
-<file path=customXml/itemProps152.xml><?xml version="1.0" encoding="utf-8"?>
-<ds:datastoreItem xmlns:ds="http://schemas.openxmlformats.org/officeDocument/2006/customXml" ds:itemID="{161C1280-5A04-4E6E-8FE3-21E316A51B59}">
-  <ds:schemaRefs>
-    <ds:schemaRef ds:uri="http://schemas.microsoft.com/VisualStudio/2011/storyboarding/control"/>
-  </ds:schemaRefs>
-</ds:datastoreItem>
-</file>
-
-<file path=customXml/itemProps153.xml><?xml version="1.0" encoding="utf-8"?>
-<ds:datastoreItem xmlns:ds="http://schemas.openxmlformats.org/officeDocument/2006/customXml" ds:itemID="{A5B63E18-4237-42D4-B804-B83021F9E8A1}">
-  <ds:schemaRefs>
-    <ds:schemaRef ds:uri="http://schemas.microsoft.com/VisualStudio/2011/storyboarding/control"/>
-  </ds:schemaRefs>
-</ds:datastoreItem>
-</file>
-
-<file path=customXml/itemProps154.xml><?xml version="1.0" encoding="utf-8"?>
-<ds:datastoreItem xmlns:ds="http://schemas.openxmlformats.org/officeDocument/2006/customXml" ds:itemID="{7989F8B3-8E20-4455-9310-361DF73D03B3}">
-  <ds:schemaRefs>
-    <ds:schemaRef ds:uri="http://schemas.microsoft.com/VisualStudio/2011/storyboarding/control"/>
-  </ds:schemaRefs>
-</ds:datastoreItem>
-</file>
-
-<file path=customXml/itemProps155.xml><?xml version="1.0" encoding="utf-8"?>
-<ds:datastoreItem xmlns:ds="http://schemas.openxmlformats.org/officeDocument/2006/customXml" ds:itemID="{2AEF63D2-D198-4CCC-904A-422119B9CA6F}">
-  <ds:schemaRefs>
-    <ds:schemaRef ds:uri="http://schemas.microsoft.com/VisualStudio/2011/storyboarding/control"/>
-  </ds:schemaRefs>
-</ds:datastoreItem>
-</file>
-
-<file path=customXml/itemProps156.xml><?xml version="1.0" encoding="utf-8"?>
-<ds:datastoreItem xmlns:ds="http://schemas.openxmlformats.org/officeDocument/2006/customXml" ds:itemID="{F0564582-AFE3-40AE-AC24-282E787FE867}">
-  <ds:schemaRefs>
-    <ds:schemaRef ds:uri="http://schemas.microsoft.com/VisualStudio/2011/storyboarding/control"/>
-  </ds:schemaRefs>
-</ds:datastoreItem>
-</file>
-
-<file path=customXml/itemProps157.xml><?xml version="1.0" encoding="utf-8"?>
-<ds:datastoreItem xmlns:ds="http://schemas.openxmlformats.org/officeDocument/2006/customXml" ds:itemID="{C05A56CC-DCFE-4A97-B103-5E1633E28254}">
-  <ds:schemaRefs>
-    <ds:schemaRef ds:uri="http://schemas.microsoft.com/VisualStudio/2011/storyboarding/control"/>
-  </ds:schemaRefs>
-</ds:datastoreItem>
-</file>
-
-<file path=customXml/itemProps158.xml><?xml version="1.0" encoding="utf-8"?>
-<ds:datastoreItem xmlns:ds="http://schemas.openxmlformats.org/officeDocument/2006/customXml" ds:itemID="{8AE17CAA-BEF2-44CD-9DEE-2F8C17585A32}">
-  <ds:schemaRefs>
-    <ds:schemaRef ds:uri="http://schemas.microsoft.com/VisualStudio/2011/storyboarding/control"/>
-  </ds:schemaRefs>
-</ds:datastoreItem>
-</file>
-
-<file path=customXml/itemProps159.xml><?xml version="1.0" encoding="utf-8"?>
-<ds:datastoreItem xmlns:ds="http://schemas.openxmlformats.org/officeDocument/2006/customXml" ds:itemID="{A1F43F78-8591-47F2-9A56-991B5C2DCCFC}">
-  <ds:schemaRefs>
-    <ds:schemaRef ds:uri="http://schemas.microsoft.com/VisualStudio/2011/storyboarding/control"/>
-  </ds:schemaRefs>
-</ds:datastoreItem>
-</file>
-
-<file path=customXml/itemProps16.xml><?xml version="1.0" encoding="utf-8"?>
-<ds:datastoreItem xmlns:ds="http://schemas.openxmlformats.org/officeDocument/2006/customXml" ds:itemID="{9C6114CB-F4BA-4F35-827A-2DA5F8B255B0}">
-  <ds:schemaRefs>
-    <ds:schemaRef ds:uri="http://schemas.microsoft.com/VisualStudio/2011/storyboarding/control"/>
-  </ds:schemaRefs>
-</ds:datastoreItem>
-</file>
-
-<file path=customXml/itemProps160.xml><?xml version="1.0" encoding="utf-8"?>
-<ds:datastoreItem xmlns:ds="http://schemas.openxmlformats.org/officeDocument/2006/customXml" ds:itemID="{DAF42908-C10A-4B0A-BD53-0A9168593350}">
-  <ds:schemaRefs>
-    <ds:schemaRef ds:uri="http://schemas.microsoft.com/VisualStudio/2011/storyboarding/control"/>
-  </ds:schemaRefs>
-</ds:datastoreItem>
-</file>
-
-<file path=customXml/itemProps161.xml><?xml version="1.0" encoding="utf-8"?>
-<ds:datastoreItem xmlns:ds="http://schemas.openxmlformats.org/officeDocument/2006/customXml" ds:itemID="{9F2E68F6-6824-42A7-A3A1-3AE0F539496E}">
-  <ds:schemaRefs>
-    <ds:schemaRef ds:uri="http://schemas.microsoft.com/VisualStudio/2011/storyboarding/control"/>
-  </ds:schemaRefs>
-</ds:datastoreItem>
-</file>
-
-<file path=customXml/itemProps162.xml><?xml version="1.0" encoding="utf-8"?>
-<ds:datastoreItem xmlns:ds="http://schemas.openxmlformats.org/officeDocument/2006/customXml" ds:itemID="{AABF63A9-AA30-4DF6-8EF2-972AB7A4097F}">
-  <ds:schemaRefs>
-    <ds:schemaRef ds:uri="http://schemas.microsoft.com/VisualStudio/2011/storyboarding/control"/>
-  </ds:schemaRefs>
-</ds:datastoreItem>
-</file>
-
-<file path=customXml/itemProps163.xml><?xml version="1.0" encoding="utf-8"?>
-<ds:datastoreItem xmlns:ds="http://schemas.openxmlformats.org/officeDocument/2006/customXml" ds:itemID="{26EBF4A3-F17A-4E3E-A734-46BBA9DFA0C8}">
-  <ds:schemaRefs>
-    <ds:schemaRef ds:uri="http://schemas.microsoft.com/VisualStudio/2011/storyboarding/control"/>
-  </ds:schemaRefs>
-</ds:datastoreItem>
-</file>
-
-<file path=customXml/itemProps164.xml><?xml version="1.0" encoding="utf-8"?>
-<ds:datastoreItem xmlns:ds="http://schemas.openxmlformats.org/officeDocument/2006/customXml" ds:itemID="{B8E12DBA-650B-4369-8B51-0ED5654ECE37}">
-  <ds:schemaRefs>
-    <ds:schemaRef ds:uri="http://schemas.microsoft.com/VisualStudio/2011/storyboarding/control"/>
-  </ds:schemaRefs>
-</ds:datastoreItem>
-</file>
-
-<file path=customXml/itemProps165.xml><?xml version="1.0" encoding="utf-8"?>
-<ds:datastoreItem xmlns:ds="http://schemas.openxmlformats.org/officeDocument/2006/customXml" ds:itemID="{24900BF5-C4DC-42A1-8816-A384E671E92A}">
-  <ds:schemaRefs>
-    <ds:schemaRef ds:uri="http://schemas.microsoft.com/VisualStudio/2011/storyboarding/control"/>
-  </ds:schemaRefs>
-</ds:datastoreItem>
-</file>
-
-<file path=customXml/itemProps166.xml><?xml version="1.0" encoding="utf-8"?>
-<ds:datastoreItem xmlns:ds="http://schemas.openxmlformats.org/officeDocument/2006/customXml" ds:itemID="{D3E69636-CCB7-4030-8B08-9159922F7C18}">
-  <ds:schemaRefs>
-    <ds:schemaRef ds:uri="http://schemas.microsoft.com/VisualStudio/2011/storyboarding/control"/>
-  </ds:schemaRefs>
-</ds:datastoreItem>
-</file>
-
-<file path=customXml/itemProps167.xml><?xml version="1.0" encoding="utf-8"?>
-<ds:datastoreItem xmlns:ds="http://schemas.openxmlformats.org/officeDocument/2006/customXml" ds:itemID="{F2C13C45-9FD4-46A1-B566-8CFCB6433E4D}">
-  <ds:schemaRefs>
-    <ds:schemaRef ds:uri="http://schemas.microsoft.com/VisualStudio/2011/storyboarding/control"/>
-  </ds:schemaRefs>
-</ds:datastoreItem>
-</file>
-
-<file path=customXml/itemProps168.xml><?xml version="1.0" encoding="utf-8"?>
-<ds:datastoreItem xmlns:ds="http://schemas.openxmlformats.org/officeDocument/2006/customXml" ds:itemID="{500E728B-7A9B-4D12-B59B-8083B681FF18}">
-  <ds:schemaRefs>
-    <ds:schemaRef ds:uri="http://schemas.microsoft.com/VisualStudio/2011/storyboarding/control"/>
-  </ds:schemaRefs>
-</ds:datastoreItem>
-</file>
-
-<file path=customXml/itemProps169.xml><?xml version="1.0" encoding="utf-8"?>
-<ds:datastoreItem xmlns:ds="http://schemas.openxmlformats.org/officeDocument/2006/customXml" ds:itemID="{6BD97E69-24BE-47DA-8FEB-131A11003B19}">
-  <ds:schemaRefs>
-    <ds:schemaRef ds:uri="http://schemas.microsoft.com/VisualStudio/2011/storyboarding/control"/>
-  </ds:schemaRefs>
-</ds:datastoreItem>
-</file>
-
-<file path=customXml/itemProps17.xml><?xml version="1.0" encoding="utf-8"?>
+<file path=customXml/itemProps32.xml><?xml version="1.0" encoding="utf-8"?>
 <ds:datastoreItem xmlns:ds="http://schemas.openxmlformats.org/officeDocument/2006/customXml" ds:itemID="{991C2A14-C674-4C12-8CE8-7EAE1ABB4197}">
-  <ds:schemaRefs>
-    <ds:schemaRef ds:uri="http://schemas.microsoft.com/VisualStudio/2011/storyboarding/control"/>
-  </ds:schemaRefs>
-</ds:datastoreItem>
-</file>
-
-<file path=customXml/itemProps170.xml><?xml version="1.0" encoding="utf-8"?>
-<ds:datastoreItem xmlns:ds="http://schemas.openxmlformats.org/officeDocument/2006/customXml" ds:itemID="{E0FB4629-EC57-49BA-A2DF-156D734D924B}">
-  <ds:schemaRefs>
-    <ds:schemaRef ds:uri="http://schemas.microsoft.com/VisualStudio/2011/storyboarding/control"/>
-  </ds:schemaRefs>
-</ds:datastoreItem>
-</file>
-
-<file path=customXml/itemProps171.xml><?xml version="1.0" encoding="utf-8"?>
-<ds:datastoreItem xmlns:ds="http://schemas.openxmlformats.org/officeDocument/2006/customXml" ds:itemID="{215132C6-5D8F-4E41-9882-494A7FC0C124}">
-  <ds:schemaRefs>
-    <ds:schemaRef ds:uri="http://schemas.microsoft.com/VisualStudio/2011/storyboarding/control"/>
-  </ds:schemaRefs>
-</ds:datastoreItem>
-</file>
-
-<file path=customXml/itemProps172.xml><?xml version="1.0" encoding="utf-8"?>
-<ds:datastoreItem xmlns:ds="http://schemas.openxmlformats.org/officeDocument/2006/customXml" ds:itemID="{C85E147C-F6F1-445A-8F29-1DFA76FA167C}">
-  <ds:schemaRefs>
-    <ds:schemaRef ds:uri="http://schemas.microsoft.com/VisualStudio/2011/storyboarding/control"/>
-  </ds:schemaRefs>
-</ds:datastoreItem>
-</file>
-
-<file path=customXml/itemProps173.xml><?xml version="1.0" encoding="utf-8"?>
-<ds:datastoreItem xmlns:ds="http://schemas.openxmlformats.org/officeDocument/2006/customXml" ds:itemID="{478663F0-6D22-40DF-A721-0D85AF0A841E}">
-  <ds:schemaRefs>
-    <ds:schemaRef ds:uri="http://schemas.microsoft.com/VisualStudio/2011/storyboarding/control"/>
-  </ds:schemaRefs>
-</ds:datastoreItem>
-</file>
-
-<file path=customXml/itemProps174.xml><?xml version="1.0" encoding="utf-8"?>
-<ds:datastoreItem xmlns:ds="http://schemas.openxmlformats.org/officeDocument/2006/customXml" ds:itemID="{4E626C7F-4024-4418-87D9-7BEE58688CEB}">
-  <ds:schemaRefs>
-    <ds:schemaRef ds:uri="http://schemas.microsoft.com/VisualStudio/2011/storyboarding/control"/>
-  </ds:schemaRefs>
-</ds:datastoreItem>
-</file>
-
-<file path=customXml/itemProps175.xml><?xml version="1.0" encoding="utf-8"?>
-<ds:datastoreItem xmlns:ds="http://schemas.openxmlformats.org/officeDocument/2006/customXml" ds:itemID="{C8AF95B6-D0D3-4619-AB57-6FEEA90FA132}">
-  <ds:schemaRefs>
-    <ds:schemaRef ds:uri="http://schemas.microsoft.com/VisualStudio/2011/storyboarding/control"/>
-  </ds:schemaRefs>
-</ds:datastoreItem>
-</file>
-
-<file path=customXml/itemProps176.xml><?xml version="1.0" encoding="utf-8"?>
-<ds:datastoreItem xmlns:ds="http://schemas.openxmlformats.org/officeDocument/2006/customXml" ds:itemID="{6E62CDAE-686E-4F52-AABB-86BDB1154A1E}">
-  <ds:schemaRefs>
-    <ds:schemaRef ds:uri="http://schemas.microsoft.com/VisualStudio/2011/storyboarding/control"/>
-  </ds:schemaRefs>
-</ds:datastoreItem>
-</file>
-
-<file path=customXml/itemProps177.xml><?xml version="1.0" encoding="utf-8"?>
-<ds:datastoreItem xmlns:ds="http://schemas.openxmlformats.org/officeDocument/2006/customXml" ds:itemID="{F2E40C13-D83C-4295-AAE8-6BAF5097B834}">
-  <ds:schemaRefs>
-    <ds:schemaRef ds:uri="http://schemas.microsoft.com/VisualStudio/2011/storyboarding/control"/>
-  </ds:schemaRefs>
-</ds:datastoreItem>
-</file>
-
-<file path=customXml/itemProps178.xml><?xml version="1.0" encoding="utf-8"?>
-<ds:datastoreItem xmlns:ds="http://schemas.openxmlformats.org/officeDocument/2006/customXml" ds:itemID="{39B4EC38-E361-46E0-8D00-ECAF682C5ACD}">
-  <ds:schemaRefs>
-    <ds:schemaRef ds:uri="http://schemas.microsoft.com/VisualStudio/2011/storyboarding/control"/>
-  </ds:schemaRefs>
-</ds:datastoreItem>
-</file>
-
-<file path=customXml/itemProps179.xml><?xml version="1.0" encoding="utf-8"?>
-<ds:datastoreItem xmlns:ds="http://schemas.openxmlformats.org/officeDocument/2006/customXml" ds:itemID="{A0B644F4-E7AB-4C5F-99FA-46E0F4A05135}">
-  <ds:schemaRefs>
-    <ds:schemaRef ds:uri="http://schemas.microsoft.com/VisualStudio/2011/storyboarding/control"/>
-  </ds:schemaRefs>
-</ds:datastoreItem>
-</file>
-
-<file path=customXml/itemProps18.xml><?xml version="1.0" encoding="utf-8"?>
-<ds:datastoreItem xmlns:ds="http://schemas.openxmlformats.org/officeDocument/2006/customXml" ds:itemID="{9D841488-D9C9-470B-9DF0-06BC6C2C0775}">
-  <ds:schemaRefs>
-    <ds:schemaRef ds:uri="http://schemas.microsoft.com/VisualStudio/2011/storyboarding/control"/>
-  </ds:schemaRefs>
-</ds:datastoreItem>
-</file>
-
-<file path=customXml/itemProps180.xml><?xml version="1.0" encoding="utf-8"?>
-<ds:datastoreItem xmlns:ds="http://schemas.openxmlformats.org/officeDocument/2006/customXml" ds:itemID="{0D174F31-1395-420D-AE3A-5DBEFF0F4455}">
-  <ds:schemaRefs>
-    <ds:schemaRef ds:uri="http://schemas.microsoft.com/VisualStudio/2011/storyboarding/control"/>
-  </ds:schemaRefs>
-</ds:datastoreItem>
-</file>
-
-<file path=customXml/itemProps181.xml><?xml version="1.0" encoding="utf-8"?>
-<ds:datastoreItem xmlns:ds="http://schemas.openxmlformats.org/officeDocument/2006/customXml" ds:itemID="{905F7CBB-FF77-4853-ADB2-0B0D37590AA0}">
-  <ds:schemaRefs>
-    <ds:schemaRef ds:uri="http://schemas.microsoft.com/VisualStudio/2011/storyboarding/control"/>
-  </ds:schemaRefs>
-</ds:datastoreItem>
-</file>
-
-<file path=customXml/itemProps182.xml><?xml version="1.0" encoding="utf-8"?>
-<ds:datastoreItem xmlns:ds="http://schemas.openxmlformats.org/officeDocument/2006/customXml" ds:itemID="{1F20FE02-C571-465B-A4B9-BE3971D16C58}">
-  <ds:schemaRefs>
-    <ds:schemaRef ds:uri="http://schemas.microsoft.com/VisualStudio/2011/storyboarding/control"/>
-  </ds:schemaRefs>
-</ds:datastoreItem>
-</file>
-
-<file path=customXml/itemProps183.xml><?xml version="1.0" encoding="utf-8"?>
-<ds:datastoreItem xmlns:ds="http://schemas.openxmlformats.org/officeDocument/2006/customXml" ds:itemID="{4032A915-244F-4EED-B3D6-A7E329608545}">
-  <ds:schemaRefs>
-    <ds:schemaRef ds:uri="http://schemas.microsoft.com/VisualStudio/2011/storyboarding/control"/>
-  </ds:schemaRefs>
-</ds:datastoreItem>
-</file>
-
-<file path=customXml/itemProps184.xml><?xml version="1.0" encoding="utf-8"?>
-<ds:datastoreItem xmlns:ds="http://schemas.openxmlformats.org/officeDocument/2006/customXml" ds:itemID="{417DBAC8-3D39-4B42-B14B-DAEC2E68913B}">
-  <ds:schemaRefs>
-    <ds:schemaRef ds:uri="http://schemas.microsoft.com/VisualStudio/2011/storyboarding/control"/>
-  </ds:schemaRefs>
-</ds:datastoreItem>
-</file>
-
-<file path=customXml/itemProps185.xml><?xml version="1.0" encoding="utf-8"?>
-<ds:datastoreItem xmlns:ds="http://schemas.openxmlformats.org/officeDocument/2006/customXml" ds:itemID="{10A6C904-68E1-4411-B457-0419F97C209A}">
-  <ds:schemaRefs>
-    <ds:schemaRef ds:uri="http://schemas.microsoft.com/VisualStudio/2011/storyboarding/control"/>
-  </ds:schemaRefs>
-</ds:datastoreItem>
-</file>
-
-<file path=customXml/itemProps186.xml><?xml version="1.0" encoding="utf-8"?>
-<ds:datastoreItem xmlns:ds="http://schemas.openxmlformats.org/officeDocument/2006/customXml" ds:itemID="{E4B490A2-F594-479F-8C41-55AF5E408214}">
-  <ds:schemaRefs>
-    <ds:schemaRef ds:uri="http://schemas.microsoft.com/VisualStudio/2011/storyboarding/control"/>
-  </ds:schemaRefs>
-</ds:datastoreItem>
-</file>
-
-<file path=customXml/itemProps187.xml><?xml version="1.0" encoding="utf-8"?>
-<ds:datastoreItem xmlns:ds="http://schemas.openxmlformats.org/officeDocument/2006/customXml" ds:itemID="{0B9DBAA4-EBE1-45AE-B925-2C045568C049}">
-  <ds:schemaRefs>
-    <ds:schemaRef ds:uri="http://schemas.microsoft.com/VisualStudio/2011/storyboarding/control"/>
-  </ds:schemaRefs>
-</ds:datastoreItem>
-</file>
-
-<file path=customXml/itemProps19.xml><?xml version="1.0" encoding="utf-8"?>
-<ds:datastoreItem xmlns:ds="http://schemas.openxmlformats.org/officeDocument/2006/customXml" ds:itemID="{BDF653D0-0803-4E4F-AB2B-0C004B440C9C}">
-  <ds:schemaRefs>
-    <ds:schemaRef ds:uri="http://schemas.microsoft.com/VisualStudio/2011/storyboarding/control"/>
-  </ds:schemaRefs>
-</ds:datastoreItem>
-</file>
-
-<file path=customXml/itemProps2.xml><?xml version="1.0" encoding="utf-8"?>
-<ds:datastoreItem xmlns:ds="http://schemas.openxmlformats.org/officeDocument/2006/customXml" ds:itemID="{BE30DC31-8F8A-48CF-A072-77607577B2FB}">
-  <ds:schemaRefs>
-    <ds:schemaRef ds:uri="http://schemas.microsoft.com/VisualStudio/2011/storyboarding/control"/>
-  </ds:schemaRefs>
-</ds:datastoreItem>
-</file>
-
-<file path=customXml/itemProps20.xml><?xml version="1.0" encoding="utf-8"?>
-<ds:datastoreItem xmlns:ds="http://schemas.openxmlformats.org/officeDocument/2006/customXml" ds:itemID="{CC5F127A-2521-4BB3-9D64-238B9FDD6AF8}">
-  <ds:schemaRefs>
-    <ds:schemaRef ds:uri="http://schemas.microsoft.com/VisualStudio/2011/storyboarding/control"/>
-  </ds:schemaRefs>
-</ds:datastoreItem>
-</file>
-
-<file path=customXml/itemProps21.xml><?xml version="1.0" encoding="utf-8"?>
-<ds:datastoreItem xmlns:ds="http://schemas.openxmlformats.org/officeDocument/2006/customXml" ds:itemID="{70E3F600-4C8D-4A3A-BE16-3540F66AD848}">
-  <ds:schemaRefs>
-    <ds:schemaRef ds:uri="http://schemas.microsoft.com/VisualStudio/2011/storyboarding/control"/>
-  </ds:schemaRefs>
-</ds:datastoreItem>
-</file>
-
-<file path=customXml/itemProps22.xml><?xml version="1.0" encoding="utf-8"?>
-<ds:datastoreItem xmlns:ds="http://schemas.openxmlformats.org/officeDocument/2006/customXml" ds:itemID="{CF03DD0F-EDED-4182-BF0D-C60EA8AC9FC5}">
-  <ds:schemaRefs>
-    <ds:schemaRef ds:uri="http://schemas.microsoft.com/VisualStudio/2011/storyboarding/control"/>
-  </ds:schemaRefs>
-</ds:datastoreItem>
-</file>
-
-<file path=customXml/itemProps23.xml><?xml version="1.0" encoding="utf-8"?>
-<ds:datastoreItem xmlns:ds="http://schemas.openxmlformats.org/officeDocument/2006/customXml" ds:itemID="{518A7A68-78B7-4838-B312-03860E01DFC2}">
-  <ds:schemaRefs>
-    <ds:schemaRef ds:uri="http://schemas.microsoft.com/VisualStudio/2011/storyboarding/control"/>
-  </ds:schemaRefs>
-</ds:datastoreItem>
-</file>
-
-<file path=customXml/itemProps24.xml><?xml version="1.0" encoding="utf-8"?>
-<ds:datastoreItem xmlns:ds="http://schemas.openxmlformats.org/officeDocument/2006/customXml" ds:itemID="{DC4F4190-4090-481C-95E3-E7A883513D24}">
-  <ds:schemaRefs>
-    <ds:schemaRef ds:uri="http://schemas.microsoft.com/VisualStudio/2011/storyboarding/control"/>
-  </ds:schemaRefs>
-</ds:datastoreItem>
-</file>
-
-<file path=customXml/itemProps25.xml><?xml version="1.0" encoding="utf-8"?>
-<ds:datastoreItem xmlns:ds="http://schemas.openxmlformats.org/officeDocument/2006/customXml" ds:itemID="{E194B3CD-86C3-4F6B-A743-1D8043783C25}">
-  <ds:schemaRefs>
-    <ds:schemaRef ds:uri="http://schemas.microsoft.com/VisualStudio/2011/storyboarding/control"/>
-  </ds:schemaRefs>
-</ds:datastoreItem>
-</file>
-
-<file path=customXml/itemProps26.xml><?xml version="1.0" encoding="utf-8"?>
-<ds:datastoreItem xmlns:ds="http://schemas.openxmlformats.org/officeDocument/2006/customXml" ds:itemID="{C65B337F-737A-48CA-8F75-978A60D7016D}">
-  <ds:schemaRefs>
-    <ds:schemaRef ds:uri="http://schemas.microsoft.com/VisualStudio/2011/storyboarding/control"/>
-  </ds:schemaRefs>
-</ds:datastoreItem>
-</file>
-
-<file path=customXml/itemProps27.xml><?xml version="1.0" encoding="utf-8"?>
-<ds:datastoreItem xmlns:ds="http://schemas.openxmlformats.org/officeDocument/2006/customXml" ds:itemID="{7FDD124D-E3E9-4D15-9954-8BE945E00BA2}">
-  <ds:schemaRefs>
-    <ds:schemaRef ds:uri="http://schemas.microsoft.com/VisualStudio/2011/storyboarding/control"/>
-  </ds:schemaRefs>
-</ds:datastoreItem>
-</file>
-
-<file path=customXml/itemProps28.xml><?xml version="1.0" encoding="utf-8"?>
-<ds:datastoreItem xmlns:ds="http://schemas.openxmlformats.org/officeDocument/2006/customXml" ds:itemID="{242CB00D-BA5D-43C6-B335-4CBC590CA72E}">
-  <ds:schemaRefs>
-    <ds:schemaRef ds:uri="http://schemas.microsoft.com/VisualStudio/2011/storyboarding/control"/>
-  </ds:schemaRefs>
-</ds:datastoreItem>
-</file>
-
-<file path=customXml/itemProps29.xml><?xml version="1.0" encoding="utf-8"?>
-<ds:datastoreItem xmlns:ds="http://schemas.openxmlformats.org/officeDocument/2006/customXml" ds:itemID="{29F09D18-0D3C-4F1D-ABE0-73E2474806CB}">
-  <ds:schemaRefs>
-    <ds:schemaRef ds:uri="http://schemas.microsoft.com/VisualStudio/2011/storyboarding/control"/>
-  </ds:schemaRefs>
-</ds:datastoreItem>
-</file>
-
-<file path=customXml/itemProps3.xml><?xml version="1.0" encoding="utf-8"?>
-<ds:datastoreItem xmlns:ds="http://schemas.openxmlformats.org/officeDocument/2006/customXml" ds:itemID="{3154CB70-BAFF-4B34-BC33-BD1C66EB86D7}">
-  <ds:schemaRefs>
-    <ds:schemaRef ds:uri="http://schemas.microsoft.com/VisualStudio/2011/storyboarding/control"/>
-  </ds:schemaRefs>
-</ds:datastoreItem>
-</file>
-
-<file path=customXml/itemProps30.xml><?xml version="1.0" encoding="utf-8"?>
-<ds:datastoreItem xmlns:ds="http://schemas.openxmlformats.org/officeDocument/2006/customXml" ds:itemID="{318A67F4-7454-49D3-B5F7-EDF3AEE6B3CC}">
-  <ds:schemaRefs>
-    <ds:schemaRef ds:uri="http://schemas.microsoft.com/VisualStudio/2011/storyboarding/control"/>
-  </ds:schemaRefs>
-</ds:datastoreItem>
-</file>
-
-<file path=customXml/itemProps31.xml><?xml version="1.0" encoding="utf-8"?>
-<ds:datastoreItem xmlns:ds="http://schemas.openxmlformats.org/officeDocument/2006/customXml" ds:itemID="{766F77BC-3956-438F-94BE-CF6CF9C915C0}">
-  <ds:schemaRefs>
-    <ds:schemaRef ds:uri="http://schemas.microsoft.com/VisualStudio/2011/storyboarding/control"/>
-  </ds:schemaRefs>
-</ds:datastoreItem>
-</file>
-
-<file path=customXml/itemProps32.xml><?xml version="1.0" encoding="utf-8"?>
-<ds:datastoreItem xmlns:ds="http://schemas.openxmlformats.org/officeDocument/2006/customXml" ds:itemID="{E0CC2506-29F9-46DF-9492-65B12C0522D5}">
   <ds:schemaRefs>
     <ds:schemaRef ds:uri="http://schemas.microsoft.com/VisualStudio/2011/storyboarding/control"/>
   </ds:schemaRefs>
@@ -28010,6 +28010,350 @@
 </file>
 
 <file path=customXml/itemProps34.xml><?xml version="1.0" encoding="utf-8"?>
+<ds:datastoreItem xmlns:ds="http://schemas.openxmlformats.org/officeDocument/2006/customXml" ds:itemID="{199B4AEE-2A28-4269-AEAC-CF63B1A2C9C1}">
+  <ds:schemaRefs>
+    <ds:schemaRef ds:uri="http://schemas.microsoft.com/VisualStudio/2011/storyboarding/control"/>
+  </ds:schemaRefs>
+</ds:datastoreItem>
+</file>
+
+<file path=customXml/itemProps35.xml><?xml version="1.0" encoding="utf-8"?>
+<ds:datastoreItem xmlns:ds="http://schemas.openxmlformats.org/officeDocument/2006/customXml" ds:itemID="{46714D06-B7FD-48A9-91D0-7F1510C73858}">
+  <ds:schemaRefs>
+    <ds:schemaRef ds:uri="http://schemas.microsoft.com/VisualStudio/2011/storyboarding/control"/>
+  </ds:schemaRefs>
+</ds:datastoreItem>
+</file>
+
+<file path=customXml/itemProps36.xml><?xml version="1.0" encoding="utf-8"?>
+<ds:datastoreItem xmlns:ds="http://schemas.openxmlformats.org/officeDocument/2006/customXml" ds:itemID="{3CA43762-3F39-470A-9564-3739655F8186}">
+  <ds:schemaRefs>
+    <ds:schemaRef ds:uri="http://schemas.microsoft.com/VisualStudio/2011/storyboarding/control"/>
+  </ds:schemaRefs>
+</ds:datastoreItem>
+</file>
+
+<file path=customXml/itemProps37.xml><?xml version="1.0" encoding="utf-8"?>
+<ds:datastoreItem xmlns:ds="http://schemas.openxmlformats.org/officeDocument/2006/customXml" ds:itemID="{D9B490FA-A64C-40B6-8247-CD5808900A10}">
+  <ds:schemaRefs>
+    <ds:schemaRef ds:uri="http://schemas.microsoft.com/VisualStudio/2011/storyboarding/control"/>
+  </ds:schemaRefs>
+</ds:datastoreItem>
+</file>
+
+<file path=customXml/itemProps38.xml><?xml version="1.0" encoding="utf-8"?>
+<ds:datastoreItem xmlns:ds="http://schemas.openxmlformats.org/officeDocument/2006/customXml" ds:itemID="{46365B3F-8663-4379-AD5B-D0EABBC1EDD3}">
+  <ds:schemaRefs>
+    <ds:schemaRef ds:uri="http://schemas.microsoft.com/VisualStudio/2011/storyboarding/control"/>
+  </ds:schemaRefs>
+</ds:datastoreItem>
+</file>
+
+<file path=customXml/itemProps39.xml><?xml version="1.0" encoding="utf-8"?>
+<ds:datastoreItem xmlns:ds="http://schemas.openxmlformats.org/officeDocument/2006/customXml" ds:itemID="{914EB071-267D-4D23-8EAD-39A664DF70DC}">
+  <ds:schemaRefs>
+    <ds:schemaRef ds:uri="http://schemas.microsoft.com/VisualStudio/2011/storyboarding/control"/>
+  </ds:schemaRefs>
+</ds:datastoreItem>
+</file>
+
+<file path=customXml/itemProps4.xml><?xml version="1.0" encoding="utf-8"?>
+<ds:datastoreItem xmlns:ds="http://schemas.openxmlformats.org/officeDocument/2006/customXml" ds:itemID="{149B1CD2-B7C7-4B38-9713-13FEE7CAC5CF}">
+  <ds:schemaRefs>
+    <ds:schemaRef ds:uri="http://schemas.microsoft.com/VisualStudio/2011/storyboarding/control"/>
+  </ds:schemaRefs>
+</ds:datastoreItem>
+</file>
+
+<file path=customXml/itemProps40.xml><?xml version="1.0" encoding="utf-8"?>
+<ds:datastoreItem xmlns:ds="http://schemas.openxmlformats.org/officeDocument/2006/customXml" ds:itemID="{57FFB7F0-24A5-4BA8-AA91-8BFC251E2323}">
+  <ds:schemaRefs>
+    <ds:schemaRef ds:uri="http://schemas.microsoft.com/VisualStudio/2011/storyboarding/control"/>
+  </ds:schemaRefs>
+</ds:datastoreItem>
+</file>
+
+<file path=customXml/itemProps41.xml><?xml version="1.0" encoding="utf-8"?>
+<ds:datastoreItem xmlns:ds="http://schemas.openxmlformats.org/officeDocument/2006/customXml" ds:itemID="{0987803F-8C29-460C-9CFE-90D062BBF340}">
+  <ds:schemaRefs>
+    <ds:schemaRef ds:uri="http://schemas.microsoft.com/VisualStudio/2011/storyboarding/control"/>
+  </ds:schemaRefs>
+</ds:datastoreItem>
+</file>
+
+<file path=customXml/itemProps42.xml><?xml version="1.0" encoding="utf-8"?>
+<ds:datastoreItem xmlns:ds="http://schemas.openxmlformats.org/officeDocument/2006/customXml" ds:itemID="{E886A3B6-32CF-43FB-BFDC-824E566105C6}">
+  <ds:schemaRefs>
+    <ds:schemaRef ds:uri="http://schemas.microsoft.com/VisualStudio/2011/storyboarding/control"/>
+  </ds:schemaRefs>
+</ds:datastoreItem>
+</file>
+
+<file path=customXml/itemProps43.xml><?xml version="1.0" encoding="utf-8"?>
+<ds:datastoreItem xmlns:ds="http://schemas.openxmlformats.org/officeDocument/2006/customXml" ds:itemID="{A75B2111-FBDC-4291-9EA3-2B57563F245C}">
+  <ds:schemaRefs>
+    <ds:schemaRef ds:uri="http://schemas.microsoft.com/VisualStudio/2011/storyboarding/control"/>
+  </ds:schemaRefs>
+</ds:datastoreItem>
+</file>
+
+<file path=customXml/itemProps44.xml><?xml version="1.0" encoding="utf-8"?>
+<ds:datastoreItem xmlns:ds="http://schemas.openxmlformats.org/officeDocument/2006/customXml" ds:itemID="{E243988D-F926-45CE-8E57-8F03AD990A6C}">
+  <ds:schemaRefs>
+    <ds:schemaRef ds:uri="http://schemas.microsoft.com/VisualStudio/2011/storyboarding/control"/>
+  </ds:schemaRefs>
+</ds:datastoreItem>
+</file>
+
+<file path=customXml/itemProps45.xml><?xml version="1.0" encoding="utf-8"?>
+<ds:datastoreItem xmlns:ds="http://schemas.openxmlformats.org/officeDocument/2006/customXml" ds:itemID="{E2D66C36-7379-4DD2-AA37-128CF4B262CF}">
+  <ds:schemaRefs>
+    <ds:schemaRef ds:uri="http://schemas.microsoft.com/VisualStudio/2011/storyboarding/control"/>
+  </ds:schemaRefs>
+</ds:datastoreItem>
+</file>
+
+<file path=customXml/itemProps46.xml><?xml version="1.0" encoding="utf-8"?>
+<ds:datastoreItem xmlns:ds="http://schemas.openxmlformats.org/officeDocument/2006/customXml" ds:itemID="{C2FBE948-B9F1-4F1A-AC4F-03962924DC85}">
+  <ds:schemaRefs>
+    <ds:schemaRef ds:uri="http://schemas.microsoft.com/VisualStudio/2011/storyboarding/control"/>
+  </ds:schemaRefs>
+</ds:datastoreItem>
+</file>
+
+<file path=customXml/itemProps47.xml><?xml version="1.0" encoding="utf-8"?>
+<ds:datastoreItem xmlns:ds="http://schemas.openxmlformats.org/officeDocument/2006/customXml" ds:itemID="{9F2E68F6-6824-42A7-A3A1-3AE0F539496E}">
+  <ds:schemaRefs>
+    <ds:schemaRef ds:uri="http://schemas.microsoft.com/VisualStudio/2011/storyboarding/control"/>
+  </ds:schemaRefs>
+</ds:datastoreItem>
+</file>
+
+<file path=customXml/itemProps48.xml><?xml version="1.0" encoding="utf-8"?>
+<ds:datastoreItem xmlns:ds="http://schemas.openxmlformats.org/officeDocument/2006/customXml" ds:itemID="{D3E69636-CCB7-4030-8B08-9159922F7C18}">
+  <ds:schemaRefs>
+    <ds:schemaRef ds:uri="http://schemas.microsoft.com/VisualStudio/2011/storyboarding/control"/>
+  </ds:schemaRefs>
+</ds:datastoreItem>
+</file>
+
+<file path=customXml/itemProps49.xml><?xml version="1.0" encoding="utf-8"?>
+<ds:datastoreItem xmlns:ds="http://schemas.openxmlformats.org/officeDocument/2006/customXml" ds:itemID="{1F20FE02-C571-465B-A4B9-BE3971D16C58}">
+  <ds:schemaRefs>
+    <ds:schemaRef ds:uri="http://schemas.microsoft.com/VisualStudio/2011/storyboarding/control"/>
+  </ds:schemaRefs>
+</ds:datastoreItem>
+</file>
+
+<file path=customXml/itemProps5.xml><?xml version="1.0" encoding="utf-8"?>
+<ds:datastoreItem xmlns:ds="http://schemas.openxmlformats.org/officeDocument/2006/customXml" ds:itemID="{438B7A44-EBDD-41BA-B093-6D278F4F7459}">
+  <ds:schemaRefs>
+    <ds:schemaRef ds:uri="http://schemas.microsoft.com/VisualStudio/2011/storyboarding/control"/>
+  </ds:schemaRefs>
+</ds:datastoreItem>
+</file>
+
+<file path=customXml/itemProps50.xml><?xml version="1.0" encoding="utf-8"?>
+<ds:datastoreItem xmlns:ds="http://schemas.openxmlformats.org/officeDocument/2006/customXml" ds:itemID="{0B9DBAA4-EBE1-45AE-B925-2C045568C049}">
+  <ds:schemaRefs>
+    <ds:schemaRef ds:uri="http://schemas.microsoft.com/VisualStudio/2011/storyboarding/control"/>
+  </ds:schemaRefs>
+</ds:datastoreItem>
+</file>
+
+<file path=customXml/itemProps51.xml><?xml version="1.0" encoding="utf-8"?>
+<ds:datastoreItem xmlns:ds="http://schemas.openxmlformats.org/officeDocument/2006/customXml" ds:itemID="{A1C8479A-2384-424B-B607-91A9FC70F6A4}">
+  <ds:schemaRefs>
+    <ds:schemaRef ds:uri="http://schemas.microsoft.com/VisualStudio/2011/storyboarding/control"/>
+  </ds:schemaRefs>
+</ds:datastoreItem>
+</file>
+
+<file path=customXml/itemProps52.xml><?xml version="1.0" encoding="utf-8"?>
+<ds:datastoreItem xmlns:ds="http://schemas.openxmlformats.org/officeDocument/2006/customXml" ds:itemID="{43588560-03AB-428A-9CE4-A6AC7508369A}">
+  <ds:schemaRefs>
+    <ds:schemaRef ds:uri="http://schemas.microsoft.com/VisualStudio/2011/storyboarding/control"/>
+  </ds:schemaRefs>
+</ds:datastoreItem>
+</file>
+
+<file path=customXml/itemProps53.xml><?xml version="1.0" encoding="utf-8"?>
+<ds:datastoreItem xmlns:ds="http://schemas.openxmlformats.org/officeDocument/2006/customXml" ds:itemID="{518A7A68-78B7-4838-B312-03860E01DFC2}">
+  <ds:schemaRefs>
+    <ds:schemaRef ds:uri="http://schemas.microsoft.com/VisualStudio/2011/storyboarding/control"/>
+  </ds:schemaRefs>
+</ds:datastoreItem>
+</file>
+
+<file path=customXml/itemProps54.xml><?xml version="1.0" encoding="utf-8"?>
+<ds:datastoreItem xmlns:ds="http://schemas.openxmlformats.org/officeDocument/2006/customXml" ds:itemID="{242CB00D-BA5D-43C6-B335-4CBC590CA72E}">
+  <ds:schemaRefs>
+    <ds:schemaRef ds:uri="http://schemas.microsoft.com/VisualStudio/2011/storyboarding/control"/>
+  </ds:schemaRefs>
+</ds:datastoreItem>
+</file>
+
+<file path=customXml/itemProps55.xml><?xml version="1.0" encoding="utf-8"?>
+<ds:datastoreItem xmlns:ds="http://schemas.openxmlformats.org/officeDocument/2006/customXml" ds:itemID="{C36DB154-AE5E-441B-8E32-9C0203D538F6}">
+  <ds:schemaRefs>
+    <ds:schemaRef ds:uri="http://schemas.microsoft.com/VisualStudio/2011/storyboarding/control"/>
+  </ds:schemaRefs>
+</ds:datastoreItem>
+</file>
+
+<file path=customXml/itemProps56.xml><?xml version="1.0" encoding="utf-8"?>
+<ds:datastoreItem xmlns:ds="http://schemas.openxmlformats.org/officeDocument/2006/customXml" ds:itemID="{F2B3FB12-0841-4AD8-9A0B-0A04CC6A8CFC}">
+  <ds:schemaRefs>
+    <ds:schemaRef ds:uri="http://schemas.microsoft.com/VisualStudio/2011/storyboarding/control"/>
+  </ds:schemaRefs>
+</ds:datastoreItem>
+</file>
+
+<file path=customXml/itemProps57.xml><?xml version="1.0" encoding="utf-8"?>
+<ds:datastoreItem xmlns:ds="http://schemas.openxmlformats.org/officeDocument/2006/customXml" ds:itemID="{9DAF7C4A-2E75-435E-8C11-B1DC53AC52EB}">
+  <ds:schemaRefs>
+    <ds:schemaRef ds:uri="http://schemas.microsoft.com/VisualStudio/2011/storyboarding/control"/>
+  </ds:schemaRefs>
+</ds:datastoreItem>
+</file>
+
+<file path=customXml/itemProps58.xml><?xml version="1.0" encoding="utf-8"?>
+<ds:datastoreItem xmlns:ds="http://schemas.openxmlformats.org/officeDocument/2006/customXml" ds:itemID="{B472B8AC-8A53-4AB2-879D-1716C227F63F}">
+  <ds:schemaRefs>
+    <ds:schemaRef ds:uri="http://schemas.microsoft.com/VisualStudio/2011/storyboarding/control"/>
+  </ds:schemaRefs>
+</ds:datastoreItem>
+</file>
+
+<file path=customXml/itemProps59.xml><?xml version="1.0" encoding="utf-8"?>
+<ds:datastoreItem xmlns:ds="http://schemas.openxmlformats.org/officeDocument/2006/customXml" ds:itemID="{C4583063-FB7A-486E-B271-71E78059E19B}">
+  <ds:schemaRefs>
+    <ds:schemaRef ds:uri="http://schemas.microsoft.com/VisualStudio/2011/storyboarding/control"/>
+  </ds:schemaRefs>
+</ds:datastoreItem>
+</file>
+
+<file path=customXml/itemProps6.xml><?xml version="1.0" encoding="utf-8"?>
+<ds:datastoreItem xmlns:ds="http://schemas.openxmlformats.org/officeDocument/2006/customXml" ds:itemID="{17A9B085-8E1A-4A33-B871-8166221A211A}">
+  <ds:schemaRefs>
+    <ds:schemaRef ds:uri="http://schemas.microsoft.com/VisualStudio/2011/storyboarding/control"/>
+  </ds:schemaRefs>
+</ds:datastoreItem>
+</file>
+
+<file path=customXml/itemProps60.xml><?xml version="1.0" encoding="utf-8"?>
+<ds:datastoreItem xmlns:ds="http://schemas.openxmlformats.org/officeDocument/2006/customXml" ds:itemID="{A3F62A8C-3D6E-45AB-989A-0299CCDC7BDF}">
+  <ds:schemaRefs>
+    <ds:schemaRef ds:uri="http://schemas.microsoft.com/VisualStudio/2011/storyboarding/control"/>
+  </ds:schemaRefs>
+</ds:datastoreItem>
+</file>
+
+<file path=customXml/itemProps61.xml><?xml version="1.0" encoding="utf-8"?>
+<ds:datastoreItem xmlns:ds="http://schemas.openxmlformats.org/officeDocument/2006/customXml" ds:itemID="{E28B7CEA-1FBD-4F14-BDA2-C48C66B37150}">
+  <ds:schemaRefs>
+    <ds:schemaRef ds:uri="http://schemas.microsoft.com/VisualStudio/2011/storyboarding/control"/>
+  </ds:schemaRefs>
+</ds:datastoreItem>
+</file>
+
+<file path=customXml/itemProps62.xml><?xml version="1.0" encoding="utf-8"?>
+<ds:datastoreItem xmlns:ds="http://schemas.openxmlformats.org/officeDocument/2006/customXml" ds:itemID="{06D91DB4-751F-47F3-B3CD-CDDA280C9652}">
+  <ds:schemaRefs>
+    <ds:schemaRef ds:uri="http://schemas.microsoft.com/VisualStudio/2011/storyboarding/control"/>
+  </ds:schemaRefs>
+</ds:datastoreItem>
+</file>
+
+<file path=customXml/itemProps63.xml><?xml version="1.0" encoding="utf-8"?>
+<ds:datastoreItem xmlns:ds="http://schemas.openxmlformats.org/officeDocument/2006/customXml" ds:itemID="{B8677481-C0C6-468D-8B15-ECE0CB48746C}">
+  <ds:schemaRefs>
+    <ds:schemaRef ds:uri="http://schemas.microsoft.com/VisualStudio/2011/storyboarding/control"/>
+  </ds:schemaRefs>
+</ds:datastoreItem>
+</file>
+
+<file path=customXml/itemProps64.xml><?xml version="1.0" encoding="utf-8"?>
+<ds:datastoreItem xmlns:ds="http://schemas.openxmlformats.org/officeDocument/2006/customXml" ds:itemID="{EF5EA3E2-3902-4CA0-93F4-4F361DF72ABD}">
+  <ds:schemaRefs>
+    <ds:schemaRef ds:uri="http://schemas.microsoft.com/VisualStudio/2011/storyboarding/control"/>
+  </ds:schemaRefs>
+</ds:datastoreItem>
+</file>
+
+<file path=customXml/itemProps65.xml><?xml version="1.0" encoding="utf-8"?>
+<ds:datastoreItem xmlns:ds="http://schemas.openxmlformats.org/officeDocument/2006/customXml" ds:itemID="{F2C546CF-9CDC-44DE-AAD6-9FBD6A29F8B2}">
+  <ds:schemaRefs>
+    <ds:schemaRef ds:uri="http://schemas.microsoft.com/VisualStudio/2011/storyboarding/control"/>
+  </ds:schemaRefs>
+</ds:datastoreItem>
+</file>
+
+<file path=customXml/itemProps66.xml><?xml version="1.0" encoding="utf-8"?>
+<ds:datastoreItem xmlns:ds="http://schemas.openxmlformats.org/officeDocument/2006/customXml" ds:itemID="{F0564582-AFE3-40AE-AC24-282E787FE867}">
+  <ds:schemaRefs>
+    <ds:schemaRef ds:uri="http://schemas.microsoft.com/VisualStudio/2011/storyboarding/control"/>
+  </ds:schemaRefs>
+</ds:datastoreItem>
+</file>
+
+<file path=customXml/itemProps67.xml><?xml version="1.0" encoding="utf-8"?>
+<ds:datastoreItem xmlns:ds="http://schemas.openxmlformats.org/officeDocument/2006/customXml" ds:itemID="{F2E40C13-D83C-4295-AAE8-6BAF5097B834}">
+  <ds:schemaRefs>
+    <ds:schemaRef ds:uri="http://schemas.microsoft.com/VisualStudio/2011/storyboarding/control"/>
+  </ds:schemaRefs>
+</ds:datastoreItem>
+</file>
+
+<file path=customXml/itemProps68.xml><?xml version="1.0" encoding="utf-8"?>
+<ds:datastoreItem xmlns:ds="http://schemas.openxmlformats.org/officeDocument/2006/customXml" ds:itemID="{C85E147C-F6F1-445A-8F29-1DFA76FA167C}">
+  <ds:schemaRefs>
+    <ds:schemaRef ds:uri="http://schemas.microsoft.com/VisualStudio/2011/storyboarding/control"/>
+  </ds:schemaRefs>
+</ds:datastoreItem>
+</file>
+
+<file path=customXml/itemProps69.xml><?xml version="1.0" encoding="utf-8"?>
+<ds:datastoreItem xmlns:ds="http://schemas.openxmlformats.org/officeDocument/2006/customXml" ds:itemID="{8F7399B1-A9DB-4D84-95B4-5DD6BBAA5187}">
+  <ds:schemaRefs>
+    <ds:schemaRef ds:uri="http://schemas.microsoft.com/VisualStudio/2011/storyboarding/control"/>
+  </ds:schemaRefs>
+</ds:datastoreItem>
+</file>
+
+<file path=customXml/itemProps7.xml><?xml version="1.0" encoding="utf-8"?>
+<ds:datastoreItem xmlns:ds="http://schemas.openxmlformats.org/officeDocument/2006/customXml" ds:itemID="{701AFE5A-ADCF-4311-A5B5-18B338C7E907}">
+  <ds:schemaRefs>
+    <ds:schemaRef ds:uri="http://schemas.microsoft.com/VisualStudio/2011/storyboarding/control"/>
+  </ds:schemaRefs>
+</ds:datastoreItem>
+</file>
+
+<file path=customXml/itemProps70.xml><?xml version="1.0" encoding="utf-8"?>
+<ds:datastoreItem xmlns:ds="http://schemas.openxmlformats.org/officeDocument/2006/customXml" ds:itemID="{9D841488-D9C9-470B-9DF0-06BC6C2C0775}">
+  <ds:schemaRefs>
+    <ds:schemaRef ds:uri="http://schemas.microsoft.com/VisualStudio/2011/storyboarding/control"/>
+  </ds:schemaRefs>
+</ds:datastoreItem>
+</file>
+
+<file path=customXml/itemProps71.xml><?xml version="1.0" encoding="utf-8"?>
+<ds:datastoreItem xmlns:ds="http://schemas.openxmlformats.org/officeDocument/2006/customXml" ds:itemID="{726BE286-E05E-4A7E-9BF6-44FFEC27C080}">
+  <ds:schemaRefs>
+    <ds:schemaRef ds:uri="http://schemas.microsoft.com/VisualStudio/2011/storyboarding/control"/>
+  </ds:schemaRefs>
+</ds:datastoreItem>
+</file>
+
+<file path=customXml/itemProps72.xml><?xml version="1.0" encoding="utf-8"?>
+<ds:datastoreItem xmlns:ds="http://schemas.openxmlformats.org/officeDocument/2006/customXml" ds:itemID="{6226C0E4-0364-460C-AAB7-9D347567DCC8}">
+  <ds:schemaRefs>
+    <ds:schemaRef ds:uri="http://schemas.microsoft.com/VisualStudio/2011/storyboarding/control"/>
+  </ds:schemaRefs>
+</ds:datastoreItem>
+</file>
+
+<file path=customXml/itemProps73.xml><?xml version="1.0" encoding="utf-8"?>
 <ds:datastoreItem xmlns:ds="http://schemas.openxmlformats.org/officeDocument/2006/customXml" ds:itemID="{ABD876F2-87B3-4F2F-9405-BCB26B393D8D}">
   <ds:schemaRefs>
     <ds:schemaRef ds:uri="http://schemas.microsoft.com/VisualStudio/2011/storyboarding/control"/>
@@ -28017,143 +28361,7 @@
 </ds:datastoreItem>
 </file>
 
-<file path=customXml/itemProps35.xml><?xml version="1.0" encoding="utf-8"?>
-<ds:datastoreItem xmlns:ds="http://schemas.openxmlformats.org/officeDocument/2006/customXml" ds:itemID="{48F85951-6571-4AA7-9B26-EEF9CD4B541F}">
-  <ds:schemaRefs>
-    <ds:schemaRef ds:uri="http://schemas.microsoft.com/VisualStudio/2011/storyboarding/control"/>
-  </ds:schemaRefs>
-</ds:datastoreItem>
-</file>
-
-<file path=customXml/itemProps36.xml><?xml version="1.0" encoding="utf-8"?>
-<ds:datastoreItem xmlns:ds="http://schemas.openxmlformats.org/officeDocument/2006/customXml" ds:itemID="{43446240-B211-4F80-A50E-E1B38445E2A1}">
-  <ds:schemaRefs>
-    <ds:schemaRef ds:uri="http://schemas.microsoft.com/VisualStudio/2011/storyboarding/control"/>
-  </ds:schemaRefs>
-</ds:datastoreItem>
-</file>
-
-<file path=customXml/itemProps37.xml><?xml version="1.0" encoding="utf-8"?>
-<ds:datastoreItem xmlns:ds="http://schemas.openxmlformats.org/officeDocument/2006/customXml" ds:itemID="{2E8BF867-BA02-4DD2-B1A2-C9A27CC92F1F}">
-  <ds:schemaRefs>
-    <ds:schemaRef ds:uri="http://schemas.microsoft.com/VisualStudio/2011/storyboarding/control"/>
-  </ds:schemaRefs>
-</ds:datastoreItem>
-</file>
-
-<file path=customXml/itemProps38.xml><?xml version="1.0" encoding="utf-8"?>
-<ds:datastoreItem xmlns:ds="http://schemas.openxmlformats.org/officeDocument/2006/customXml" ds:itemID="{199B4AEE-2A28-4269-AEAC-CF63B1A2C9C1}">
-  <ds:schemaRefs>
-    <ds:schemaRef ds:uri="http://schemas.microsoft.com/VisualStudio/2011/storyboarding/control"/>
-  </ds:schemaRefs>
-</ds:datastoreItem>
-</file>
-
-<file path=customXml/itemProps39.xml><?xml version="1.0" encoding="utf-8"?>
-<ds:datastoreItem xmlns:ds="http://schemas.openxmlformats.org/officeDocument/2006/customXml" ds:itemID="{726BE286-E05E-4A7E-9BF6-44FFEC27C080}">
-  <ds:schemaRefs>
-    <ds:schemaRef ds:uri="http://schemas.microsoft.com/VisualStudio/2011/storyboarding/control"/>
-  </ds:schemaRefs>
-</ds:datastoreItem>
-</file>
-
-<file path=customXml/itemProps4.xml><?xml version="1.0" encoding="utf-8"?>
-<ds:datastoreItem xmlns:ds="http://schemas.openxmlformats.org/officeDocument/2006/customXml" ds:itemID="{7EC308D9-C28D-40CD-AB00-4A98E0A77CCC}">
-  <ds:schemaRefs>
-    <ds:schemaRef ds:uri="http://schemas.microsoft.com/VisualStudio/2011/storyboarding/control"/>
-  </ds:schemaRefs>
-</ds:datastoreItem>
-</file>
-
-<file path=customXml/itemProps40.xml><?xml version="1.0" encoding="utf-8"?>
-<ds:datastoreItem xmlns:ds="http://schemas.openxmlformats.org/officeDocument/2006/customXml" ds:itemID="{D9AB7FC7-C062-483E-9B7E-6CCCBB79B494}">
-  <ds:schemaRefs>
-    <ds:schemaRef ds:uri="http://schemas.microsoft.com/VisualStudio/2011/storyboarding/control"/>
-  </ds:schemaRefs>
-</ds:datastoreItem>
-</file>
-
-<file path=customXml/itemProps41.xml><?xml version="1.0" encoding="utf-8"?>
-<ds:datastoreItem xmlns:ds="http://schemas.openxmlformats.org/officeDocument/2006/customXml" ds:itemID="{FD7A3CF8-3A66-47F9-8AD7-22127504A57F}">
-  <ds:schemaRefs>
-    <ds:schemaRef ds:uri="http://schemas.microsoft.com/VisualStudio/2011/storyboarding/control"/>
-  </ds:schemaRefs>
-</ds:datastoreItem>
-</file>
-
-<file path=customXml/itemProps42.xml><?xml version="1.0" encoding="utf-8"?>
-<ds:datastoreItem xmlns:ds="http://schemas.openxmlformats.org/officeDocument/2006/customXml" ds:itemID="{83526E43-CC5B-4399-8E1C-823585530259}">
-  <ds:schemaRefs>
-    <ds:schemaRef ds:uri="http://schemas.microsoft.com/VisualStudio/2011/storyboarding/control"/>
-  </ds:schemaRefs>
-</ds:datastoreItem>
-</file>
-
-<file path=customXml/itemProps43.xml><?xml version="1.0" encoding="utf-8"?>
-<ds:datastoreItem xmlns:ds="http://schemas.openxmlformats.org/officeDocument/2006/customXml" ds:itemID="{46C73D8E-C66E-4332-8B81-F1B9658FF49D}">
-  <ds:schemaRefs>
-    <ds:schemaRef ds:uri="http://schemas.microsoft.com/VisualStudio/2011/storyboarding/control"/>
-  </ds:schemaRefs>
-</ds:datastoreItem>
-</file>
-
-<file path=customXml/itemProps44.xml><?xml version="1.0" encoding="utf-8"?>
-<ds:datastoreItem xmlns:ds="http://schemas.openxmlformats.org/officeDocument/2006/customXml" ds:itemID="{B472B8AC-8A53-4AB2-879D-1716C227F63F}">
-  <ds:schemaRefs>
-    <ds:schemaRef ds:uri="http://schemas.microsoft.com/VisualStudio/2011/storyboarding/control"/>
-  </ds:schemaRefs>
-</ds:datastoreItem>
-</file>
-
-<file path=customXml/itemProps45.xml><?xml version="1.0" encoding="utf-8"?>
-<ds:datastoreItem xmlns:ds="http://schemas.openxmlformats.org/officeDocument/2006/customXml" ds:itemID="{247695CD-B2DD-488A-8575-5345C166802C}">
-  <ds:schemaRefs>
-    <ds:schemaRef ds:uri="http://schemas.microsoft.com/VisualStudio/2011/storyboarding/control"/>
-  </ds:schemaRefs>
-</ds:datastoreItem>
-</file>
-
-<file path=customXml/itemProps46.xml><?xml version="1.0" encoding="utf-8"?>
-<ds:datastoreItem xmlns:ds="http://schemas.openxmlformats.org/officeDocument/2006/customXml" ds:itemID="{32DCF836-3940-427C-8F81-BA183FB52BAC}">
-  <ds:schemaRefs>
-    <ds:schemaRef ds:uri="http://schemas.microsoft.com/VisualStudio/2011/storyboarding/control"/>
-  </ds:schemaRefs>
-</ds:datastoreItem>
-</file>
-
-<file path=customXml/itemProps47.xml><?xml version="1.0" encoding="utf-8"?>
-<ds:datastoreItem xmlns:ds="http://schemas.openxmlformats.org/officeDocument/2006/customXml" ds:itemID="{B01456BF-31CD-4F81-B283-64D56CC0D084}">
-  <ds:schemaRefs>
-    <ds:schemaRef ds:uri="http://schemas.microsoft.com/VisualStudio/2011/storyboarding/control"/>
-  </ds:schemaRefs>
-</ds:datastoreItem>
-</file>
-
-<file path=customXml/itemProps48.xml><?xml version="1.0" encoding="utf-8"?>
-<ds:datastoreItem xmlns:ds="http://schemas.openxmlformats.org/officeDocument/2006/customXml" ds:itemID="{8481EF94-D4A7-4149-8E7B-C8738D2597CA}">
-  <ds:schemaRefs>
-    <ds:schemaRef ds:uri="http://schemas.microsoft.com/VisualStudio/2011/storyboarding/control"/>
-  </ds:schemaRefs>
-</ds:datastoreItem>
-</file>
-
-<file path=customXml/itemProps49.xml><?xml version="1.0" encoding="utf-8"?>
-<ds:datastoreItem xmlns:ds="http://schemas.openxmlformats.org/officeDocument/2006/customXml" ds:itemID="{C36DB154-AE5E-441B-8E32-9C0203D538F6}">
-  <ds:schemaRefs>
-    <ds:schemaRef ds:uri="http://schemas.microsoft.com/VisualStudio/2011/storyboarding/control"/>
-  </ds:schemaRefs>
-</ds:datastoreItem>
-</file>
-
-<file path=customXml/itemProps5.xml><?xml version="1.0" encoding="utf-8"?>
-<ds:datastoreItem xmlns:ds="http://schemas.openxmlformats.org/officeDocument/2006/customXml" ds:itemID="{3C65476E-E005-4058-A679-B2D8F13FF877}">
-  <ds:schemaRefs>
-    <ds:schemaRef ds:uri="http://schemas.microsoft.com/VisualStudio/2011/storyboarding/control"/>
-  </ds:schemaRefs>
-</ds:datastoreItem>
-</file>
-
-<file path=customXml/itemProps50.xml><?xml version="1.0" encoding="utf-8"?>
+<file path=customXml/itemProps74.xml><?xml version="1.0" encoding="utf-8"?>
 <ds:datastoreItem xmlns:ds="http://schemas.openxmlformats.org/officeDocument/2006/customXml" ds:itemID="{6ADA548F-1BF0-44B5-AD4E-6B89D3ECE98D}">
   <ds:schemaRefs>
     <ds:schemaRef ds:uri="http://schemas.microsoft.com/VisualStudio/2011/storyboarding/control"/>
@@ -28161,216 +28369,8 @@
 </ds:datastoreItem>
 </file>
 
-<file path=customXml/itemProps51.xml><?xml version="1.0" encoding="utf-8"?>
-<ds:datastoreItem xmlns:ds="http://schemas.openxmlformats.org/officeDocument/2006/customXml" ds:itemID="{FC6544C5-9902-4F92-B15E-0F0FB91FC344}">
-  <ds:schemaRefs>
-    <ds:schemaRef ds:uri="http://schemas.microsoft.com/VisualStudio/2011/storyboarding/control"/>
-  </ds:schemaRefs>
-</ds:datastoreItem>
-</file>
-
-<file path=customXml/itemProps52.xml><?xml version="1.0" encoding="utf-8"?>
-<ds:datastoreItem xmlns:ds="http://schemas.openxmlformats.org/officeDocument/2006/customXml" ds:itemID="{DB2000C8-B277-4324-8B80-CDB83E8CE835}">
-  <ds:schemaRefs>
-    <ds:schemaRef ds:uri="http://schemas.microsoft.com/VisualStudio/2011/storyboarding/control"/>
-  </ds:schemaRefs>
-</ds:datastoreItem>
-</file>
-
-<file path=customXml/itemProps53.xml><?xml version="1.0" encoding="utf-8"?>
-<ds:datastoreItem xmlns:ds="http://schemas.openxmlformats.org/officeDocument/2006/customXml" ds:itemID="{149B1CD2-B7C7-4B38-9713-13FEE7CAC5CF}">
-  <ds:schemaRefs>
-    <ds:schemaRef ds:uri="http://schemas.microsoft.com/VisualStudio/2011/storyboarding/control"/>
-  </ds:schemaRefs>
-</ds:datastoreItem>
-</file>
-
-<file path=customXml/itemProps54.xml><?xml version="1.0" encoding="utf-8"?>
-<ds:datastoreItem xmlns:ds="http://schemas.openxmlformats.org/officeDocument/2006/customXml" ds:itemID="{57FFB7F0-24A5-4BA8-AA91-8BFC251E2323}">
-  <ds:schemaRefs>
-    <ds:schemaRef ds:uri="http://schemas.microsoft.com/VisualStudio/2011/storyboarding/control"/>
-  </ds:schemaRefs>
-</ds:datastoreItem>
-</file>
-
-<file path=customXml/itemProps55.xml><?xml version="1.0" encoding="utf-8"?>
+<file path=customXml/itemProps75.xml><?xml version="1.0" encoding="utf-8"?>
 <ds:datastoreItem xmlns:ds="http://schemas.openxmlformats.org/officeDocument/2006/customXml" ds:itemID="{C02037DD-3248-4DE3-A985-ACC0F2406BE8}">
-  <ds:schemaRefs>
-    <ds:schemaRef ds:uri="http://schemas.microsoft.com/VisualStudio/2011/storyboarding/control"/>
-  </ds:schemaRefs>
-</ds:datastoreItem>
-</file>
-
-<file path=customXml/itemProps56.xml><?xml version="1.0" encoding="utf-8"?>
-<ds:datastoreItem xmlns:ds="http://schemas.openxmlformats.org/officeDocument/2006/customXml" ds:itemID="{D2FE2441-F4F4-4DD2-A086-4A7D71862FD9}">
-  <ds:schemaRefs>
-    <ds:schemaRef ds:uri="http://schemas.microsoft.com/VisualStudio/2011/storyboarding/control"/>
-  </ds:schemaRefs>
-</ds:datastoreItem>
-</file>
-
-<file path=customXml/itemProps57.xml><?xml version="1.0" encoding="utf-8"?>
-<ds:datastoreItem xmlns:ds="http://schemas.openxmlformats.org/officeDocument/2006/customXml" ds:itemID="{0CCA9F88-8784-4D3A-B544-5E75264A0988}">
-  <ds:schemaRefs>
-    <ds:schemaRef ds:uri="http://schemas.microsoft.com/VisualStudio/2011/storyboarding/control"/>
-  </ds:schemaRefs>
-</ds:datastoreItem>
-</file>
-
-<file path=customXml/itemProps58.xml><?xml version="1.0" encoding="utf-8"?>
-<ds:datastoreItem xmlns:ds="http://schemas.openxmlformats.org/officeDocument/2006/customXml" ds:itemID="{99FFFAFB-7A40-49A1-B04F-4A1F6ECF0BAF}">
-  <ds:schemaRefs>
-    <ds:schemaRef ds:uri="http://schemas.microsoft.com/VisualStudio/2011/storyboarding/control"/>
-  </ds:schemaRefs>
-</ds:datastoreItem>
-</file>
-
-<file path=customXml/itemProps59.xml><?xml version="1.0" encoding="utf-8"?>
-<ds:datastoreItem xmlns:ds="http://schemas.openxmlformats.org/officeDocument/2006/customXml" ds:itemID="{46714D06-B7FD-48A9-91D0-7F1510C73858}">
-  <ds:schemaRefs>
-    <ds:schemaRef ds:uri="http://schemas.microsoft.com/VisualStudio/2011/storyboarding/control"/>
-  </ds:schemaRefs>
-</ds:datastoreItem>
-</file>
-
-<file path=customXml/itemProps6.xml><?xml version="1.0" encoding="utf-8"?>
-<ds:datastoreItem xmlns:ds="http://schemas.openxmlformats.org/officeDocument/2006/customXml" ds:itemID="{43588560-03AB-428A-9CE4-A6AC7508369A}">
-  <ds:schemaRefs>
-    <ds:schemaRef ds:uri="http://schemas.microsoft.com/VisualStudio/2011/storyboarding/control"/>
-  </ds:schemaRefs>
-</ds:datastoreItem>
-</file>
-
-<file path=customXml/itemProps60.xml><?xml version="1.0" encoding="utf-8"?>
-<ds:datastoreItem xmlns:ds="http://schemas.openxmlformats.org/officeDocument/2006/customXml" ds:itemID="{C4583063-FB7A-486E-B271-71E78059E19B}">
-  <ds:schemaRefs>
-    <ds:schemaRef ds:uri="http://schemas.microsoft.com/VisualStudio/2011/storyboarding/control"/>
-  </ds:schemaRefs>
-</ds:datastoreItem>
-</file>
-
-<file path=customXml/itemProps61.xml><?xml version="1.0" encoding="utf-8"?>
-<ds:datastoreItem xmlns:ds="http://schemas.openxmlformats.org/officeDocument/2006/customXml" ds:itemID="{654CBC2D-27EC-43DB-ABA4-3FBDF37D3735}">
-  <ds:schemaRefs>
-    <ds:schemaRef ds:uri="http://schemas.microsoft.com/VisualStudio/2011/storyboarding/control"/>
-  </ds:schemaRefs>
-</ds:datastoreItem>
-</file>
-
-<file path=customXml/itemProps62.xml><?xml version="1.0" encoding="utf-8"?>
-<ds:datastoreItem xmlns:ds="http://schemas.openxmlformats.org/officeDocument/2006/customXml" ds:itemID="{063AF5E8-36AD-451D-9B6A-4390E8F3CF38}">
-  <ds:schemaRefs>
-    <ds:schemaRef ds:uri="http://schemas.microsoft.com/VisualStudio/2011/storyboarding/control"/>
-  </ds:schemaRefs>
-</ds:datastoreItem>
-</file>
-
-<file path=customXml/itemProps63.xml><?xml version="1.0" encoding="utf-8"?>
-<ds:datastoreItem xmlns:ds="http://schemas.openxmlformats.org/officeDocument/2006/customXml" ds:itemID="{ACB3927E-D579-4694-AD01-62FF7AA261C4}">
-  <ds:schemaRefs>
-    <ds:schemaRef ds:uri="http://schemas.microsoft.com/VisualStudio/2011/storyboarding/control"/>
-  </ds:schemaRefs>
-</ds:datastoreItem>
-</file>
-
-<file path=customXml/itemProps64.xml><?xml version="1.0" encoding="utf-8"?>
-<ds:datastoreItem xmlns:ds="http://schemas.openxmlformats.org/officeDocument/2006/customXml" ds:itemID="{0B5327E3-0261-4B48-BF6B-FF0257762827}">
-  <ds:schemaRefs>
-    <ds:schemaRef ds:uri="http://schemas.microsoft.com/VisualStudio/2011/storyboarding/control"/>
-  </ds:schemaRefs>
-</ds:datastoreItem>
-</file>
-
-<file path=customXml/itemProps65.xml><?xml version="1.0" encoding="utf-8"?>
-<ds:datastoreItem xmlns:ds="http://schemas.openxmlformats.org/officeDocument/2006/customXml" ds:itemID="{A3F62A8C-3D6E-45AB-989A-0299CCDC7BDF}">
-  <ds:schemaRefs>
-    <ds:schemaRef ds:uri="http://schemas.microsoft.com/VisualStudio/2011/storyboarding/control"/>
-  </ds:schemaRefs>
-</ds:datastoreItem>
-</file>
-
-<file path=customXml/itemProps66.xml><?xml version="1.0" encoding="utf-8"?>
-<ds:datastoreItem xmlns:ds="http://schemas.openxmlformats.org/officeDocument/2006/customXml" ds:itemID="{AB1DB933-7DE2-4FB6-94F8-DE6617D86614}">
-  <ds:schemaRefs>
-    <ds:schemaRef ds:uri="http://schemas.microsoft.com/VisualStudio/2011/storyboarding/control"/>
-  </ds:schemaRefs>
-</ds:datastoreItem>
-</file>
-
-<file path=customXml/itemProps67.xml><?xml version="1.0" encoding="utf-8"?>
-<ds:datastoreItem xmlns:ds="http://schemas.openxmlformats.org/officeDocument/2006/customXml" ds:itemID="{228AF168-33A9-492E-910D-EAE94E644B4A}">
-  <ds:schemaRefs>
-    <ds:schemaRef ds:uri="http://schemas.microsoft.com/VisualStudio/2011/storyboarding/control"/>
-  </ds:schemaRefs>
-</ds:datastoreItem>
-</file>
-
-<file path=customXml/itemProps68.xml><?xml version="1.0" encoding="utf-8"?>
-<ds:datastoreItem xmlns:ds="http://schemas.openxmlformats.org/officeDocument/2006/customXml" ds:itemID="{876AF238-A0AE-4CE4-9709-BB19E770A0FF}">
-  <ds:schemaRefs>
-    <ds:schemaRef ds:uri="http://schemas.microsoft.com/VisualStudio/2011/storyboarding/control"/>
-  </ds:schemaRefs>
-</ds:datastoreItem>
-</file>
-
-<file path=customXml/itemProps69.xml><?xml version="1.0" encoding="utf-8"?>
-<ds:datastoreItem xmlns:ds="http://schemas.openxmlformats.org/officeDocument/2006/customXml" ds:itemID="{B0C9E300-5CAC-4E8C-B9CB-B4EDDB0EC3C8}">
-  <ds:schemaRefs>
-    <ds:schemaRef ds:uri="http://schemas.microsoft.com/VisualStudio/2011/storyboarding/control"/>
-  </ds:schemaRefs>
-</ds:datastoreItem>
-</file>
-
-<file path=customXml/itemProps7.xml><?xml version="1.0" encoding="utf-8"?>
-<ds:datastoreItem xmlns:ds="http://schemas.openxmlformats.org/officeDocument/2006/customXml" ds:itemID="{9F80CF27-93E9-4C7B-88EF-82FB0C72DF62}">
-  <ds:schemaRefs>
-    <ds:schemaRef ds:uri="http://schemas.microsoft.com/VisualStudio/2011/storyboarding/control"/>
-  </ds:schemaRefs>
-</ds:datastoreItem>
-</file>
-
-<file path=customXml/itemProps70.xml><?xml version="1.0" encoding="utf-8"?>
-<ds:datastoreItem xmlns:ds="http://schemas.openxmlformats.org/officeDocument/2006/customXml" ds:itemID="{0987803F-8C29-460C-9CFE-90D062BBF340}">
-  <ds:schemaRefs>
-    <ds:schemaRef ds:uri="http://schemas.microsoft.com/VisualStudio/2011/storyboarding/control"/>
-  </ds:schemaRefs>
-</ds:datastoreItem>
-</file>
-
-<file path=customXml/itemProps71.xml><?xml version="1.0" encoding="utf-8"?>
-<ds:datastoreItem xmlns:ds="http://schemas.openxmlformats.org/officeDocument/2006/customXml" ds:itemID="{2BDF7FB8-4BA8-46D9-B98A-095F3529F3D4}">
-  <ds:schemaRefs>
-    <ds:schemaRef ds:uri="http://schemas.microsoft.com/VisualStudio/2011/storyboarding/control"/>
-  </ds:schemaRefs>
-</ds:datastoreItem>
-</file>
-
-<file path=customXml/itemProps72.xml><?xml version="1.0" encoding="utf-8"?>
-<ds:datastoreItem xmlns:ds="http://schemas.openxmlformats.org/officeDocument/2006/customXml" ds:itemID="{7CABBE05-1DB8-413F-B922-E51F51DB6CB5}">
-  <ds:schemaRefs>
-    <ds:schemaRef ds:uri="http://schemas.microsoft.com/VisualStudio/2011/storyboarding/control"/>
-  </ds:schemaRefs>
-</ds:datastoreItem>
-</file>
-
-<file path=customXml/itemProps73.xml><?xml version="1.0" encoding="utf-8"?>
-<ds:datastoreItem xmlns:ds="http://schemas.openxmlformats.org/officeDocument/2006/customXml" ds:itemID="{5F6247E0-2660-41E0-8816-07BF7F4C712D}">
-  <ds:schemaRefs>
-    <ds:schemaRef ds:uri="http://schemas.microsoft.com/VisualStudio/2011/storyboarding/control"/>
-  </ds:schemaRefs>
-</ds:datastoreItem>
-</file>
-
-<file path=customXml/itemProps74.xml><?xml version="1.0" encoding="utf-8"?>
-<ds:datastoreItem xmlns:ds="http://schemas.openxmlformats.org/officeDocument/2006/customXml" ds:itemID="{438B7A44-EBDD-41BA-B093-6D278F4F7459}">
-  <ds:schemaRefs>
-    <ds:schemaRef ds:uri="http://schemas.microsoft.com/VisualStudio/2011/storyboarding/control"/>
-  </ds:schemaRefs>
-</ds:datastoreItem>
-</file>
-
-<file path=customXml/itemProps75.xml><?xml version="1.0" encoding="utf-8"?>
-<ds:datastoreItem xmlns:ds="http://schemas.openxmlformats.org/officeDocument/2006/customXml" ds:itemID="{E886A3B6-32CF-43FB-BFDC-824E566105C6}">
   <ds:schemaRefs>
     <ds:schemaRef ds:uri="http://schemas.microsoft.com/VisualStudio/2011/storyboarding/control"/>
   </ds:schemaRefs>
@@ -28386,7 +28386,7 @@
 </file>
 
 <file path=customXml/itemProps77.xml><?xml version="1.0" encoding="utf-8"?>
-<ds:datastoreItem xmlns:ds="http://schemas.openxmlformats.org/officeDocument/2006/customXml" ds:itemID="{D12E1D60-E53D-431F-ABC8-B98207B7D1E6}">
+<ds:datastoreItem xmlns:ds="http://schemas.openxmlformats.org/officeDocument/2006/customXml" ds:itemID="{1877004B-50A8-4877-B8FF-7DD1DC8224C2}">
   <ds:schemaRefs>
     <ds:schemaRef ds:uri="http://schemas.microsoft.com/VisualStudio/2011/storyboarding/control"/>
   </ds:schemaRefs>
@@ -28394,7 +28394,7 @@
 </file>
 
 <file path=customXml/itemProps78.xml><?xml version="1.0" encoding="utf-8"?>
-<ds:datastoreItem xmlns:ds="http://schemas.openxmlformats.org/officeDocument/2006/customXml" ds:itemID="{E5957A30-7F08-42CE-A7C9-9121B3EEDB89}">
+<ds:datastoreItem xmlns:ds="http://schemas.openxmlformats.org/officeDocument/2006/customXml" ds:itemID="{6E9F6603-6B7C-453B-A486-459839EF1163}">
   <ds:schemaRefs>
     <ds:schemaRef ds:uri="http://schemas.microsoft.com/VisualStudio/2011/storyboarding/control"/>
   </ds:schemaRefs>
@@ -28402,7 +28402,7 @@
 </file>
 
 <file path=customXml/itemProps79.xml><?xml version="1.0" encoding="utf-8"?>
-<ds:datastoreItem xmlns:ds="http://schemas.openxmlformats.org/officeDocument/2006/customXml" ds:itemID="{C14734D5-9FB1-4C35-A180-105B4BA15CD3}">
+<ds:datastoreItem xmlns:ds="http://schemas.openxmlformats.org/officeDocument/2006/customXml" ds:itemID="{DC24DB23-C3E0-4806-934A-5531299BFC48}">
   <ds:schemaRefs>
     <ds:schemaRef ds:uri="http://schemas.microsoft.com/VisualStudio/2011/storyboarding/control"/>
   </ds:schemaRefs>
@@ -28410,7 +28410,7 @@
 </file>
 
 <file path=customXml/itemProps8.xml><?xml version="1.0" encoding="utf-8"?>
-<ds:datastoreItem xmlns:ds="http://schemas.openxmlformats.org/officeDocument/2006/customXml" ds:itemID="{69E02AD5-3C7C-4F1D-9766-B18ECF2212C6}">
+<ds:datastoreItem xmlns:ds="http://schemas.openxmlformats.org/officeDocument/2006/customXml" ds:itemID="{3C65476E-E005-4058-A679-B2D8F13FF877}">
   <ds:schemaRefs>
     <ds:schemaRef ds:uri="http://schemas.microsoft.com/VisualStudio/2011/storyboarding/control"/>
   </ds:schemaRefs>
@@ -28418,7 +28418,7 @@
 </file>
 
 <file path=customXml/itemProps80.xml><?xml version="1.0" encoding="utf-8"?>
-<ds:datastoreItem xmlns:ds="http://schemas.openxmlformats.org/officeDocument/2006/customXml" ds:itemID="{559BF73F-CE64-4B91-BD49-510468F35CB9}">
+<ds:datastoreItem xmlns:ds="http://schemas.openxmlformats.org/officeDocument/2006/customXml" ds:itemID="{BC9894E6-7AC8-4518-A802-8C98F8565837}">
   <ds:schemaRefs>
     <ds:schemaRef ds:uri="http://schemas.microsoft.com/VisualStudio/2011/storyboarding/control"/>
   </ds:schemaRefs>
@@ -28426,7 +28426,7 @@
 </file>
 
 <file path=customXml/itemProps81.xml><?xml version="1.0" encoding="utf-8"?>
-<ds:datastoreItem xmlns:ds="http://schemas.openxmlformats.org/officeDocument/2006/customXml" ds:itemID="{E28B7CEA-1FBD-4F14-BDA2-C48C66B37150}">
+<ds:datastoreItem xmlns:ds="http://schemas.openxmlformats.org/officeDocument/2006/customXml" ds:itemID="{8EE50836-C4DB-4AC6-8DFD-677FDEAB9EAD}">
   <ds:schemaRefs>
     <ds:schemaRef ds:uri="http://schemas.microsoft.com/VisualStudio/2011/storyboarding/control"/>
   </ds:schemaRefs>
@@ -28434,7 +28434,7 @@
 </file>
 
 <file path=customXml/itemProps82.xml><?xml version="1.0" encoding="utf-8"?>
-<ds:datastoreItem xmlns:ds="http://schemas.openxmlformats.org/officeDocument/2006/customXml" ds:itemID="{8E111B87-A381-46AA-BB11-318F8ACB4BCA}">
+<ds:datastoreItem xmlns:ds="http://schemas.openxmlformats.org/officeDocument/2006/customXml" ds:itemID="{6806E131-54C6-48B3-984A-5A1F4C5785D2}">
   <ds:schemaRefs>
     <ds:schemaRef ds:uri="http://schemas.microsoft.com/VisualStudio/2011/storyboarding/control"/>
   </ds:schemaRefs>
@@ -28442,7 +28442,7 @@
 </file>
 
 <file path=customXml/itemProps83.xml><?xml version="1.0" encoding="utf-8"?>
-<ds:datastoreItem xmlns:ds="http://schemas.openxmlformats.org/officeDocument/2006/customXml" ds:itemID="{68A0CDC1-3F80-4DE3-8AB3-B532E32DC2D3}">
+<ds:datastoreItem xmlns:ds="http://schemas.openxmlformats.org/officeDocument/2006/customXml" ds:itemID="{F2C13C45-9FD4-46A1-B566-8CFCB6433E4D}">
   <ds:schemaRefs>
     <ds:schemaRef ds:uri="http://schemas.microsoft.com/VisualStudio/2011/storyboarding/control"/>
   </ds:schemaRefs>
@@ -28450,7 +28450,7 @@
 </file>
 
 <file path=customXml/itemProps84.xml><?xml version="1.0" encoding="utf-8"?>
-<ds:datastoreItem xmlns:ds="http://schemas.openxmlformats.org/officeDocument/2006/customXml" ds:itemID="{425D7E26-BB5E-460D-97B3-E693C38FDA69}">
+<ds:datastoreItem xmlns:ds="http://schemas.openxmlformats.org/officeDocument/2006/customXml" ds:itemID="{9F80CF27-93E9-4C7B-88EF-82FB0C72DF62}">
   <ds:schemaRefs>
     <ds:schemaRef ds:uri="http://schemas.microsoft.com/VisualStudio/2011/storyboarding/control"/>
   </ds:schemaRefs>
@@ -28458,7 +28458,7 @@
 </file>
 
 <file path=customXml/itemProps85.xml><?xml version="1.0" encoding="utf-8"?>
-<ds:datastoreItem xmlns:ds="http://schemas.openxmlformats.org/officeDocument/2006/customXml" ds:itemID="{3DDBA3E6-6C5A-4905-87BF-300A95711014}">
+<ds:datastoreItem xmlns:ds="http://schemas.openxmlformats.org/officeDocument/2006/customXml" ds:itemID="{2BDF7FB8-4BA8-46D9-B98A-095F3529F3D4}">
   <ds:schemaRefs>
     <ds:schemaRef ds:uri="http://schemas.microsoft.com/VisualStudio/2011/storyboarding/control"/>
   </ds:schemaRefs>
@@ -28466,7 +28466,7 @@
 </file>
 
 <file path=customXml/itemProps86.xml><?xml version="1.0" encoding="utf-8"?>
-<ds:datastoreItem xmlns:ds="http://schemas.openxmlformats.org/officeDocument/2006/customXml" ds:itemID="{06D91DB4-751F-47F3-B3CD-CDDA280C9652}">
+<ds:datastoreItem xmlns:ds="http://schemas.openxmlformats.org/officeDocument/2006/customXml" ds:itemID="{29BF925D-CF27-4B21-AC43-2599465F0C8E}">
   <ds:schemaRefs>
     <ds:schemaRef ds:uri="http://schemas.microsoft.com/VisualStudio/2011/storyboarding/control"/>
   </ds:schemaRefs>
@@ -28474,6 +28474,78 @@
 </file>
 
 <file path=customXml/itemProps87.xml><?xml version="1.0" encoding="utf-8"?>
+<ds:datastoreItem xmlns:ds="http://schemas.openxmlformats.org/officeDocument/2006/customXml" ds:itemID="{AABF63A9-AA30-4DF6-8EF2-972AB7A4097F}">
+  <ds:schemaRefs>
+    <ds:schemaRef ds:uri="http://schemas.microsoft.com/VisualStudio/2011/storyboarding/control"/>
+  </ds:schemaRefs>
+</ds:datastoreItem>
+</file>
+
+<file path=customXml/itemProps88.xml><?xml version="1.0" encoding="utf-8"?>
+<ds:datastoreItem xmlns:ds="http://schemas.openxmlformats.org/officeDocument/2006/customXml" ds:itemID="{4032A915-244F-4EED-B3D6-A7E329608545}">
+  <ds:schemaRefs>
+    <ds:schemaRef ds:uri="http://schemas.microsoft.com/VisualStudio/2011/storyboarding/control"/>
+  </ds:schemaRefs>
+</ds:datastoreItem>
+</file>
+
+<file path=customXml/itemProps89.xml><?xml version="1.0" encoding="utf-8"?>
+<ds:datastoreItem xmlns:ds="http://schemas.openxmlformats.org/officeDocument/2006/customXml" ds:itemID="{BE30DC31-8F8A-48CF-A072-77607577B2FB}">
+  <ds:schemaRefs>
+    <ds:schemaRef ds:uri="http://schemas.microsoft.com/VisualStudio/2011/storyboarding/control"/>
+  </ds:schemaRefs>
+</ds:datastoreItem>
+</file>
+
+<file path=customXml/itemProps9.xml><?xml version="1.0" encoding="utf-8"?>
+<ds:datastoreItem xmlns:ds="http://schemas.openxmlformats.org/officeDocument/2006/customXml" ds:itemID="{ADDA3575-2CD6-4AA3-BAD6-EE20DE74340F}">
+  <ds:schemaRefs>
+    <ds:schemaRef ds:uri="http://schemas.microsoft.com/VisualStudio/2011/storyboarding/control"/>
+  </ds:schemaRefs>
+</ds:datastoreItem>
+</file>
+
+<file path=customXml/itemProps90.xml><?xml version="1.0" encoding="utf-8"?>
+<ds:datastoreItem xmlns:ds="http://schemas.openxmlformats.org/officeDocument/2006/customXml" ds:itemID="{29F09D18-0D3C-4F1D-ABE0-73E2474806CB}">
+  <ds:schemaRefs>
+    <ds:schemaRef ds:uri="http://schemas.microsoft.com/VisualStudio/2011/storyboarding/control"/>
+  </ds:schemaRefs>
+</ds:datastoreItem>
+</file>
+
+<file path=customXml/itemProps91.xml><?xml version="1.0" encoding="utf-8"?>
+<ds:datastoreItem xmlns:ds="http://schemas.openxmlformats.org/officeDocument/2006/customXml" ds:itemID="{DC4F4190-4090-481C-95E3-E7A883513D24}">
+  <ds:schemaRefs>
+    <ds:schemaRef ds:uri="http://schemas.microsoft.com/VisualStudio/2011/storyboarding/control"/>
+  </ds:schemaRefs>
+</ds:datastoreItem>
+</file>
+
+<file path=customXml/itemProps92.xml><?xml version="1.0" encoding="utf-8"?>
+<ds:datastoreItem xmlns:ds="http://schemas.openxmlformats.org/officeDocument/2006/customXml" ds:itemID="{D9AB7FC7-C062-483E-9B7E-6CCCBB79B494}">
+  <ds:schemaRefs>
+    <ds:schemaRef ds:uri="http://schemas.microsoft.com/VisualStudio/2011/storyboarding/control"/>
+  </ds:schemaRefs>
+</ds:datastoreItem>
+</file>
+
+<file path=customXml/itemProps93.xml><?xml version="1.0" encoding="utf-8"?>
+<ds:datastoreItem xmlns:ds="http://schemas.openxmlformats.org/officeDocument/2006/customXml" ds:itemID="{247695CD-B2DD-488A-8575-5345C166802C}">
+  <ds:schemaRefs>
+    <ds:schemaRef ds:uri="http://schemas.microsoft.com/VisualStudio/2011/storyboarding/control"/>
+  </ds:schemaRefs>
+</ds:datastoreItem>
+</file>
+
+<file path=customXml/itemProps94.xml><?xml version="1.0" encoding="utf-8"?>
+<ds:datastoreItem xmlns:ds="http://schemas.openxmlformats.org/officeDocument/2006/customXml" ds:itemID="{AB1DB933-7DE2-4FB6-94F8-DE6617D86614}">
+  <ds:schemaRefs>
+    <ds:schemaRef ds:uri="http://schemas.microsoft.com/VisualStudio/2011/storyboarding/control"/>
+  </ds:schemaRefs>
+</ds:datastoreItem>
+</file>
+
+<file path=customXml/itemProps95.xml><?xml version="1.0" encoding="utf-8"?>
 <ds:datastoreItem xmlns:ds="http://schemas.openxmlformats.org/officeDocument/2006/customXml" ds:itemID="{73C15516-64BE-43A3-9299-7E108DE97C7F}">
   <ds:schemaRefs>
     <ds:schemaRef ds:uri="http://schemas.microsoft.com/VisualStudio/2011/storyboarding/control"/>
@@ -28481,104 +28553,32 @@
 </ds:datastoreItem>
 </file>
 
-<file path=customXml/itemProps88.xml><?xml version="1.0" encoding="utf-8"?>
-<ds:datastoreItem xmlns:ds="http://schemas.openxmlformats.org/officeDocument/2006/customXml" ds:itemID="{A099D91D-2540-412F-88B4-6DD3EB1D58E7}">
+<file path=customXml/itemProps96.xml><?xml version="1.0" encoding="utf-8"?>
+<ds:datastoreItem xmlns:ds="http://schemas.openxmlformats.org/officeDocument/2006/customXml" ds:itemID="{4933C5B9-7038-46C8-B65F-9FC1C846A3E0}">
   <ds:schemaRefs>
     <ds:schemaRef ds:uri="http://schemas.microsoft.com/VisualStudio/2011/storyboarding/control"/>
   </ds:schemaRefs>
 </ds:datastoreItem>
 </file>
 
-<file path=customXml/itemProps89.xml><?xml version="1.0" encoding="utf-8"?>
-<ds:datastoreItem xmlns:ds="http://schemas.openxmlformats.org/officeDocument/2006/customXml" ds:itemID="{9DAE1F11-5474-4CAD-8EC7-A688E310A5AB}">
+<file path=customXml/itemProps97.xml><?xml version="1.0" encoding="utf-8"?>
+<ds:datastoreItem xmlns:ds="http://schemas.openxmlformats.org/officeDocument/2006/customXml" ds:itemID="{7A7C8F38-0BA1-42E1-8BF5-DEED4B0E03B5}">
   <ds:schemaRefs>
     <ds:schemaRef ds:uri="http://schemas.microsoft.com/VisualStudio/2011/storyboarding/control"/>
   </ds:schemaRefs>
 </ds:datastoreItem>
 </file>
 
-<file path=customXml/itemProps9.xml><?xml version="1.0" encoding="utf-8"?>
-<ds:datastoreItem xmlns:ds="http://schemas.openxmlformats.org/officeDocument/2006/customXml" ds:itemID="{0D8F2650-9E27-4603-BD35-5A059BB60334}">
+<file path=customXml/itemProps98.xml><?xml version="1.0" encoding="utf-8"?>
+<ds:datastoreItem xmlns:ds="http://schemas.openxmlformats.org/officeDocument/2006/customXml" ds:itemID="{C30452E4-8A6C-404A-B689-8E04350A6B59}">
   <ds:schemaRefs>
     <ds:schemaRef ds:uri="http://schemas.microsoft.com/VisualStudio/2011/storyboarding/control"/>
   </ds:schemaRefs>
 </ds:datastoreItem>
 </file>
 
-<file path=customXml/itemProps90.xml><?xml version="1.0" encoding="utf-8"?>
-<ds:datastoreItem xmlns:ds="http://schemas.openxmlformats.org/officeDocument/2006/customXml" ds:itemID="{ADDA3575-2CD6-4AA3-BAD6-EE20DE74340F}">
-  <ds:schemaRefs>
-    <ds:schemaRef ds:uri="http://schemas.microsoft.com/VisualStudio/2011/storyboarding/control"/>
-  </ds:schemaRefs>
-</ds:datastoreItem>
-</file>
-
-<file path=customXml/itemProps91.xml><?xml version="1.0" encoding="utf-8"?>
-<ds:datastoreItem xmlns:ds="http://schemas.openxmlformats.org/officeDocument/2006/customXml" ds:itemID="{A75B2111-FBDC-4291-9EA3-2B57563F245C}">
-  <ds:schemaRefs>
-    <ds:schemaRef ds:uri="http://schemas.microsoft.com/VisualStudio/2011/storyboarding/control"/>
-  </ds:schemaRefs>
-</ds:datastoreItem>
-</file>
-
-<file path=customXml/itemProps92.xml><?xml version="1.0" encoding="utf-8"?>
-<ds:datastoreItem xmlns:ds="http://schemas.openxmlformats.org/officeDocument/2006/customXml" ds:itemID="{29BF925D-CF27-4B21-AC43-2599465F0C8E}">
-  <ds:schemaRefs>
-    <ds:schemaRef ds:uri="http://schemas.microsoft.com/VisualStudio/2011/storyboarding/control"/>
-  </ds:schemaRefs>
-</ds:datastoreItem>
-</file>
-
-<file path=customXml/itemProps93.xml><?xml version="1.0" encoding="utf-8"?>
-<ds:datastoreItem xmlns:ds="http://schemas.openxmlformats.org/officeDocument/2006/customXml" ds:itemID="{CF91C9AF-FB44-4B2D-B964-EA853D542988}">
-  <ds:schemaRefs>
-    <ds:schemaRef ds:uri="http://schemas.microsoft.com/VisualStudio/2011/storyboarding/control"/>
-  </ds:schemaRefs>
-</ds:datastoreItem>
-</file>
-
-<file path=customXml/itemProps94.xml><?xml version="1.0" encoding="utf-8"?>
-<ds:datastoreItem xmlns:ds="http://schemas.openxmlformats.org/officeDocument/2006/customXml" ds:itemID="{186177FB-D9AA-47FB-AA70-F2EB801F860E}">
-  <ds:schemaRefs>
-    <ds:schemaRef ds:uri="http://schemas.microsoft.com/VisualStudio/2011/storyboarding/control"/>
-  </ds:schemaRefs>
-</ds:datastoreItem>
-</file>
-
-<file path=customXml/itemProps95.xml><?xml version="1.0" encoding="utf-8"?>
-<ds:datastoreItem xmlns:ds="http://schemas.openxmlformats.org/officeDocument/2006/customXml" ds:itemID="{451A7426-E19E-4AAF-BFD2-F92A9C112E84}">
-  <ds:schemaRefs>
-    <ds:schemaRef ds:uri="http://schemas.microsoft.com/VisualStudio/2011/storyboarding/control"/>
-  </ds:schemaRefs>
-</ds:datastoreItem>
-</file>
-
-<file path=customXml/itemProps96.xml><?xml version="1.0" encoding="utf-8"?>
-<ds:datastoreItem xmlns:ds="http://schemas.openxmlformats.org/officeDocument/2006/customXml" ds:itemID="{E243988D-F926-45CE-8E57-8F03AD990A6C}">
-  <ds:schemaRefs>
-    <ds:schemaRef ds:uri="http://schemas.microsoft.com/VisualStudio/2011/storyboarding/control"/>
-  </ds:schemaRefs>
-</ds:datastoreItem>
-</file>
-
-<file path=customXml/itemProps97.xml><?xml version="1.0" encoding="utf-8"?>
-<ds:datastoreItem xmlns:ds="http://schemas.openxmlformats.org/officeDocument/2006/customXml" ds:itemID="{1877004B-50A8-4877-B8FF-7DD1DC8224C2}">
-  <ds:schemaRefs>
-    <ds:schemaRef ds:uri="http://schemas.microsoft.com/VisualStudio/2011/storyboarding/control"/>
-  </ds:schemaRefs>
-</ds:datastoreItem>
-</file>
-
-<file path=customXml/itemProps98.xml><?xml version="1.0" encoding="utf-8"?>
-<ds:datastoreItem xmlns:ds="http://schemas.openxmlformats.org/officeDocument/2006/customXml" ds:itemID="{9A59738E-0CC4-436E-B451-F09AF7853BEC}">
-  <ds:schemaRefs>
-    <ds:schemaRef ds:uri="http://schemas.microsoft.com/VisualStudio/2011/storyboarding/control"/>
-  </ds:schemaRefs>
-</ds:datastoreItem>
-</file>
-
 <file path=customXml/itemProps99.xml><?xml version="1.0" encoding="utf-8"?>
-<ds:datastoreItem xmlns:ds="http://schemas.openxmlformats.org/officeDocument/2006/customXml" ds:itemID="{8B573C24-C1CA-4AD9-8793-CFC1E42E3841}">
+<ds:datastoreItem xmlns:ds="http://schemas.openxmlformats.org/officeDocument/2006/customXml" ds:itemID="{D1100CDA-4C0B-4B20-A344-A7360173EF0F}">
   <ds:schemaRefs>
     <ds:schemaRef ds:uri="http://schemas.microsoft.com/VisualStudio/2011/storyboarding/control"/>
   </ds:schemaRefs>

</xml_diff>